<commit_message>
Update ONIP-2 FISA / v2026
</commit_message>
<xml_diff>
--- a/ONIP-FISA/ONIP-2_Deroulement.pptx
+++ b/ONIP-FISA/ONIP-2_Deroulement.pptx
@@ -213,7 +213,7 @@
           <a:p>
             <a:fld id="{95F60532-AC81-4152-B45E-E054A978F780}" type="datetimeFigureOut">
               <a:rPr lang="fr-FR" smtClean="0"/>
-              <a:t>31/01/2025</a:t>
+              <a:t>10/02/2026</a:t>
             </a:fld>
             <a:endParaRPr lang="fr-FR"/>
           </a:p>
@@ -575,7 +575,7 @@
         <p:cNvPr id="1" name="">
           <a:extLst>
             <a:ext uri="{FF2B5EF4-FFF2-40B4-BE49-F238E27FC236}">
-              <a16:creationId xmlns:a16="http://schemas.microsoft.com/office/drawing/2014/main" id="{3D4FDBB9-15CD-9A55-E750-6031775C977C}"/>
+              <a16:creationId xmlns="" xmlns:a16="http://schemas.microsoft.com/office/drawing/2014/main" id="{3D4FDBB9-15CD-9A55-E750-6031775C977C}"/>
             </a:ext>
           </a:extLst>
         </p:cNvPr>
@@ -595,7 +595,7 @@
           <p:cNvPr id="2" name="Espace réservé de l'image des diapositives 1">
             <a:extLst>
               <a:ext uri="{FF2B5EF4-FFF2-40B4-BE49-F238E27FC236}">
-                <a16:creationId xmlns:a16="http://schemas.microsoft.com/office/drawing/2014/main" id="{6F115805-987F-AD18-ADA8-C67FB52CE471}"/>
+                <a16:creationId xmlns="" xmlns:a16="http://schemas.microsoft.com/office/drawing/2014/main" id="{6F115805-987F-AD18-ADA8-C67FB52CE471}"/>
               </a:ext>
             </a:extLst>
           </p:cNvPr>
@@ -613,7 +613,7 @@
           <p:cNvPr id="3" name="Espace réservé des notes 2">
             <a:extLst>
               <a:ext uri="{FF2B5EF4-FFF2-40B4-BE49-F238E27FC236}">
-                <a16:creationId xmlns:a16="http://schemas.microsoft.com/office/drawing/2014/main" id="{496AAD54-593C-6C4C-B908-EB9F9514636B}"/>
+                <a16:creationId xmlns="" xmlns:a16="http://schemas.microsoft.com/office/drawing/2014/main" id="{496AAD54-593C-6C4C-B908-EB9F9514636B}"/>
               </a:ext>
             </a:extLst>
           </p:cNvPr>
@@ -641,7 +641,7 @@
           <p:cNvPr id="4" name="Espace réservé du numéro de diapositive 3">
             <a:extLst>
               <a:ext uri="{FF2B5EF4-FFF2-40B4-BE49-F238E27FC236}">
-                <a16:creationId xmlns:a16="http://schemas.microsoft.com/office/drawing/2014/main" id="{2DE8A475-4C65-2ADD-6229-DDB6DAE4217B}"/>
+                <a16:creationId xmlns="" xmlns:a16="http://schemas.microsoft.com/office/drawing/2014/main" id="{2DE8A475-4C65-2ADD-6229-DDB6DAE4217B}"/>
               </a:ext>
             </a:extLst>
           </p:cNvPr>
@@ -686,7 +686,7 @@
         <p:cNvPr id="1" name="">
           <a:extLst>
             <a:ext uri="{FF2B5EF4-FFF2-40B4-BE49-F238E27FC236}">
-              <a16:creationId xmlns:a16="http://schemas.microsoft.com/office/drawing/2014/main" id="{29282340-E5A5-843F-0F9F-0426F426A6B4}"/>
+              <a16:creationId xmlns="" xmlns:a16="http://schemas.microsoft.com/office/drawing/2014/main" id="{29282340-E5A5-843F-0F9F-0426F426A6B4}"/>
             </a:ext>
           </a:extLst>
         </p:cNvPr>
@@ -706,7 +706,7 @@
           <p:cNvPr id="2" name="Espace réservé de l'image des diapositives 1">
             <a:extLst>
               <a:ext uri="{FF2B5EF4-FFF2-40B4-BE49-F238E27FC236}">
-                <a16:creationId xmlns:a16="http://schemas.microsoft.com/office/drawing/2014/main" id="{321A1BAB-E031-160D-0378-B57646AB3FFE}"/>
+                <a16:creationId xmlns="" xmlns:a16="http://schemas.microsoft.com/office/drawing/2014/main" id="{321A1BAB-E031-160D-0378-B57646AB3FFE}"/>
               </a:ext>
             </a:extLst>
           </p:cNvPr>
@@ -724,7 +724,7 @@
           <p:cNvPr id="3" name="Espace réservé des notes 2">
             <a:extLst>
               <a:ext uri="{FF2B5EF4-FFF2-40B4-BE49-F238E27FC236}">
-                <a16:creationId xmlns:a16="http://schemas.microsoft.com/office/drawing/2014/main" id="{BBC79F47-77C7-ABC7-0AB3-1DD67E3C3030}"/>
+                <a16:creationId xmlns="" xmlns:a16="http://schemas.microsoft.com/office/drawing/2014/main" id="{BBC79F47-77C7-ABC7-0AB3-1DD67E3C3030}"/>
               </a:ext>
             </a:extLst>
           </p:cNvPr>
@@ -752,7 +752,7 @@
           <p:cNvPr id="4" name="Espace réservé du numéro de diapositive 3">
             <a:extLst>
               <a:ext uri="{FF2B5EF4-FFF2-40B4-BE49-F238E27FC236}">
-                <a16:creationId xmlns:a16="http://schemas.microsoft.com/office/drawing/2014/main" id="{BAD42475-93BF-E621-B433-11884CE9919D}"/>
+                <a16:creationId xmlns="" xmlns:a16="http://schemas.microsoft.com/office/drawing/2014/main" id="{BAD42475-93BF-E621-B433-11884CE9919D}"/>
               </a:ext>
             </a:extLst>
           </p:cNvPr>
@@ -797,7 +797,7 @@
         <p:cNvPr id="1" name="">
           <a:extLst>
             <a:ext uri="{FF2B5EF4-FFF2-40B4-BE49-F238E27FC236}">
-              <a16:creationId xmlns:a16="http://schemas.microsoft.com/office/drawing/2014/main" id="{5086E116-5BAD-DFE7-28E9-147A1ED03025}"/>
+              <a16:creationId xmlns="" xmlns:a16="http://schemas.microsoft.com/office/drawing/2014/main" id="{5086E116-5BAD-DFE7-28E9-147A1ED03025}"/>
             </a:ext>
           </a:extLst>
         </p:cNvPr>
@@ -817,7 +817,7 @@
           <p:cNvPr id="2" name="Espace réservé de l'image des diapositives 1">
             <a:extLst>
               <a:ext uri="{FF2B5EF4-FFF2-40B4-BE49-F238E27FC236}">
-                <a16:creationId xmlns:a16="http://schemas.microsoft.com/office/drawing/2014/main" id="{CAD6EDCE-7444-1639-E0D2-901AF63D5840}"/>
+                <a16:creationId xmlns="" xmlns:a16="http://schemas.microsoft.com/office/drawing/2014/main" id="{CAD6EDCE-7444-1639-E0D2-901AF63D5840}"/>
               </a:ext>
             </a:extLst>
           </p:cNvPr>
@@ -835,7 +835,7 @@
           <p:cNvPr id="3" name="Espace réservé des notes 2">
             <a:extLst>
               <a:ext uri="{FF2B5EF4-FFF2-40B4-BE49-F238E27FC236}">
-                <a16:creationId xmlns:a16="http://schemas.microsoft.com/office/drawing/2014/main" id="{AEDFA151-47B8-0B84-C8F0-4A19D637EFFD}"/>
+                <a16:creationId xmlns="" xmlns:a16="http://schemas.microsoft.com/office/drawing/2014/main" id="{AEDFA151-47B8-0B84-C8F0-4A19D637EFFD}"/>
               </a:ext>
             </a:extLst>
           </p:cNvPr>
@@ -863,7 +863,7 @@
           <p:cNvPr id="4" name="Espace réservé du numéro de diapositive 3">
             <a:extLst>
               <a:ext uri="{FF2B5EF4-FFF2-40B4-BE49-F238E27FC236}">
-                <a16:creationId xmlns:a16="http://schemas.microsoft.com/office/drawing/2014/main" id="{2D3F090A-DE4E-4931-D48D-D0FCCAB370B5}"/>
+                <a16:creationId xmlns="" xmlns:a16="http://schemas.microsoft.com/office/drawing/2014/main" id="{2D3F090A-DE4E-4931-D48D-D0FCCAB370B5}"/>
               </a:ext>
             </a:extLst>
           </p:cNvPr>
@@ -908,7 +908,7 @@
         <p:cNvPr id="1" name="">
           <a:extLst>
             <a:ext uri="{FF2B5EF4-FFF2-40B4-BE49-F238E27FC236}">
-              <a16:creationId xmlns:a16="http://schemas.microsoft.com/office/drawing/2014/main" id="{74E63DEF-6AE8-B975-3D94-E4C5AF58C7D0}"/>
+              <a16:creationId xmlns="" xmlns:a16="http://schemas.microsoft.com/office/drawing/2014/main" id="{74E63DEF-6AE8-B975-3D94-E4C5AF58C7D0}"/>
             </a:ext>
           </a:extLst>
         </p:cNvPr>
@@ -928,7 +928,7 @@
           <p:cNvPr id="2" name="Espace réservé de l'image des diapositives 1">
             <a:extLst>
               <a:ext uri="{FF2B5EF4-FFF2-40B4-BE49-F238E27FC236}">
-                <a16:creationId xmlns:a16="http://schemas.microsoft.com/office/drawing/2014/main" id="{F361CD8D-BA2A-34BF-A492-F15A03BA31DF}"/>
+                <a16:creationId xmlns="" xmlns:a16="http://schemas.microsoft.com/office/drawing/2014/main" id="{F361CD8D-BA2A-34BF-A492-F15A03BA31DF}"/>
               </a:ext>
             </a:extLst>
           </p:cNvPr>
@@ -946,7 +946,7 @@
           <p:cNvPr id="3" name="Espace réservé des notes 2">
             <a:extLst>
               <a:ext uri="{FF2B5EF4-FFF2-40B4-BE49-F238E27FC236}">
-                <a16:creationId xmlns:a16="http://schemas.microsoft.com/office/drawing/2014/main" id="{B2D5467A-CD10-A9BF-0EEF-D6D2293407BB}"/>
+                <a16:creationId xmlns="" xmlns:a16="http://schemas.microsoft.com/office/drawing/2014/main" id="{B2D5467A-CD10-A9BF-0EEF-D6D2293407BB}"/>
               </a:ext>
             </a:extLst>
           </p:cNvPr>
@@ -974,7 +974,7 @@
           <p:cNvPr id="4" name="Espace réservé du numéro de diapositive 3">
             <a:extLst>
               <a:ext uri="{FF2B5EF4-FFF2-40B4-BE49-F238E27FC236}">
-                <a16:creationId xmlns:a16="http://schemas.microsoft.com/office/drawing/2014/main" id="{434AA4A3-C334-3AC4-9B25-488EE33498F9}"/>
+                <a16:creationId xmlns="" xmlns:a16="http://schemas.microsoft.com/office/drawing/2014/main" id="{434AA4A3-C334-3AC4-9B25-488EE33498F9}"/>
               </a:ext>
             </a:extLst>
           </p:cNvPr>
@@ -1033,7 +1033,7 @@
           <p:cNvPr id="2" name="Title 1">
             <a:extLst>
               <a:ext uri="{FF2B5EF4-FFF2-40B4-BE49-F238E27FC236}">
-                <a16:creationId xmlns:a16="http://schemas.microsoft.com/office/drawing/2014/main" id="{E0EB8136-4330-4480-80D9-0F6FD970617C}"/>
+                <a16:creationId xmlns="" xmlns:a16="http://schemas.microsoft.com/office/drawing/2014/main" id="{E0EB8136-4330-4480-80D9-0F6FD970617C}"/>
               </a:ext>
             </a:extLst>
           </p:cNvPr>
@@ -1072,7 +1072,7 @@
           <p:cNvPr id="3" name="Subtitle 2">
             <a:extLst>
               <a:ext uri="{FF2B5EF4-FFF2-40B4-BE49-F238E27FC236}">
-                <a16:creationId xmlns:a16="http://schemas.microsoft.com/office/drawing/2014/main" id="{566E5739-DD96-45FB-B609-3E3447A52FED}"/>
+                <a16:creationId xmlns="" xmlns:a16="http://schemas.microsoft.com/office/drawing/2014/main" id="{566E5739-DD96-45FB-B609-3E3447A52FED}"/>
               </a:ext>
             </a:extLst>
           </p:cNvPr>
@@ -1144,7 +1144,7 @@
           <p:cNvPr id="4" name="Date Placeholder 3">
             <a:extLst>
               <a:ext uri="{FF2B5EF4-FFF2-40B4-BE49-F238E27FC236}">
-                <a16:creationId xmlns:a16="http://schemas.microsoft.com/office/drawing/2014/main" id="{1B9FF558-51F9-42A2-9944-DBE23DA8B224}"/>
+                <a16:creationId xmlns="" xmlns:a16="http://schemas.microsoft.com/office/drawing/2014/main" id="{1B9FF558-51F9-42A2-9944-DBE23DA8B224}"/>
               </a:ext>
             </a:extLst>
           </p:cNvPr>
@@ -1167,7 +1167,7 @@
           <a:p>
             <a:fld id="{02AC24A9-CCB6-4F8D-B8DB-C2F3692CFA5A}" type="datetimeFigureOut">
               <a:rPr lang="en-US" smtClean="0"/>
-              <a:t>1/31/2025</a:t>
+              <a:t>2/10/2026</a:t>
             </a:fld>
             <a:endParaRPr lang="en-US" dirty="0"/>
           </a:p>
@@ -1178,7 +1178,7 @@
           <p:cNvPr id="5" name="Footer Placeholder 4">
             <a:extLst>
               <a:ext uri="{FF2B5EF4-FFF2-40B4-BE49-F238E27FC236}">
-                <a16:creationId xmlns:a16="http://schemas.microsoft.com/office/drawing/2014/main" id="{8B8C0E86-A7F7-4BDC-A637-254E5252DED5}"/>
+                <a16:creationId xmlns="" xmlns:a16="http://schemas.microsoft.com/office/drawing/2014/main" id="{8B8C0E86-A7F7-4BDC-A637-254E5252DED5}"/>
               </a:ext>
             </a:extLst>
           </p:cNvPr>
@@ -1203,7 +1203,7 @@
           <p:cNvPr id="6" name="Slide Number Placeholder 5">
             <a:extLst>
               <a:ext uri="{FF2B5EF4-FFF2-40B4-BE49-F238E27FC236}">
-                <a16:creationId xmlns:a16="http://schemas.microsoft.com/office/drawing/2014/main" id="{C3D10ADE-E9DA-4E57-BF57-1CCB65219839}"/>
+                <a16:creationId xmlns="" xmlns:a16="http://schemas.microsoft.com/office/drawing/2014/main" id="{C3D10ADE-E9DA-4E57-BF57-1CCB65219839}"/>
               </a:ext>
             </a:extLst>
           </p:cNvPr>
@@ -1237,7 +1237,7 @@
           <p:cNvPr id="8" name="Rectangle 7">
             <a:extLst>
               <a:ext uri="{FF2B5EF4-FFF2-40B4-BE49-F238E27FC236}">
-                <a16:creationId xmlns:a16="http://schemas.microsoft.com/office/drawing/2014/main" id="{8D06CE56-3881-4ADA-8CEF-D18B02C242A3}"/>
+                <a16:creationId xmlns="" xmlns:a16="http://schemas.microsoft.com/office/drawing/2014/main" id="{8D06CE56-3881-4ADA-8CEF-D18B02C242A3}"/>
               </a:ext>
             </a:extLst>
           </p:cNvPr>
@@ -1318,7 +1318,7 @@
           <p:cNvPr id="10" name="Rectangle 9">
             <a:extLst>
               <a:ext uri="{FF2B5EF4-FFF2-40B4-BE49-F238E27FC236}">
-                <a16:creationId xmlns:a16="http://schemas.microsoft.com/office/drawing/2014/main" id="{79F3C543-62EC-4433-9C93-A2CD8764E9B4}"/>
+                <a16:creationId xmlns="" xmlns:a16="http://schemas.microsoft.com/office/drawing/2014/main" id="{79F3C543-62EC-4433-9C93-A2CD8764E9B4}"/>
               </a:ext>
             </a:extLst>
           </p:cNvPr>
@@ -1433,7 +1433,7 @@
           <p:cNvPr id="2" name="Title 1">
             <a:extLst>
               <a:ext uri="{FF2B5EF4-FFF2-40B4-BE49-F238E27FC236}">
-                <a16:creationId xmlns:a16="http://schemas.microsoft.com/office/drawing/2014/main" id="{90B32C18-E430-4EC7-BD7C-99D86D012231}"/>
+                <a16:creationId xmlns="" xmlns:a16="http://schemas.microsoft.com/office/drawing/2014/main" id="{90B32C18-E430-4EC7-BD7C-99D86D012231}"/>
               </a:ext>
             </a:extLst>
           </p:cNvPr>
@@ -1462,7 +1462,7 @@
           <p:cNvPr id="3" name="Vertical Text Placeholder 2">
             <a:extLst>
               <a:ext uri="{FF2B5EF4-FFF2-40B4-BE49-F238E27FC236}">
-                <a16:creationId xmlns:a16="http://schemas.microsoft.com/office/drawing/2014/main" id="{8FC5012F-7119-4D94-9717-3862E1C9384E}"/>
+                <a16:creationId xmlns="" xmlns:a16="http://schemas.microsoft.com/office/drawing/2014/main" id="{8FC5012F-7119-4D94-9717-3862E1C9384E}"/>
               </a:ext>
             </a:extLst>
           </p:cNvPr>
@@ -1519,7 +1519,7 @@
           <p:cNvPr id="4" name="Date Placeholder 3">
             <a:extLst>
               <a:ext uri="{FF2B5EF4-FFF2-40B4-BE49-F238E27FC236}">
-                <a16:creationId xmlns:a16="http://schemas.microsoft.com/office/drawing/2014/main" id="{19ED9A4A-D287-4207-9037-70DB007A1707}"/>
+                <a16:creationId xmlns="" xmlns:a16="http://schemas.microsoft.com/office/drawing/2014/main" id="{19ED9A4A-D287-4207-9037-70DB007A1707}"/>
               </a:ext>
             </a:extLst>
           </p:cNvPr>
@@ -1537,7 +1537,7 @@
           <a:p>
             <a:fld id="{02AC24A9-CCB6-4F8D-B8DB-C2F3692CFA5A}" type="datetimeFigureOut">
               <a:rPr lang="en-US" smtClean="0"/>
-              <a:t>1/31/2025</a:t>
+              <a:t>2/10/2026</a:t>
             </a:fld>
             <a:endParaRPr lang="en-US"/>
           </a:p>
@@ -1548,7 +1548,7 @@
           <p:cNvPr id="5" name="Footer Placeholder 4">
             <a:extLst>
               <a:ext uri="{FF2B5EF4-FFF2-40B4-BE49-F238E27FC236}">
-                <a16:creationId xmlns:a16="http://schemas.microsoft.com/office/drawing/2014/main" id="{61ECFCAC-80DB-43BB-B3F1-AC22BACEE360}"/>
+                <a16:creationId xmlns="" xmlns:a16="http://schemas.microsoft.com/office/drawing/2014/main" id="{61ECFCAC-80DB-43BB-B3F1-AC22BACEE360}"/>
               </a:ext>
             </a:extLst>
           </p:cNvPr>
@@ -1573,7 +1573,7 @@
           <p:cNvPr id="6" name="Slide Number Placeholder 5">
             <a:extLst>
               <a:ext uri="{FF2B5EF4-FFF2-40B4-BE49-F238E27FC236}">
-                <a16:creationId xmlns:a16="http://schemas.microsoft.com/office/drawing/2014/main" id="{D7679730-3487-4D94-A0DC-C21684963AB3}"/>
+                <a16:creationId xmlns="" xmlns:a16="http://schemas.microsoft.com/office/drawing/2014/main" id="{D7679730-3487-4D94-A0DC-C21684963AB3}"/>
               </a:ext>
             </a:extLst>
           </p:cNvPr>
@@ -1632,7 +1632,7 @@
           <p:cNvPr id="2" name="Vertical Title 1">
             <a:extLst>
               <a:ext uri="{FF2B5EF4-FFF2-40B4-BE49-F238E27FC236}">
-                <a16:creationId xmlns:a16="http://schemas.microsoft.com/office/drawing/2014/main" id="{B543C89D-929E-4CD1-BCCC-72A14C0335D6}"/>
+                <a16:creationId xmlns="" xmlns:a16="http://schemas.microsoft.com/office/drawing/2014/main" id="{B543C89D-929E-4CD1-BCCC-72A14C0335D6}"/>
               </a:ext>
             </a:extLst>
           </p:cNvPr>
@@ -1666,7 +1666,7 @@
           <p:cNvPr id="3" name="Vertical Text Placeholder 2">
             <a:extLst>
               <a:ext uri="{FF2B5EF4-FFF2-40B4-BE49-F238E27FC236}">
-                <a16:creationId xmlns:a16="http://schemas.microsoft.com/office/drawing/2014/main" id="{FED450EA-A577-4B76-A12F-650BEB20FD8D}"/>
+                <a16:creationId xmlns="" xmlns:a16="http://schemas.microsoft.com/office/drawing/2014/main" id="{FED450EA-A577-4B76-A12F-650BEB20FD8D}"/>
               </a:ext>
             </a:extLst>
           </p:cNvPr>
@@ -1728,7 +1728,7 @@
           <p:cNvPr id="4" name="Date Placeholder 3">
             <a:extLst>
               <a:ext uri="{FF2B5EF4-FFF2-40B4-BE49-F238E27FC236}">
-                <a16:creationId xmlns:a16="http://schemas.microsoft.com/office/drawing/2014/main" id="{41D2603B-9ACE-4FA9-805B-9B91EB63DF7D}"/>
+                <a16:creationId xmlns="" xmlns:a16="http://schemas.microsoft.com/office/drawing/2014/main" id="{41D2603B-9ACE-4FA9-805B-9B91EB63DF7D}"/>
               </a:ext>
             </a:extLst>
           </p:cNvPr>
@@ -1746,7 +1746,7 @@
           <a:p>
             <a:fld id="{02AC24A9-CCB6-4F8D-B8DB-C2F3692CFA5A}" type="datetimeFigureOut">
               <a:rPr lang="en-US" smtClean="0"/>
-              <a:t>1/31/2025</a:t>
+              <a:t>2/10/2026</a:t>
             </a:fld>
             <a:endParaRPr lang="en-US"/>
           </a:p>
@@ -1757,7 +1757,7 @@
           <p:cNvPr id="5" name="Footer Placeholder 4">
             <a:extLst>
               <a:ext uri="{FF2B5EF4-FFF2-40B4-BE49-F238E27FC236}">
-                <a16:creationId xmlns:a16="http://schemas.microsoft.com/office/drawing/2014/main" id="{7ECE18AC-D6A9-4A61-885D-68E2B684A438}"/>
+                <a16:creationId xmlns="" xmlns:a16="http://schemas.microsoft.com/office/drawing/2014/main" id="{7ECE18AC-D6A9-4A61-885D-68E2B684A438}"/>
               </a:ext>
             </a:extLst>
           </p:cNvPr>
@@ -1782,7 +1782,7 @@
           <p:cNvPr id="6" name="Slide Number Placeholder 5">
             <a:extLst>
               <a:ext uri="{FF2B5EF4-FFF2-40B4-BE49-F238E27FC236}">
-                <a16:creationId xmlns:a16="http://schemas.microsoft.com/office/drawing/2014/main" id="{75197AE4-AA47-4E14-8FFE-171FAE47F49E}"/>
+                <a16:creationId xmlns="" xmlns:a16="http://schemas.microsoft.com/office/drawing/2014/main" id="{75197AE4-AA47-4E14-8FFE-171FAE47F49E}"/>
               </a:ext>
             </a:extLst>
           </p:cNvPr>
@@ -1841,7 +1841,7 @@
           <p:cNvPr id="8" name="Rectangle 7">
             <a:extLst>
               <a:ext uri="{FF2B5EF4-FFF2-40B4-BE49-F238E27FC236}">
-                <a16:creationId xmlns:a16="http://schemas.microsoft.com/office/drawing/2014/main" id="{2D6FBB9D-1CAA-4D05-AB33-BABDFE17B843}"/>
+                <a16:creationId xmlns="" xmlns:a16="http://schemas.microsoft.com/office/drawing/2014/main" id="{2D6FBB9D-1CAA-4D05-AB33-BABDFE17B843}"/>
               </a:ext>
             </a:extLst>
           </p:cNvPr>
@@ -1932,7 +1932,7 @@
           <p:cNvPr id="10" name="Rectangle 9">
             <a:extLst>
               <a:ext uri="{FF2B5EF4-FFF2-40B4-BE49-F238E27FC236}">
-                <a16:creationId xmlns:a16="http://schemas.microsoft.com/office/drawing/2014/main" id="{04727B71-B4B6-4823-80A1-68C40B475118}"/>
+                <a16:creationId xmlns="" xmlns:a16="http://schemas.microsoft.com/office/drawing/2014/main" id="{04727B71-B4B6-4823-80A1-68C40B475118}"/>
               </a:ext>
             </a:extLst>
           </p:cNvPr>
@@ -2011,7 +2011,7 @@
           <p:cNvPr id="12" name="Rectangle 11">
             <a:extLst>
               <a:ext uri="{FF2B5EF4-FFF2-40B4-BE49-F238E27FC236}">
-                <a16:creationId xmlns:a16="http://schemas.microsoft.com/office/drawing/2014/main" id="{79A6DB05-9FB5-4B07-8675-74C23D4FD89D}"/>
+                <a16:creationId xmlns="" xmlns:a16="http://schemas.microsoft.com/office/drawing/2014/main" id="{79A6DB05-9FB5-4B07-8675-74C23D4FD89D}"/>
               </a:ext>
             </a:extLst>
           </p:cNvPr>
@@ -2092,7 +2092,7 @@
           <p:cNvPr id="2" name="Title 1">
             <a:extLst>
               <a:ext uri="{FF2B5EF4-FFF2-40B4-BE49-F238E27FC236}">
-                <a16:creationId xmlns:a16="http://schemas.microsoft.com/office/drawing/2014/main" id="{48D358CF-0758-490A-A084-C46443B9ABE8}"/>
+                <a16:creationId xmlns="" xmlns:a16="http://schemas.microsoft.com/office/drawing/2014/main" id="{48D358CF-0758-490A-A084-C46443B9ABE8}"/>
               </a:ext>
             </a:extLst>
           </p:cNvPr>
@@ -2131,7 +2131,7 @@
           <p:cNvPr id="3" name="Content Placeholder 2">
             <a:extLst>
               <a:ext uri="{FF2B5EF4-FFF2-40B4-BE49-F238E27FC236}">
-                <a16:creationId xmlns:a16="http://schemas.microsoft.com/office/drawing/2014/main" id="{21671183-B3CE-4F45-92FB-98290CA0E2CA}"/>
+                <a16:creationId xmlns="" xmlns:a16="http://schemas.microsoft.com/office/drawing/2014/main" id="{21671183-B3CE-4F45-92FB-98290CA0E2CA}"/>
               </a:ext>
             </a:extLst>
           </p:cNvPr>
@@ -2193,7 +2193,7 @@
           <p:cNvPr id="4" name="Date Placeholder 3">
             <a:extLst>
               <a:ext uri="{FF2B5EF4-FFF2-40B4-BE49-F238E27FC236}">
-                <a16:creationId xmlns:a16="http://schemas.microsoft.com/office/drawing/2014/main" id="{3D7DED67-27EC-4D43-A21C-093C1DB04813}"/>
+                <a16:creationId xmlns="" xmlns:a16="http://schemas.microsoft.com/office/drawing/2014/main" id="{3D7DED67-27EC-4D43-A21C-093C1DB04813}"/>
               </a:ext>
             </a:extLst>
           </p:cNvPr>
@@ -2216,7 +2216,7 @@
           <a:p>
             <a:fld id="{02AC24A9-CCB6-4F8D-B8DB-C2F3692CFA5A}" type="datetimeFigureOut">
               <a:rPr lang="en-US" smtClean="0"/>
-              <a:t>1/31/2025</a:t>
+              <a:t>2/10/2026</a:t>
             </a:fld>
             <a:endParaRPr lang="en-US"/>
           </a:p>
@@ -2227,7 +2227,7 @@
           <p:cNvPr id="5" name="Footer Placeholder 4">
             <a:extLst>
               <a:ext uri="{FF2B5EF4-FFF2-40B4-BE49-F238E27FC236}">
-                <a16:creationId xmlns:a16="http://schemas.microsoft.com/office/drawing/2014/main" id="{36747CE3-4890-4BC1-94DB-5D49D02C9933}"/>
+                <a16:creationId xmlns="" xmlns:a16="http://schemas.microsoft.com/office/drawing/2014/main" id="{36747CE3-4890-4BC1-94DB-5D49D02C9933}"/>
               </a:ext>
             </a:extLst>
           </p:cNvPr>
@@ -2252,7 +2252,7 @@
           <p:cNvPr id="6" name="Slide Number Placeholder 5">
             <a:extLst>
               <a:ext uri="{FF2B5EF4-FFF2-40B4-BE49-F238E27FC236}">
-                <a16:creationId xmlns:a16="http://schemas.microsoft.com/office/drawing/2014/main" id="{093C5AD3-D79A-4D46-B25B-822FE0252511}"/>
+                <a16:creationId xmlns="" xmlns:a16="http://schemas.microsoft.com/office/drawing/2014/main" id="{093C5AD3-D79A-4D46-B25B-822FE0252511}"/>
               </a:ext>
             </a:extLst>
           </p:cNvPr>
@@ -2316,7 +2316,7 @@
           <p:cNvPr id="8" name="Rectangle 7">
             <a:extLst>
               <a:ext uri="{FF2B5EF4-FFF2-40B4-BE49-F238E27FC236}">
-                <a16:creationId xmlns:a16="http://schemas.microsoft.com/office/drawing/2014/main" id="{85AEDC5C-2E87-49C6-AB07-A95E5F39ED8E}"/>
+                <a16:creationId xmlns="" xmlns:a16="http://schemas.microsoft.com/office/drawing/2014/main" id="{85AEDC5C-2E87-49C6-AB07-A95E5F39ED8E}"/>
               </a:ext>
             </a:extLst>
           </p:cNvPr>
@@ -2407,7 +2407,7 @@
           <p:cNvPr id="10" name="Rectangle 9">
             <a:extLst>
               <a:ext uri="{FF2B5EF4-FFF2-40B4-BE49-F238E27FC236}">
-                <a16:creationId xmlns:a16="http://schemas.microsoft.com/office/drawing/2014/main" id="{A57D88DE-E462-4C8A-BF99-609390DFB781}"/>
+                <a16:creationId xmlns="" xmlns:a16="http://schemas.microsoft.com/office/drawing/2014/main" id="{A57D88DE-E462-4C8A-BF99-609390DFB781}"/>
               </a:ext>
             </a:extLst>
           </p:cNvPr>
@@ -2488,7 +2488,7 @@
           <p:cNvPr id="2" name="Title 1">
             <a:extLst>
               <a:ext uri="{FF2B5EF4-FFF2-40B4-BE49-F238E27FC236}">
-                <a16:creationId xmlns:a16="http://schemas.microsoft.com/office/drawing/2014/main" id="{B8E44900-E8BF-4B12-8BCB-41076E2B68C7}"/>
+                <a16:creationId xmlns="" xmlns:a16="http://schemas.microsoft.com/office/drawing/2014/main" id="{B8E44900-E8BF-4B12-8BCB-41076E2B68C7}"/>
               </a:ext>
             </a:extLst>
           </p:cNvPr>
@@ -2527,7 +2527,7 @@
           <p:cNvPr id="3" name="Text Placeholder 2">
             <a:extLst>
               <a:ext uri="{FF2B5EF4-FFF2-40B4-BE49-F238E27FC236}">
-                <a16:creationId xmlns:a16="http://schemas.microsoft.com/office/drawing/2014/main" id="{917741F9-B00F-4463-A257-6B66DABD9B4E}"/>
+                <a16:creationId xmlns="" xmlns:a16="http://schemas.microsoft.com/office/drawing/2014/main" id="{917741F9-B00F-4463-A257-6B66DABD9B4E}"/>
               </a:ext>
             </a:extLst>
           </p:cNvPr>
@@ -2652,7 +2652,7 @@
           <p:cNvPr id="4" name="Date Placeholder 3">
             <a:extLst>
               <a:ext uri="{FF2B5EF4-FFF2-40B4-BE49-F238E27FC236}">
-                <a16:creationId xmlns:a16="http://schemas.microsoft.com/office/drawing/2014/main" id="{D48BFA7D-4401-4285-802B-1579165F0D6D}"/>
+                <a16:creationId xmlns="" xmlns:a16="http://schemas.microsoft.com/office/drawing/2014/main" id="{D48BFA7D-4401-4285-802B-1579165F0D6D}"/>
               </a:ext>
             </a:extLst>
           </p:cNvPr>
@@ -2670,7 +2670,7 @@
           <a:p>
             <a:fld id="{02AC24A9-CCB6-4F8D-B8DB-C2F3692CFA5A}" type="datetimeFigureOut">
               <a:rPr lang="en-US" smtClean="0"/>
-              <a:t>1/31/2025</a:t>
+              <a:t>2/10/2026</a:t>
             </a:fld>
             <a:endParaRPr lang="en-US"/>
           </a:p>
@@ -2681,7 +2681,7 @@
           <p:cNvPr id="5" name="Footer Placeholder 4">
             <a:extLst>
               <a:ext uri="{FF2B5EF4-FFF2-40B4-BE49-F238E27FC236}">
-                <a16:creationId xmlns:a16="http://schemas.microsoft.com/office/drawing/2014/main" id="{49A909C5-AA19-4195-8376-9002D5DF4651}"/>
+                <a16:creationId xmlns="" xmlns:a16="http://schemas.microsoft.com/office/drawing/2014/main" id="{49A909C5-AA19-4195-8376-9002D5DF4651}"/>
               </a:ext>
             </a:extLst>
           </p:cNvPr>
@@ -2706,7 +2706,7 @@
           <p:cNvPr id="6" name="Slide Number Placeholder 5">
             <a:extLst>
               <a:ext uri="{FF2B5EF4-FFF2-40B4-BE49-F238E27FC236}">
-                <a16:creationId xmlns:a16="http://schemas.microsoft.com/office/drawing/2014/main" id="{53AC3F32-46E0-47C8-8565-5969A475FDB0}"/>
+                <a16:creationId xmlns="" xmlns:a16="http://schemas.microsoft.com/office/drawing/2014/main" id="{53AC3F32-46E0-47C8-8565-5969A475FDB0}"/>
               </a:ext>
             </a:extLst>
           </p:cNvPr>
@@ -2765,7 +2765,7 @@
           <p:cNvPr id="9" name="Rectangle 8">
             <a:extLst>
               <a:ext uri="{FF2B5EF4-FFF2-40B4-BE49-F238E27FC236}">
-                <a16:creationId xmlns:a16="http://schemas.microsoft.com/office/drawing/2014/main" id="{2076262E-36A0-40C6-ADE6-90CD9FB9B9EA}"/>
+                <a16:creationId xmlns="" xmlns:a16="http://schemas.microsoft.com/office/drawing/2014/main" id="{2076262E-36A0-40C6-ADE6-90CD9FB9B9EA}"/>
               </a:ext>
             </a:extLst>
           </p:cNvPr>
@@ -2856,7 +2856,7 @@
           <p:cNvPr id="11" name="Rectangle 10">
             <a:extLst>
               <a:ext uri="{FF2B5EF4-FFF2-40B4-BE49-F238E27FC236}">
-                <a16:creationId xmlns:a16="http://schemas.microsoft.com/office/drawing/2014/main" id="{42677A9B-4D1D-4D80-912C-24570140A650}"/>
+                <a16:creationId xmlns="" xmlns:a16="http://schemas.microsoft.com/office/drawing/2014/main" id="{42677A9B-4D1D-4D80-912C-24570140A650}"/>
               </a:ext>
             </a:extLst>
           </p:cNvPr>
@@ -2935,7 +2935,7 @@
           <p:cNvPr id="13" name="Rectangle 12">
             <a:extLst>
               <a:ext uri="{FF2B5EF4-FFF2-40B4-BE49-F238E27FC236}">
-                <a16:creationId xmlns:a16="http://schemas.microsoft.com/office/drawing/2014/main" id="{03DC8C98-510F-48C9-82B2-9E4F760A68DF}"/>
+                <a16:creationId xmlns="" xmlns:a16="http://schemas.microsoft.com/office/drawing/2014/main" id="{03DC8C98-510F-48C9-82B2-9E4F760A68DF}"/>
               </a:ext>
             </a:extLst>
           </p:cNvPr>
@@ -3016,7 +3016,7 @@
           <p:cNvPr id="2" name="Title 1">
             <a:extLst>
               <a:ext uri="{FF2B5EF4-FFF2-40B4-BE49-F238E27FC236}">
-                <a16:creationId xmlns:a16="http://schemas.microsoft.com/office/drawing/2014/main" id="{17A078AE-0BC3-48F9-87EC-2DB0CCE7E2AE}"/>
+                <a16:creationId xmlns="" xmlns:a16="http://schemas.microsoft.com/office/drawing/2014/main" id="{17A078AE-0BC3-48F9-87EC-2DB0CCE7E2AE}"/>
               </a:ext>
             </a:extLst>
           </p:cNvPr>
@@ -3055,7 +3055,7 @@
           <p:cNvPr id="3" name="Content Placeholder 2">
             <a:extLst>
               <a:ext uri="{FF2B5EF4-FFF2-40B4-BE49-F238E27FC236}">
-                <a16:creationId xmlns:a16="http://schemas.microsoft.com/office/drawing/2014/main" id="{292A20DF-0829-4336-B59F-FF9D7AA9D8B6}"/>
+                <a16:creationId xmlns="" xmlns:a16="http://schemas.microsoft.com/office/drawing/2014/main" id="{292A20DF-0829-4336-B59F-FF9D7AA9D8B6}"/>
               </a:ext>
             </a:extLst>
           </p:cNvPr>
@@ -3117,7 +3117,7 @@
           <p:cNvPr id="4" name="Content Placeholder 3">
             <a:extLst>
               <a:ext uri="{FF2B5EF4-FFF2-40B4-BE49-F238E27FC236}">
-                <a16:creationId xmlns:a16="http://schemas.microsoft.com/office/drawing/2014/main" id="{7935D01C-CF67-4DF6-B96C-FFC9D5BF847B}"/>
+                <a16:creationId xmlns="" xmlns:a16="http://schemas.microsoft.com/office/drawing/2014/main" id="{7935D01C-CF67-4DF6-B96C-FFC9D5BF847B}"/>
               </a:ext>
             </a:extLst>
           </p:cNvPr>
@@ -3179,7 +3179,7 @@
           <p:cNvPr id="5" name="Date Placeholder 4">
             <a:extLst>
               <a:ext uri="{FF2B5EF4-FFF2-40B4-BE49-F238E27FC236}">
-                <a16:creationId xmlns:a16="http://schemas.microsoft.com/office/drawing/2014/main" id="{29BBD797-6031-4F82-8726-EAB757027FF5}"/>
+                <a16:creationId xmlns="" xmlns:a16="http://schemas.microsoft.com/office/drawing/2014/main" id="{29BBD797-6031-4F82-8726-EAB757027FF5}"/>
               </a:ext>
             </a:extLst>
           </p:cNvPr>
@@ -3202,7 +3202,7 @@
           <a:p>
             <a:fld id="{02AC24A9-CCB6-4F8D-B8DB-C2F3692CFA5A}" type="datetimeFigureOut">
               <a:rPr lang="en-US" smtClean="0"/>
-              <a:t>1/31/2025</a:t>
+              <a:t>2/10/2026</a:t>
             </a:fld>
             <a:endParaRPr lang="en-US"/>
           </a:p>
@@ -3213,7 +3213,7 @@
           <p:cNvPr id="6" name="Footer Placeholder 5">
             <a:extLst>
               <a:ext uri="{FF2B5EF4-FFF2-40B4-BE49-F238E27FC236}">
-                <a16:creationId xmlns:a16="http://schemas.microsoft.com/office/drawing/2014/main" id="{76B3F71C-B897-4909-A75E-8716AD49C156}"/>
+                <a16:creationId xmlns="" xmlns:a16="http://schemas.microsoft.com/office/drawing/2014/main" id="{76B3F71C-B897-4909-A75E-8716AD49C156}"/>
               </a:ext>
             </a:extLst>
           </p:cNvPr>
@@ -3238,7 +3238,7 @@
           <p:cNvPr id="7" name="Slide Number Placeholder 6">
             <a:extLst>
               <a:ext uri="{FF2B5EF4-FFF2-40B4-BE49-F238E27FC236}">
-                <a16:creationId xmlns:a16="http://schemas.microsoft.com/office/drawing/2014/main" id="{4F78BC14-5BB1-405F-A6F3-C07230F085C8}"/>
+                <a16:creationId xmlns="" xmlns:a16="http://schemas.microsoft.com/office/drawing/2014/main" id="{4F78BC14-5BB1-405F-A6F3-C07230F085C8}"/>
               </a:ext>
             </a:extLst>
           </p:cNvPr>
@@ -3302,7 +3302,7 @@
           <p:cNvPr id="11" name="Rectangle 10">
             <a:extLst>
               <a:ext uri="{FF2B5EF4-FFF2-40B4-BE49-F238E27FC236}">
-                <a16:creationId xmlns:a16="http://schemas.microsoft.com/office/drawing/2014/main" id="{6B671BDE-E45C-41A1-9B98-4A607D703855}"/>
+                <a16:creationId xmlns="" xmlns:a16="http://schemas.microsoft.com/office/drawing/2014/main" id="{6B671BDE-E45C-41A1-9B98-4A607D703855}"/>
               </a:ext>
             </a:extLst>
           </p:cNvPr>
@@ -3393,7 +3393,7 @@
           <p:cNvPr id="13" name="Rectangle 12">
             <a:extLst>
               <a:ext uri="{FF2B5EF4-FFF2-40B4-BE49-F238E27FC236}">
-                <a16:creationId xmlns:a16="http://schemas.microsoft.com/office/drawing/2014/main" id="{299500CE-917A-4D03-A7DF-71D8EBBC1537}"/>
+                <a16:creationId xmlns="" xmlns:a16="http://schemas.microsoft.com/office/drawing/2014/main" id="{299500CE-917A-4D03-A7DF-71D8EBBC1537}"/>
               </a:ext>
             </a:extLst>
           </p:cNvPr>
@@ -3472,7 +3472,7 @@
           <p:cNvPr id="15" name="Rectangle 14">
             <a:extLst>
               <a:ext uri="{FF2B5EF4-FFF2-40B4-BE49-F238E27FC236}">
-                <a16:creationId xmlns:a16="http://schemas.microsoft.com/office/drawing/2014/main" id="{C3D0D377-28B0-417D-886B-9483AF064975}"/>
+                <a16:creationId xmlns="" xmlns:a16="http://schemas.microsoft.com/office/drawing/2014/main" id="{C3D0D377-28B0-417D-886B-9483AF064975}"/>
               </a:ext>
             </a:extLst>
           </p:cNvPr>
@@ -3553,7 +3553,7 @@
           <p:cNvPr id="2" name="Title 1">
             <a:extLst>
               <a:ext uri="{FF2B5EF4-FFF2-40B4-BE49-F238E27FC236}">
-                <a16:creationId xmlns:a16="http://schemas.microsoft.com/office/drawing/2014/main" id="{0F8F91F8-0767-40B5-A3AA-72931FC192EA}"/>
+                <a16:creationId xmlns="" xmlns:a16="http://schemas.microsoft.com/office/drawing/2014/main" id="{0F8F91F8-0767-40B5-A3AA-72931FC192EA}"/>
               </a:ext>
             </a:extLst>
           </p:cNvPr>
@@ -3592,7 +3592,7 @@
           <p:cNvPr id="3" name="Text Placeholder 2">
             <a:extLst>
               <a:ext uri="{FF2B5EF4-FFF2-40B4-BE49-F238E27FC236}">
-                <a16:creationId xmlns:a16="http://schemas.microsoft.com/office/drawing/2014/main" id="{AAAE0554-8BEE-4BF6-9519-51B8475D35E1}"/>
+                <a16:creationId xmlns="" xmlns:a16="http://schemas.microsoft.com/office/drawing/2014/main" id="{AAAE0554-8BEE-4BF6-9519-51B8475D35E1}"/>
               </a:ext>
             </a:extLst>
           </p:cNvPr>
@@ -3663,7 +3663,7 @@
           <p:cNvPr id="4" name="Content Placeholder 3">
             <a:extLst>
               <a:ext uri="{FF2B5EF4-FFF2-40B4-BE49-F238E27FC236}">
-                <a16:creationId xmlns:a16="http://schemas.microsoft.com/office/drawing/2014/main" id="{FD4A358D-C930-48E0-B372-06A826B74C47}"/>
+                <a16:creationId xmlns="" xmlns:a16="http://schemas.microsoft.com/office/drawing/2014/main" id="{FD4A358D-C930-48E0-B372-06A826B74C47}"/>
               </a:ext>
             </a:extLst>
           </p:cNvPr>
@@ -3735,7 +3735,7 @@
           <p:cNvPr id="5" name="Text Placeholder 4">
             <a:extLst>
               <a:ext uri="{FF2B5EF4-FFF2-40B4-BE49-F238E27FC236}">
-                <a16:creationId xmlns:a16="http://schemas.microsoft.com/office/drawing/2014/main" id="{83B6615E-4966-4150-83B6-C47591B36383}"/>
+                <a16:creationId xmlns="" xmlns:a16="http://schemas.microsoft.com/office/drawing/2014/main" id="{83B6615E-4966-4150-83B6-C47591B36383}"/>
               </a:ext>
             </a:extLst>
           </p:cNvPr>
@@ -3806,7 +3806,7 @@
           <p:cNvPr id="6" name="Content Placeholder 5">
             <a:extLst>
               <a:ext uri="{FF2B5EF4-FFF2-40B4-BE49-F238E27FC236}">
-                <a16:creationId xmlns:a16="http://schemas.microsoft.com/office/drawing/2014/main" id="{BD409F6B-C17B-4B4F-9F35-5068BDC4E2FD}"/>
+                <a16:creationId xmlns="" xmlns:a16="http://schemas.microsoft.com/office/drawing/2014/main" id="{BD409F6B-C17B-4B4F-9F35-5068BDC4E2FD}"/>
               </a:ext>
             </a:extLst>
           </p:cNvPr>
@@ -3878,7 +3878,7 @@
           <p:cNvPr id="7" name="Date Placeholder 6">
             <a:extLst>
               <a:ext uri="{FF2B5EF4-FFF2-40B4-BE49-F238E27FC236}">
-                <a16:creationId xmlns:a16="http://schemas.microsoft.com/office/drawing/2014/main" id="{C8BC356D-052B-4A9B-8B2F-6665FD325AB3}"/>
+                <a16:creationId xmlns="" xmlns:a16="http://schemas.microsoft.com/office/drawing/2014/main" id="{C8BC356D-052B-4A9B-8B2F-6665FD325AB3}"/>
               </a:ext>
             </a:extLst>
           </p:cNvPr>
@@ -3901,7 +3901,7 @@
           <a:p>
             <a:fld id="{02AC24A9-CCB6-4F8D-B8DB-C2F3692CFA5A}" type="datetimeFigureOut">
               <a:rPr lang="en-US" smtClean="0"/>
-              <a:t>1/31/2025</a:t>
+              <a:t>2/10/2026</a:t>
             </a:fld>
             <a:endParaRPr lang="en-US"/>
           </a:p>
@@ -3912,7 +3912,7 @@
           <p:cNvPr id="8" name="Footer Placeholder 7">
             <a:extLst>
               <a:ext uri="{FF2B5EF4-FFF2-40B4-BE49-F238E27FC236}">
-                <a16:creationId xmlns:a16="http://schemas.microsoft.com/office/drawing/2014/main" id="{69C5E5FA-26A9-467C-93E3-8476142D1D46}"/>
+                <a16:creationId xmlns="" xmlns:a16="http://schemas.microsoft.com/office/drawing/2014/main" id="{69C5E5FA-26A9-467C-93E3-8476142D1D46}"/>
               </a:ext>
             </a:extLst>
           </p:cNvPr>
@@ -3937,7 +3937,7 @@
           <p:cNvPr id="9" name="Slide Number Placeholder 8">
             <a:extLst>
               <a:ext uri="{FF2B5EF4-FFF2-40B4-BE49-F238E27FC236}">
-                <a16:creationId xmlns:a16="http://schemas.microsoft.com/office/drawing/2014/main" id="{D279E50C-1E40-4B48-871B-E392428D20A3}"/>
+                <a16:creationId xmlns="" xmlns:a16="http://schemas.microsoft.com/office/drawing/2014/main" id="{D279E50C-1E40-4B48-871B-E392428D20A3}"/>
               </a:ext>
             </a:extLst>
           </p:cNvPr>
@@ -4001,7 +4001,7 @@
           <p:cNvPr id="7" name="Rectangle 6">
             <a:extLst>
               <a:ext uri="{FF2B5EF4-FFF2-40B4-BE49-F238E27FC236}">
-                <a16:creationId xmlns:a16="http://schemas.microsoft.com/office/drawing/2014/main" id="{8C0689C4-0DB3-408B-A956-40326B4AE4C4}"/>
+                <a16:creationId xmlns="" xmlns:a16="http://schemas.microsoft.com/office/drawing/2014/main" id="{8C0689C4-0DB3-408B-A956-40326B4AE4C4}"/>
               </a:ext>
             </a:extLst>
           </p:cNvPr>
@@ -4092,7 +4092,7 @@
           <p:cNvPr id="9" name="Rectangle 8">
             <a:extLst>
               <a:ext uri="{FF2B5EF4-FFF2-40B4-BE49-F238E27FC236}">
-                <a16:creationId xmlns:a16="http://schemas.microsoft.com/office/drawing/2014/main" id="{56E1D10E-1C30-41BF-8C3B-C460C9B5597B}"/>
+                <a16:creationId xmlns="" xmlns:a16="http://schemas.microsoft.com/office/drawing/2014/main" id="{56E1D10E-1C30-41BF-8C3B-C460C9B5597B}"/>
               </a:ext>
             </a:extLst>
           </p:cNvPr>
@@ -4173,7 +4173,7 @@
           <p:cNvPr id="2" name="Title 1">
             <a:extLst>
               <a:ext uri="{FF2B5EF4-FFF2-40B4-BE49-F238E27FC236}">
-                <a16:creationId xmlns:a16="http://schemas.microsoft.com/office/drawing/2014/main" id="{779454F2-0EE5-4888-AF4C-82F825E6226E}"/>
+                <a16:creationId xmlns="" xmlns:a16="http://schemas.microsoft.com/office/drawing/2014/main" id="{779454F2-0EE5-4888-AF4C-82F825E6226E}"/>
               </a:ext>
             </a:extLst>
           </p:cNvPr>
@@ -4212,7 +4212,7 @@
           <p:cNvPr id="3" name="Date Placeholder 2">
             <a:extLst>
               <a:ext uri="{FF2B5EF4-FFF2-40B4-BE49-F238E27FC236}">
-                <a16:creationId xmlns:a16="http://schemas.microsoft.com/office/drawing/2014/main" id="{67C91241-A315-4643-91E5-CF2C25CC903A}"/>
+                <a16:creationId xmlns="" xmlns:a16="http://schemas.microsoft.com/office/drawing/2014/main" id="{67C91241-A315-4643-91E5-CF2C25CC903A}"/>
               </a:ext>
             </a:extLst>
           </p:cNvPr>
@@ -4230,7 +4230,7 @@
           <a:p>
             <a:fld id="{02AC24A9-CCB6-4F8D-B8DB-C2F3692CFA5A}" type="datetimeFigureOut">
               <a:rPr lang="en-US" smtClean="0"/>
-              <a:t>1/31/2025</a:t>
+              <a:t>2/10/2026</a:t>
             </a:fld>
             <a:endParaRPr lang="en-US"/>
           </a:p>
@@ -4241,7 +4241,7 @@
           <p:cNvPr id="4" name="Footer Placeholder 3">
             <a:extLst>
               <a:ext uri="{FF2B5EF4-FFF2-40B4-BE49-F238E27FC236}">
-                <a16:creationId xmlns:a16="http://schemas.microsoft.com/office/drawing/2014/main" id="{22706D86-5479-487D-94C8-76093D84F377}"/>
+                <a16:creationId xmlns="" xmlns:a16="http://schemas.microsoft.com/office/drawing/2014/main" id="{22706D86-5479-487D-94C8-76093D84F377}"/>
               </a:ext>
             </a:extLst>
           </p:cNvPr>
@@ -4266,7 +4266,7 @@
           <p:cNvPr id="5" name="Slide Number Placeholder 4">
             <a:extLst>
               <a:ext uri="{FF2B5EF4-FFF2-40B4-BE49-F238E27FC236}">
-                <a16:creationId xmlns:a16="http://schemas.microsoft.com/office/drawing/2014/main" id="{A7739411-CED6-43D4-868D-A65C4161A72B}"/>
+                <a16:creationId xmlns="" xmlns:a16="http://schemas.microsoft.com/office/drawing/2014/main" id="{A7739411-CED6-43D4-868D-A65C4161A72B}"/>
               </a:ext>
             </a:extLst>
           </p:cNvPr>
@@ -4325,7 +4325,7 @@
           <p:cNvPr id="2" name="Date Placeholder 1">
             <a:extLst>
               <a:ext uri="{FF2B5EF4-FFF2-40B4-BE49-F238E27FC236}">
-                <a16:creationId xmlns:a16="http://schemas.microsoft.com/office/drawing/2014/main" id="{EAC447E0-1D4D-4EF2-B81B-4B2400EE3EDB}"/>
+                <a16:creationId xmlns="" xmlns:a16="http://schemas.microsoft.com/office/drawing/2014/main" id="{EAC447E0-1D4D-4EF2-B81B-4B2400EE3EDB}"/>
               </a:ext>
             </a:extLst>
           </p:cNvPr>
@@ -4343,7 +4343,7 @@
           <a:p>
             <a:fld id="{02AC24A9-CCB6-4F8D-B8DB-C2F3692CFA5A}" type="datetimeFigureOut">
               <a:rPr lang="en-US" smtClean="0"/>
-              <a:t>1/31/2025</a:t>
+              <a:t>2/10/2026</a:t>
             </a:fld>
             <a:endParaRPr lang="en-US"/>
           </a:p>
@@ -4354,7 +4354,7 @@
           <p:cNvPr id="3" name="Footer Placeholder 2">
             <a:extLst>
               <a:ext uri="{FF2B5EF4-FFF2-40B4-BE49-F238E27FC236}">
-                <a16:creationId xmlns:a16="http://schemas.microsoft.com/office/drawing/2014/main" id="{C9984CA0-2A78-4600-9F3D-19B09E790FE8}"/>
+                <a16:creationId xmlns="" xmlns:a16="http://schemas.microsoft.com/office/drawing/2014/main" id="{C9984CA0-2A78-4600-9F3D-19B09E790FE8}"/>
               </a:ext>
             </a:extLst>
           </p:cNvPr>
@@ -4379,7 +4379,7 @@
           <p:cNvPr id="4" name="Slide Number Placeholder 3">
             <a:extLst>
               <a:ext uri="{FF2B5EF4-FFF2-40B4-BE49-F238E27FC236}">
-                <a16:creationId xmlns:a16="http://schemas.microsoft.com/office/drawing/2014/main" id="{38440955-B18E-49D3-AE7B-B331200E34C5}"/>
+                <a16:creationId xmlns="" xmlns:a16="http://schemas.microsoft.com/office/drawing/2014/main" id="{38440955-B18E-49D3-AE7B-B331200E34C5}"/>
               </a:ext>
             </a:extLst>
           </p:cNvPr>
@@ -4438,7 +4438,7 @@
           <p:cNvPr id="9" name="Rectangle 8">
             <a:extLst>
               <a:ext uri="{FF2B5EF4-FFF2-40B4-BE49-F238E27FC236}">
-                <a16:creationId xmlns:a16="http://schemas.microsoft.com/office/drawing/2014/main" id="{1FA417FE-CD1A-486F-A4AC-E4000A2FB18E}"/>
+                <a16:creationId xmlns="" xmlns:a16="http://schemas.microsoft.com/office/drawing/2014/main" id="{1FA417FE-CD1A-486F-A4AC-E4000A2FB18E}"/>
               </a:ext>
             </a:extLst>
           </p:cNvPr>
@@ -4529,7 +4529,7 @@
           <p:cNvPr id="11" name="Rectangle 10">
             <a:extLst>
               <a:ext uri="{FF2B5EF4-FFF2-40B4-BE49-F238E27FC236}">
-                <a16:creationId xmlns:a16="http://schemas.microsoft.com/office/drawing/2014/main" id="{1318F0F5-812B-472C-9408-B80F2553F5E0}"/>
+                <a16:creationId xmlns="" xmlns:a16="http://schemas.microsoft.com/office/drawing/2014/main" id="{1318F0F5-812B-472C-9408-B80F2553F5E0}"/>
               </a:ext>
             </a:extLst>
           </p:cNvPr>
@@ -4610,7 +4610,7 @@
           <p:cNvPr id="2" name="Title 1">
             <a:extLst>
               <a:ext uri="{FF2B5EF4-FFF2-40B4-BE49-F238E27FC236}">
-                <a16:creationId xmlns:a16="http://schemas.microsoft.com/office/drawing/2014/main" id="{47F7751B-CD8F-4F5B-A903-1DCE5D1E8306}"/>
+                <a16:creationId xmlns="" xmlns:a16="http://schemas.microsoft.com/office/drawing/2014/main" id="{47F7751B-CD8F-4F5B-A903-1DCE5D1E8306}"/>
               </a:ext>
             </a:extLst>
           </p:cNvPr>
@@ -4652,7 +4652,7 @@
           <p:cNvPr id="3" name="Content Placeholder 2">
             <a:extLst>
               <a:ext uri="{FF2B5EF4-FFF2-40B4-BE49-F238E27FC236}">
-                <a16:creationId xmlns:a16="http://schemas.microsoft.com/office/drawing/2014/main" id="{EFA55C8A-A0BB-441D-976F-EB56D4382DB6}"/>
+                <a16:creationId xmlns="" xmlns:a16="http://schemas.microsoft.com/office/drawing/2014/main" id="{EFA55C8A-A0BB-441D-976F-EB56D4382DB6}"/>
               </a:ext>
             </a:extLst>
           </p:cNvPr>
@@ -4742,7 +4742,7 @@
           <p:cNvPr id="4" name="Text Placeholder 3">
             <a:extLst>
               <a:ext uri="{FF2B5EF4-FFF2-40B4-BE49-F238E27FC236}">
-                <a16:creationId xmlns:a16="http://schemas.microsoft.com/office/drawing/2014/main" id="{37DE6A51-A2E5-4BFA-B571-9FDFE1BBFB44}"/>
+                <a16:creationId xmlns="" xmlns:a16="http://schemas.microsoft.com/office/drawing/2014/main" id="{37DE6A51-A2E5-4BFA-B571-9FDFE1BBFB44}"/>
               </a:ext>
             </a:extLst>
           </p:cNvPr>
@@ -4815,7 +4815,7 @@
           <p:cNvPr id="5" name="Date Placeholder 4">
             <a:extLst>
               <a:ext uri="{FF2B5EF4-FFF2-40B4-BE49-F238E27FC236}">
-                <a16:creationId xmlns:a16="http://schemas.microsoft.com/office/drawing/2014/main" id="{3D92778A-DD4C-4651-9C53-8B0C44CD8805}"/>
+                <a16:creationId xmlns="" xmlns:a16="http://schemas.microsoft.com/office/drawing/2014/main" id="{3D92778A-DD4C-4651-9C53-8B0C44CD8805}"/>
               </a:ext>
             </a:extLst>
           </p:cNvPr>
@@ -4838,7 +4838,7 @@
           <a:p>
             <a:fld id="{02AC24A9-CCB6-4F8D-B8DB-C2F3692CFA5A}" type="datetimeFigureOut">
               <a:rPr lang="en-US" smtClean="0"/>
-              <a:t>1/31/2025</a:t>
+              <a:t>2/10/2026</a:t>
             </a:fld>
             <a:endParaRPr lang="en-US" dirty="0"/>
           </a:p>
@@ -4849,7 +4849,7 @@
           <p:cNvPr id="6" name="Footer Placeholder 5">
             <a:extLst>
               <a:ext uri="{FF2B5EF4-FFF2-40B4-BE49-F238E27FC236}">
-                <a16:creationId xmlns:a16="http://schemas.microsoft.com/office/drawing/2014/main" id="{9D6C7F66-2DFA-4146-BE1A-CE2890FE45E2}"/>
+                <a16:creationId xmlns="" xmlns:a16="http://schemas.microsoft.com/office/drawing/2014/main" id="{9D6C7F66-2DFA-4146-BE1A-CE2890FE45E2}"/>
               </a:ext>
             </a:extLst>
           </p:cNvPr>
@@ -4874,7 +4874,7 @@
           <p:cNvPr id="7" name="Slide Number Placeholder 6">
             <a:extLst>
               <a:ext uri="{FF2B5EF4-FFF2-40B4-BE49-F238E27FC236}">
-                <a16:creationId xmlns:a16="http://schemas.microsoft.com/office/drawing/2014/main" id="{D285D185-B1B6-4D62-81BE-BE82C80ACA6C}"/>
+                <a16:creationId xmlns="" xmlns:a16="http://schemas.microsoft.com/office/drawing/2014/main" id="{D285D185-B1B6-4D62-81BE-BE82C80ACA6C}"/>
               </a:ext>
             </a:extLst>
           </p:cNvPr>
@@ -4933,7 +4933,7 @@
           <p:cNvPr id="9" name="Rectangle 8">
             <a:extLst>
               <a:ext uri="{FF2B5EF4-FFF2-40B4-BE49-F238E27FC236}">
-                <a16:creationId xmlns:a16="http://schemas.microsoft.com/office/drawing/2014/main" id="{168B77B5-211C-456E-B79F-306CC3619347}"/>
+                <a16:creationId xmlns="" xmlns:a16="http://schemas.microsoft.com/office/drawing/2014/main" id="{168B77B5-211C-456E-B79F-306CC3619347}"/>
               </a:ext>
             </a:extLst>
           </p:cNvPr>
@@ -5024,7 +5024,7 @@
           <p:cNvPr id="11" name="Rectangle 10">
             <a:extLst>
               <a:ext uri="{FF2B5EF4-FFF2-40B4-BE49-F238E27FC236}">
-                <a16:creationId xmlns:a16="http://schemas.microsoft.com/office/drawing/2014/main" id="{3B63C338-194D-4F23-ABEC-60A7EA96F302}"/>
+                <a16:creationId xmlns="" xmlns:a16="http://schemas.microsoft.com/office/drawing/2014/main" id="{3B63C338-194D-4F23-ABEC-60A7EA96F302}"/>
               </a:ext>
             </a:extLst>
           </p:cNvPr>
@@ -5105,7 +5105,7 @@
           <p:cNvPr id="2" name="Title 1">
             <a:extLst>
               <a:ext uri="{FF2B5EF4-FFF2-40B4-BE49-F238E27FC236}">
-                <a16:creationId xmlns:a16="http://schemas.microsoft.com/office/drawing/2014/main" id="{A0C04DCC-0E3E-4F05-9FAC-9FA6CA4B2BAE}"/>
+                <a16:creationId xmlns="" xmlns:a16="http://schemas.microsoft.com/office/drawing/2014/main" id="{A0C04DCC-0E3E-4F05-9FAC-9FA6CA4B2BAE}"/>
               </a:ext>
             </a:extLst>
           </p:cNvPr>
@@ -5147,7 +5147,7 @@
           <p:cNvPr id="3" name="Picture Placeholder 2">
             <a:extLst>
               <a:ext uri="{FF2B5EF4-FFF2-40B4-BE49-F238E27FC236}">
-                <a16:creationId xmlns:a16="http://schemas.microsoft.com/office/drawing/2014/main" id="{EBA29649-B19F-499E-8E9A-3577EAC8F031}"/>
+                <a16:creationId xmlns="" xmlns:a16="http://schemas.microsoft.com/office/drawing/2014/main" id="{EBA29649-B19F-499E-8E9A-3577EAC8F031}"/>
               </a:ext>
             </a:extLst>
           </p:cNvPr>
@@ -5219,7 +5219,7 @@
           <p:cNvPr id="4" name="Text Placeholder 3">
             <a:extLst>
               <a:ext uri="{FF2B5EF4-FFF2-40B4-BE49-F238E27FC236}">
-                <a16:creationId xmlns:a16="http://schemas.microsoft.com/office/drawing/2014/main" id="{1BC9EF2E-A8CD-41A1-B11A-0D8842797A98}"/>
+                <a16:creationId xmlns="" xmlns:a16="http://schemas.microsoft.com/office/drawing/2014/main" id="{1BC9EF2E-A8CD-41A1-B11A-0D8842797A98}"/>
               </a:ext>
             </a:extLst>
           </p:cNvPr>
@@ -5292,7 +5292,7 @@
           <p:cNvPr id="5" name="Date Placeholder 4">
             <a:extLst>
               <a:ext uri="{FF2B5EF4-FFF2-40B4-BE49-F238E27FC236}">
-                <a16:creationId xmlns:a16="http://schemas.microsoft.com/office/drawing/2014/main" id="{B44257B5-0DE0-401F-9171-E8687A97DBA7}"/>
+                <a16:creationId xmlns="" xmlns:a16="http://schemas.microsoft.com/office/drawing/2014/main" id="{B44257B5-0DE0-401F-9171-E8687A97DBA7}"/>
               </a:ext>
             </a:extLst>
           </p:cNvPr>
@@ -5315,7 +5315,7 @@
           <a:p>
             <a:fld id="{02AC24A9-CCB6-4F8D-B8DB-C2F3692CFA5A}" type="datetimeFigureOut">
               <a:rPr lang="en-US" smtClean="0"/>
-              <a:t>1/31/2025</a:t>
+              <a:t>2/10/2026</a:t>
             </a:fld>
             <a:endParaRPr lang="en-US"/>
           </a:p>
@@ -5326,7 +5326,7 @@
           <p:cNvPr id="6" name="Footer Placeholder 5">
             <a:extLst>
               <a:ext uri="{FF2B5EF4-FFF2-40B4-BE49-F238E27FC236}">
-                <a16:creationId xmlns:a16="http://schemas.microsoft.com/office/drawing/2014/main" id="{788CD9AD-D667-4FD4-AA34-428AA0BCD09E}"/>
+                <a16:creationId xmlns="" xmlns:a16="http://schemas.microsoft.com/office/drawing/2014/main" id="{788CD9AD-D667-4FD4-AA34-428AA0BCD09E}"/>
               </a:ext>
             </a:extLst>
           </p:cNvPr>
@@ -5351,7 +5351,7 @@
           <p:cNvPr id="7" name="Slide Number Placeholder 6">
             <a:extLst>
               <a:ext uri="{FF2B5EF4-FFF2-40B4-BE49-F238E27FC236}">
-                <a16:creationId xmlns:a16="http://schemas.microsoft.com/office/drawing/2014/main" id="{18770FB6-F273-4BA6-8B97-9835AC537871}"/>
+                <a16:creationId xmlns="" xmlns:a16="http://schemas.microsoft.com/office/drawing/2014/main" id="{18770FB6-F273-4BA6-8B97-9835AC537871}"/>
               </a:ext>
             </a:extLst>
           </p:cNvPr>
@@ -5415,7 +5415,7 @@
           <p:cNvPr id="2" name="Title Placeholder 1">
             <a:extLst>
               <a:ext uri="{FF2B5EF4-FFF2-40B4-BE49-F238E27FC236}">
-                <a16:creationId xmlns:a16="http://schemas.microsoft.com/office/drawing/2014/main" id="{BB325BDE-35A4-4AAD-960B-C1415864ADD9}"/>
+                <a16:creationId xmlns="" xmlns:a16="http://schemas.microsoft.com/office/drawing/2014/main" id="{BB325BDE-35A4-4AAD-960B-C1415864ADD9}"/>
               </a:ext>
             </a:extLst>
           </p:cNvPr>
@@ -5454,7 +5454,7 @@
           <p:cNvPr id="3" name="Text Placeholder 2">
             <a:extLst>
               <a:ext uri="{FF2B5EF4-FFF2-40B4-BE49-F238E27FC236}">
-                <a16:creationId xmlns:a16="http://schemas.microsoft.com/office/drawing/2014/main" id="{BE459C78-0CC4-4552-93DD-49B4194D005D}"/>
+                <a16:creationId xmlns="" xmlns:a16="http://schemas.microsoft.com/office/drawing/2014/main" id="{BE459C78-0CC4-4552-93DD-49B4194D005D}"/>
               </a:ext>
             </a:extLst>
           </p:cNvPr>
@@ -5522,7 +5522,7 @@
           <p:cNvPr id="4" name="Date Placeholder 3">
             <a:extLst>
               <a:ext uri="{FF2B5EF4-FFF2-40B4-BE49-F238E27FC236}">
-                <a16:creationId xmlns:a16="http://schemas.microsoft.com/office/drawing/2014/main" id="{06744A3C-9C54-46A6-B3EF-5B36362423EB}"/>
+                <a16:creationId xmlns="" xmlns:a16="http://schemas.microsoft.com/office/drawing/2014/main" id="{06744A3C-9C54-46A6-B3EF-5B36362423EB}"/>
               </a:ext>
             </a:extLst>
           </p:cNvPr>
@@ -5558,7 +5558,7 @@
           <a:p>
             <a:fld id="{02AC24A9-CCB6-4F8D-B8DB-C2F3692CFA5A}" type="datetimeFigureOut">
               <a:rPr lang="en-US" smtClean="0"/>
-              <a:t>1/31/2025</a:t>
+              <a:t>2/10/2026</a:t>
             </a:fld>
             <a:endParaRPr lang="en-US"/>
           </a:p>
@@ -5569,7 +5569,7 @@
           <p:cNvPr id="5" name="Footer Placeholder 4">
             <a:extLst>
               <a:ext uri="{FF2B5EF4-FFF2-40B4-BE49-F238E27FC236}">
-                <a16:creationId xmlns:a16="http://schemas.microsoft.com/office/drawing/2014/main" id="{07D5A696-7B4B-4181-A961-7D66556D507F}"/>
+                <a16:creationId xmlns="" xmlns:a16="http://schemas.microsoft.com/office/drawing/2014/main" id="{07D5A696-7B4B-4181-A961-7D66556D507F}"/>
               </a:ext>
             </a:extLst>
           </p:cNvPr>
@@ -5612,7 +5612,7 @@
           <p:cNvPr id="6" name="Slide Number Placeholder 5">
             <a:extLst>
               <a:ext uri="{FF2B5EF4-FFF2-40B4-BE49-F238E27FC236}">
-                <a16:creationId xmlns:a16="http://schemas.microsoft.com/office/drawing/2014/main" id="{23038CB5-8F4A-401D-A3A9-B27DC15B7A81}"/>
+                <a16:creationId xmlns="" xmlns:a16="http://schemas.microsoft.com/office/drawing/2014/main" id="{23038CB5-8F4A-401D-A3A9-B27DC15B7A81}"/>
               </a:ext>
             </a:extLst>
           </p:cNvPr>
@@ -5988,10 +5988,10 @@
           <p:cNvPr id="9" name="Rectangle 8">
             <a:extLst>
               <a:ext uri="{FF2B5EF4-FFF2-40B4-BE49-F238E27FC236}">
-                <a16:creationId xmlns:a16="http://schemas.microsoft.com/office/drawing/2014/main" id="{526E0BFB-CDF1-4990-8C11-AC849311E0A8}"/>
+                <a16:creationId xmlns="" xmlns:a16="http://schemas.microsoft.com/office/drawing/2014/main" id="{526E0BFB-CDF1-4990-8C11-AC849311E0A8}"/>
               </a:ext>
               <a:ext uri="{C183D7F6-B498-43B3-948B-1728B52AA6E4}">
-                <adec:decorative xmlns:adec="http://schemas.microsoft.com/office/drawing/2017/decorative" val="1"/>
+                <adec:decorative xmlns="" xmlns:adec="http://schemas.microsoft.com/office/drawing/2017/decorative" val="1"/>
               </a:ext>
             </a:extLst>
           </p:cNvPr>
@@ -6001,7 +6001,7 @@
           <p:nvPr>
             <p:extLst>
               <p:ext uri="{386F3935-93C4-4BCD-93E2-E3B085C9AB24}">
-                <p16:designElem xmlns:p16="http://schemas.microsoft.com/office/powerpoint/2015/main" val="1"/>
+                <p16:designElem xmlns="" xmlns:p16="http://schemas.microsoft.com/office/powerpoint/2015/main" val="1"/>
               </p:ext>
             </p:extLst>
           </p:nvPr>
@@ -6048,7 +6048,7 @@
           <p:cNvPr id="4" name="Picture 3">
             <a:extLst>
               <a:ext uri="{FF2B5EF4-FFF2-40B4-BE49-F238E27FC236}">
-                <a16:creationId xmlns:a16="http://schemas.microsoft.com/office/drawing/2014/main" id="{4C72F330-992B-B125-739B-F8303ED3A097}"/>
+                <a16:creationId xmlns="" xmlns:a16="http://schemas.microsoft.com/office/drawing/2014/main" id="{4C72F330-992B-B125-739B-F8303ED3A097}"/>
               </a:ext>
             </a:extLst>
           </p:cNvPr>
@@ -6077,10 +6077,10 @@
           <p:cNvPr id="11" name="Rectangle 10">
             <a:extLst>
               <a:ext uri="{FF2B5EF4-FFF2-40B4-BE49-F238E27FC236}">
-                <a16:creationId xmlns:a16="http://schemas.microsoft.com/office/drawing/2014/main" id="{6069A1F8-9BEB-4786-9694-FC48B2D75D21}"/>
+                <a16:creationId xmlns="" xmlns:a16="http://schemas.microsoft.com/office/drawing/2014/main" id="{6069A1F8-9BEB-4786-9694-FC48B2D75D21}"/>
               </a:ext>
               <a:ext uri="{C183D7F6-B498-43B3-948B-1728B52AA6E4}">
-                <adec:decorative xmlns:adec="http://schemas.microsoft.com/office/drawing/2017/decorative" val="1"/>
+                <adec:decorative xmlns="" xmlns:adec="http://schemas.microsoft.com/office/drawing/2017/decorative" val="1"/>
               </a:ext>
             </a:extLst>
           </p:cNvPr>
@@ -6090,7 +6090,7 @@
           <p:nvPr>
             <p:extLst>
               <p:ext uri="{386F3935-93C4-4BCD-93E2-E3B085C9AB24}">
-                <p16:designElem xmlns:p16="http://schemas.microsoft.com/office/powerpoint/2015/main" val="1"/>
+                <p16:designElem xmlns="" xmlns:p16="http://schemas.microsoft.com/office/powerpoint/2015/main" val="1"/>
               </p:ext>
             </p:extLst>
           </p:nvPr>
@@ -6158,7 +6158,7 @@
           <p:cNvPr id="2" name="Titre 1">
             <a:extLst>
               <a:ext uri="{FF2B5EF4-FFF2-40B4-BE49-F238E27FC236}">
-                <a16:creationId xmlns:a16="http://schemas.microsoft.com/office/drawing/2014/main" id="{CF8D1EB8-F6E7-EB54-1CC8-28472070B9FC}"/>
+                <a16:creationId xmlns="" xmlns:a16="http://schemas.microsoft.com/office/drawing/2014/main" id="{CF8D1EB8-F6E7-EB54-1CC8-28472070B9FC}"/>
               </a:ext>
             </a:extLst>
           </p:cNvPr>
@@ -6188,6 +6188,10 @@
             <a:br>
               <a:rPr lang="fr-FR" sz="4000" dirty="0"/>
             </a:br>
+            <a:r>
+              <a:rPr lang="fr-FR" sz="4000" dirty="0"/>
+              <a:t/>
+            </a:r>
             <a:br>
               <a:rPr lang="fr-FR" sz="4000" dirty="0"/>
             </a:br>
@@ -6217,7 +6221,7 @@
           <p:cNvPr id="3" name="Sous-titre 2">
             <a:extLst>
               <a:ext uri="{FF2B5EF4-FFF2-40B4-BE49-F238E27FC236}">
-                <a16:creationId xmlns:a16="http://schemas.microsoft.com/office/drawing/2014/main" id="{BDFEFAEF-AB6A-BE8F-01E7-845FB609FA07}"/>
+                <a16:creationId xmlns="" xmlns:a16="http://schemas.microsoft.com/office/drawing/2014/main" id="{BDFEFAEF-AB6A-BE8F-01E7-845FB609FA07}"/>
               </a:ext>
             </a:extLst>
           </p:cNvPr>
@@ -6252,10 +6256,10 @@
           <p:cNvPr id="32" name="Rectangle 12">
             <a:extLst>
               <a:ext uri="{FF2B5EF4-FFF2-40B4-BE49-F238E27FC236}">
-                <a16:creationId xmlns:a16="http://schemas.microsoft.com/office/drawing/2014/main" id="{AF2F604E-43BE-4DC3-B983-E071523364F8}"/>
+                <a16:creationId xmlns="" xmlns:a16="http://schemas.microsoft.com/office/drawing/2014/main" id="{AF2F604E-43BE-4DC3-B983-E071523364F8}"/>
               </a:ext>
               <a:ext uri="{C183D7F6-B498-43B3-948B-1728B52AA6E4}">
-                <adec:decorative xmlns:adec="http://schemas.microsoft.com/office/drawing/2017/decorative" val="1"/>
+                <adec:decorative xmlns="" xmlns:adec="http://schemas.microsoft.com/office/drawing/2017/decorative" val="1"/>
               </a:ext>
             </a:extLst>
           </p:cNvPr>
@@ -6265,7 +6269,7 @@
           <p:nvPr>
             <p:extLst>
               <p:ext uri="{386F3935-93C4-4BCD-93E2-E3B085C9AB24}">
-                <p16:designElem xmlns:p16="http://schemas.microsoft.com/office/powerpoint/2015/main" val="1"/>
+                <p16:designElem xmlns="" xmlns:p16="http://schemas.microsoft.com/office/powerpoint/2015/main" val="1"/>
               </p:ext>
             </p:extLst>
           </p:nvPr>
@@ -6344,10 +6348,10 @@
           <p:cNvPr id="33" name="Rectangle 14">
             <a:extLst>
               <a:ext uri="{FF2B5EF4-FFF2-40B4-BE49-F238E27FC236}">
-                <a16:creationId xmlns:a16="http://schemas.microsoft.com/office/drawing/2014/main" id="{08C9B587-E65E-4B52-B37C-ABEBB6E87928}"/>
+                <a16:creationId xmlns="" xmlns:a16="http://schemas.microsoft.com/office/drawing/2014/main" id="{08C9B587-E65E-4B52-B37C-ABEBB6E87928}"/>
               </a:ext>
               <a:ext uri="{C183D7F6-B498-43B3-948B-1728B52AA6E4}">
-                <adec:decorative xmlns:adec="http://schemas.microsoft.com/office/drawing/2017/decorative" val="1"/>
+                <adec:decorative xmlns="" xmlns:adec="http://schemas.microsoft.com/office/drawing/2017/decorative" val="1"/>
               </a:ext>
             </a:extLst>
           </p:cNvPr>
@@ -6357,7 +6361,7 @@
           <p:nvPr>
             <p:extLst>
               <p:ext uri="{386F3935-93C4-4BCD-93E2-E3B085C9AB24}">
-                <p16:designElem xmlns:p16="http://schemas.microsoft.com/office/powerpoint/2015/main" val="1"/>
+                <p16:designElem xmlns="" xmlns:p16="http://schemas.microsoft.com/office/powerpoint/2015/main" val="1"/>
               </p:ext>
             </p:extLst>
           </p:nvPr>
@@ -6437,7 +6441,7 @@
           <p:cNvPr id="5" name="Image 4" descr="Une image contenant texte&#10;&#10;Description générée automatiquement">
             <a:extLst>
               <a:ext uri="{FF2B5EF4-FFF2-40B4-BE49-F238E27FC236}">
-                <a16:creationId xmlns:a16="http://schemas.microsoft.com/office/drawing/2014/main" id="{3037BA79-FF20-6017-2C77-6E9611892AF9}"/>
+                <a16:creationId xmlns="" xmlns:a16="http://schemas.microsoft.com/office/drawing/2014/main" id="{3037BA79-FF20-6017-2C77-6E9611892AF9}"/>
               </a:ext>
             </a:extLst>
           </p:cNvPr>
@@ -6503,7 +6507,7 @@
           <p:cNvPr id="3" name="Rectangle 2">
             <a:extLst>
               <a:ext uri="{FF2B5EF4-FFF2-40B4-BE49-F238E27FC236}">
-                <a16:creationId xmlns:a16="http://schemas.microsoft.com/office/drawing/2014/main" id="{69EEE2CD-304C-7206-E015-F52A5695E8DF}"/>
+                <a16:creationId xmlns="" xmlns:a16="http://schemas.microsoft.com/office/drawing/2014/main" id="{69EEE2CD-304C-7206-E015-F52A5695E8DF}"/>
               </a:ext>
             </a:extLst>
           </p:cNvPr>
@@ -6566,7 +6570,7 @@
           <p:cNvPr id="2" name="Titre 1">
             <a:extLst>
               <a:ext uri="{FF2B5EF4-FFF2-40B4-BE49-F238E27FC236}">
-                <a16:creationId xmlns:a16="http://schemas.microsoft.com/office/drawing/2014/main" id="{97F71108-8121-4CC2-3ED6-50ABC11E79C5}"/>
+                <a16:creationId xmlns="" xmlns:a16="http://schemas.microsoft.com/office/drawing/2014/main" id="{97F71108-8121-4CC2-3ED6-50ABC11E79C5}"/>
               </a:ext>
             </a:extLst>
           </p:cNvPr>
@@ -6625,7 +6629,7 @@
           <p:cNvPr id="7" name="Rectangle 6">
             <a:extLst>
               <a:ext uri="{FF2B5EF4-FFF2-40B4-BE49-F238E27FC236}">
-                <a16:creationId xmlns:a16="http://schemas.microsoft.com/office/drawing/2014/main" id="{E97ACAFF-7D28-E79D-9EB4-4FEEF5BB9613}"/>
+                <a16:creationId xmlns="" xmlns:a16="http://schemas.microsoft.com/office/drawing/2014/main" id="{E97ACAFF-7D28-E79D-9EB4-4FEEF5BB9613}"/>
               </a:ext>
             </a:extLst>
           </p:cNvPr>
@@ -6677,7 +6681,7 @@
           <p:cNvPr id="4" name="Image 3" descr="Une image contenant texte&#10;&#10;Description générée automatiquement">
             <a:extLst>
               <a:ext uri="{FF2B5EF4-FFF2-40B4-BE49-F238E27FC236}">
-                <a16:creationId xmlns:a16="http://schemas.microsoft.com/office/drawing/2014/main" id="{9BFF7F1D-2708-E366-DB38-F68C1FBD99DC}"/>
+                <a16:creationId xmlns="" xmlns:a16="http://schemas.microsoft.com/office/drawing/2014/main" id="{9BFF7F1D-2708-E366-DB38-F68C1FBD99DC}"/>
               </a:ext>
             </a:extLst>
           </p:cNvPr>
@@ -6713,7 +6717,7 @@
           <p:cNvPr id="6" name="Image 5" descr="Une image contenant texte, capture d’écran, diagramme, cercle&#10;&#10;Description générée automatiquement">
             <a:extLst>
               <a:ext uri="{FF2B5EF4-FFF2-40B4-BE49-F238E27FC236}">
-                <a16:creationId xmlns:a16="http://schemas.microsoft.com/office/drawing/2014/main" id="{41D73B28-2AE9-38C6-A869-2E9C6197F699}"/>
+                <a16:creationId xmlns="" xmlns:a16="http://schemas.microsoft.com/office/drawing/2014/main" id="{41D73B28-2AE9-38C6-A869-2E9C6197F699}"/>
               </a:ext>
             </a:extLst>
           </p:cNvPr>
@@ -6749,7 +6753,7 @@
           <p:cNvPr id="10" name="Image 9">
             <a:extLst>
               <a:ext uri="{FF2B5EF4-FFF2-40B4-BE49-F238E27FC236}">
-                <a16:creationId xmlns:a16="http://schemas.microsoft.com/office/drawing/2014/main" id="{EA90ECB6-7B56-1D60-77B6-5D7C0CE8D57D}"/>
+                <a16:creationId xmlns="" xmlns:a16="http://schemas.microsoft.com/office/drawing/2014/main" id="{EA90ECB6-7B56-1D60-77B6-5D7C0CE8D57D}"/>
               </a:ext>
             </a:extLst>
           </p:cNvPr>
@@ -6779,7 +6783,7 @@
           <p:cNvPr id="12" name="Image 11" descr="Une image contenant objet astronomique, obscurité, noir, Événement céleste&#10;&#10;Description générée automatiquement">
             <a:extLst>
               <a:ext uri="{FF2B5EF4-FFF2-40B4-BE49-F238E27FC236}">
-                <a16:creationId xmlns:a16="http://schemas.microsoft.com/office/drawing/2014/main" id="{2E94095A-FE35-2913-96FE-1BBCA104822A}"/>
+                <a16:creationId xmlns="" xmlns:a16="http://schemas.microsoft.com/office/drawing/2014/main" id="{2E94095A-FE35-2913-96FE-1BBCA104822A}"/>
               </a:ext>
             </a:extLst>
           </p:cNvPr>
@@ -6789,7 +6793,7 @@
           <p:nvPr/>
         </p:nvPicPr>
         <p:blipFill>
-          <a:blip r:embed="rId6">
+          <a:blip r:embed="rId6" cstate="print">
             <a:extLst>
               <a:ext uri="{28A0092B-C50C-407E-A947-70E740481C1C}">
                 <a14:useLocalDpi xmlns:a14="http://schemas.microsoft.com/office/drawing/2010/main" val="0"/>
@@ -6815,7 +6819,7 @@
           <p:cNvPr id="1033" name="Picture 9">
             <a:extLst>
               <a:ext uri="{FF2B5EF4-FFF2-40B4-BE49-F238E27FC236}">
-                <a16:creationId xmlns:a16="http://schemas.microsoft.com/office/drawing/2014/main" id="{0BA64914-94C8-22A0-1FA9-C9A2B5810D53}"/>
+                <a16:creationId xmlns="" xmlns:a16="http://schemas.microsoft.com/office/drawing/2014/main" id="{0BA64914-94C8-22A0-1FA9-C9A2B5810D53}"/>
               </a:ext>
             </a:extLst>
           </p:cNvPr>
@@ -6862,7 +6866,7 @@
           <p:cNvPr id="14" name="ZoneTexte 13">
             <a:extLst>
               <a:ext uri="{FF2B5EF4-FFF2-40B4-BE49-F238E27FC236}">
-                <a16:creationId xmlns:a16="http://schemas.microsoft.com/office/drawing/2014/main" id="{08EA18F5-D47D-89EB-8316-F37FBA9B8672}"/>
+                <a16:creationId xmlns="" xmlns:a16="http://schemas.microsoft.com/office/drawing/2014/main" id="{08EA18F5-D47D-89EB-8316-F37FBA9B8672}"/>
               </a:ext>
             </a:extLst>
           </p:cNvPr>
@@ -6932,6 +6936,12 @@
           </a:p>
           <a:p>
             <a:pPr algn="ctr" rtl="0"/>
+            <a:r>
+              <a:rPr lang="fr-FR" sz="1600" b="0" dirty="0">
+                <a:effectLst/>
+              </a:rPr>
+              <a:t/>
+            </a:r>
             <a:br>
               <a:rPr lang="fr-FR" sz="1600" b="0" dirty="0">
                 <a:effectLst/>
@@ -7030,6 +7040,12 @@
           </a:p>
           <a:p>
             <a:pPr algn="ctr" rtl="0"/>
+            <a:r>
+              <a:rPr lang="fr-FR" sz="1600" b="0" dirty="0">
+                <a:effectLst/>
+              </a:rPr>
+              <a:t/>
+            </a:r>
             <a:br>
               <a:rPr lang="fr-FR" sz="1600" b="0" dirty="0">
                 <a:effectLst/>
@@ -7086,7 +7102,7 @@
           <p:cNvPr id="16" name="ZoneTexte 15">
             <a:extLst>
               <a:ext uri="{FF2B5EF4-FFF2-40B4-BE49-F238E27FC236}">
-                <a16:creationId xmlns:a16="http://schemas.microsoft.com/office/drawing/2014/main" id="{B13828AC-7338-0BED-B0D1-992FC15C18CA}"/>
+                <a16:creationId xmlns="" xmlns:a16="http://schemas.microsoft.com/office/drawing/2014/main" id="{B13828AC-7338-0BED-B0D1-992FC15C18CA}"/>
               </a:ext>
             </a:extLst>
           </p:cNvPr>
@@ -7191,7 +7207,7 @@
           <p:cNvPr id="17" name="Rectangle 16">
             <a:extLst>
               <a:ext uri="{FF2B5EF4-FFF2-40B4-BE49-F238E27FC236}">
-                <a16:creationId xmlns:a16="http://schemas.microsoft.com/office/drawing/2014/main" id="{E1D563A4-A05F-AD9F-4D49-EDEFD3A9281E}"/>
+                <a16:creationId xmlns="" xmlns:a16="http://schemas.microsoft.com/office/drawing/2014/main" id="{E1D563A4-A05F-AD9F-4D49-EDEFD3A9281E}"/>
               </a:ext>
             </a:extLst>
           </p:cNvPr>
@@ -7243,7 +7259,7 @@
           <p:cNvPr id="18" name="Rectangle 17">
             <a:extLst>
               <a:ext uri="{FF2B5EF4-FFF2-40B4-BE49-F238E27FC236}">
-                <a16:creationId xmlns:a16="http://schemas.microsoft.com/office/drawing/2014/main" id="{805BD89E-1061-2B91-7007-F92F55C492C4}"/>
+                <a16:creationId xmlns="" xmlns:a16="http://schemas.microsoft.com/office/drawing/2014/main" id="{805BD89E-1061-2B91-7007-F92F55C492C4}"/>
               </a:ext>
             </a:extLst>
           </p:cNvPr>
@@ -7295,7 +7311,7 @@
           <p:cNvPr id="20" name="ZoneTexte 19">
             <a:extLst>
               <a:ext uri="{FF2B5EF4-FFF2-40B4-BE49-F238E27FC236}">
-                <a16:creationId xmlns:a16="http://schemas.microsoft.com/office/drawing/2014/main" id="{C6427CA2-2C50-B85E-A851-5DAB22DCA842}"/>
+                <a16:creationId xmlns="" xmlns:a16="http://schemas.microsoft.com/office/drawing/2014/main" id="{C6427CA2-2C50-B85E-A851-5DAB22DCA842}"/>
               </a:ext>
             </a:extLst>
           </p:cNvPr>
@@ -7333,7 +7349,7 @@
           <p:cNvPr id="21" name="Rectangle 20">
             <a:extLst>
               <a:ext uri="{FF2B5EF4-FFF2-40B4-BE49-F238E27FC236}">
-                <a16:creationId xmlns:a16="http://schemas.microsoft.com/office/drawing/2014/main" id="{DFAA30B8-A15C-FB9E-729B-E540795C8D0B}"/>
+                <a16:creationId xmlns="" xmlns:a16="http://schemas.microsoft.com/office/drawing/2014/main" id="{DFAA30B8-A15C-FB9E-729B-E540795C8D0B}"/>
               </a:ext>
             </a:extLst>
           </p:cNvPr>
@@ -7388,7 +7404,7 @@
           <p:cNvPr id="22" name="Rectangle 21">
             <a:extLst>
               <a:ext uri="{FF2B5EF4-FFF2-40B4-BE49-F238E27FC236}">
-                <a16:creationId xmlns:a16="http://schemas.microsoft.com/office/drawing/2014/main" id="{539EDA54-EDAE-109E-9AA2-DF71B8750102}"/>
+                <a16:creationId xmlns="" xmlns:a16="http://schemas.microsoft.com/office/drawing/2014/main" id="{539EDA54-EDAE-109E-9AA2-DF71B8750102}"/>
               </a:ext>
             </a:extLst>
           </p:cNvPr>
@@ -7443,7 +7459,7 @@
           <p:cNvPr id="23" name="Rectangle 22">
             <a:extLst>
               <a:ext uri="{FF2B5EF4-FFF2-40B4-BE49-F238E27FC236}">
-                <a16:creationId xmlns:a16="http://schemas.microsoft.com/office/drawing/2014/main" id="{4541FA77-1D53-67E8-533B-97AD6B14781C}"/>
+                <a16:creationId xmlns="" xmlns:a16="http://schemas.microsoft.com/office/drawing/2014/main" id="{4541FA77-1D53-67E8-533B-97AD6B14781C}"/>
               </a:ext>
             </a:extLst>
           </p:cNvPr>
@@ -7517,7 +7533,7 @@
         <p:cNvPr id="1" name="">
           <a:extLst>
             <a:ext uri="{FF2B5EF4-FFF2-40B4-BE49-F238E27FC236}">
-              <a16:creationId xmlns:a16="http://schemas.microsoft.com/office/drawing/2014/main" id="{B955DEA2-6250-6A02-DC18-B2689B86918D}"/>
+              <a16:creationId xmlns="" xmlns:a16="http://schemas.microsoft.com/office/drawing/2014/main" id="{B955DEA2-6250-6A02-DC18-B2689B86918D}"/>
             </a:ext>
           </a:extLst>
         </p:cNvPr>
@@ -7537,7 +7553,7 @@
           <p:cNvPr id="3" name="Rectangle 2">
             <a:extLst>
               <a:ext uri="{FF2B5EF4-FFF2-40B4-BE49-F238E27FC236}">
-                <a16:creationId xmlns:a16="http://schemas.microsoft.com/office/drawing/2014/main" id="{16EAC753-DD00-7FF7-5A28-AF44C19141A2}"/>
+                <a16:creationId xmlns="" xmlns:a16="http://schemas.microsoft.com/office/drawing/2014/main" id="{16EAC753-DD00-7FF7-5A28-AF44C19141A2}"/>
               </a:ext>
             </a:extLst>
           </p:cNvPr>
@@ -7600,7 +7616,7 @@
           <p:cNvPr id="2" name="Titre 1">
             <a:extLst>
               <a:ext uri="{FF2B5EF4-FFF2-40B4-BE49-F238E27FC236}">
-                <a16:creationId xmlns:a16="http://schemas.microsoft.com/office/drawing/2014/main" id="{F074150E-74C9-0933-2894-BCE82D2563D5}"/>
+                <a16:creationId xmlns="" xmlns:a16="http://schemas.microsoft.com/office/drawing/2014/main" id="{F074150E-74C9-0933-2894-BCE82D2563D5}"/>
               </a:ext>
             </a:extLst>
           </p:cNvPr>
@@ -7659,7 +7675,7 @@
           <p:cNvPr id="7" name="Rectangle 6">
             <a:extLst>
               <a:ext uri="{FF2B5EF4-FFF2-40B4-BE49-F238E27FC236}">
-                <a16:creationId xmlns:a16="http://schemas.microsoft.com/office/drawing/2014/main" id="{1FE82EF4-6E9E-9498-BB05-22BE57675BFC}"/>
+                <a16:creationId xmlns="" xmlns:a16="http://schemas.microsoft.com/office/drawing/2014/main" id="{1FE82EF4-6E9E-9498-BB05-22BE57675BFC}"/>
               </a:ext>
             </a:extLst>
           </p:cNvPr>
@@ -7711,7 +7727,7 @@
           <p:cNvPr id="4" name="Image 3" descr="Une image contenant texte&#10;&#10;Description générée automatiquement">
             <a:extLst>
               <a:ext uri="{FF2B5EF4-FFF2-40B4-BE49-F238E27FC236}">
-                <a16:creationId xmlns:a16="http://schemas.microsoft.com/office/drawing/2014/main" id="{2FBA3EC0-160B-2722-D278-A9B69E92467E}"/>
+                <a16:creationId xmlns="" xmlns:a16="http://schemas.microsoft.com/office/drawing/2014/main" id="{2FBA3EC0-160B-2722-D278-A9B69E92467E}"/>
               </a:ext>
             </a:extLst>
           </p:cNvPr>
@@ -7747,7 +7763,7 @@
           <p:cNvPr id="6" name="Image 5" descr="Une image contenant texte, capture d’écran, diagramme, cercle&#10;&#10;Description générée automatiquement">
             <a:extLst>
               <a:ext uri="{FF2B5EF4-FFF2-40B4-BE49-F238E27FC236}">
-                <a16:creationId xmlns:a16="http://schemas.microsoft.com/office/drawing/2014/main" id="{4F6758FB-F39B-D731-11C2-3D77E4E0F169}"/>
+                <a16:creationId xmlns="" xmlns:a16="http://schemas.microsoft.com/office/drawing/2014/main" id="{4F6758FB-F39B-D731-11C2-3D77E4E0F169}"/>
               </a:ext>
             </a:extLst>
           </p:cNvPr>
@@ -7783,7 +7799,7 @@
           <p:cNvPr id="10" name="Image 9">
             <a:extLst>
               <a:ext uri="{FF2B5EF4-FFF2-40B4-BE49-F238E27FC236}">
-                <a16:creationId xmlns:a16="http://schemas.microsoft.com/office/drawing/2014/main" id="{9FCFD44B-E758-B0A5-1359-8D5DEB4CE273}"/>
+                <a16:creationId xmlns="" xmlns:a16="http://schemas.microsoft.com/office/drawing/2014/main" id="{9FCFD44B-E758-B0A5-1359-8D5DEB4CE273}"/>
               </a:ext>
             </a:extLst>
           </p:cNvPr>
@@ -7813,7 +7829,7 @@
           <p:cNvPr id="12" name="Image 11" descr="Une image contenant objet astronomique, obscurité, noir, Événement céleste&#10;&#10;Description générée automatiquement">
             <a:extLst>
               <a:ext uri="{FF2B5EF4-FFF2-40B4-BE49-F238E27FC236}">
-                <a16:creationId xmlns:a16="http://schemas.microsoft.com/office/drawing/2014/main" id="{E2DB7374-39F9-5DBE-1E6E-B1F21BB3F292}"/>
+                <a16:creationId xmlns="" xmlns:a16="http://schemas.microsoft.com/office/drawing/2014/main" id="{E2DB7374-39F9-5DBE-1E6E-B1F21BB3F292}"/>
               </a:ext>
             </a:extLst>
           </p:cNvPr>
@@ -7823,7 +7839,7 @@
           <p:nvPr/>
         </p:nvPicPr>
         <p:blipFill>
-          <a:blip r:embed="rId6">
+          <a:blip r:embed="rId6" cstate="print">
             <a:extLst>
               <a:ext uri="{28A0092B-C50C-407E-A947-70E740481C1C}">
                 <a14:useLocalDpi xmlns:a14="http://schemas.microsoft.com/office/drawing/2010/main" val="0"/>
@@ -7849,7 +7865,7 @@
           <p:cNvPr id="1033" name="Picture 9">
             <a:extLst>
               <a:ext uri="{FF2B5EF4-FFF2-40B4-BE49-F238E27FC236}">
-                <a16:creationId xmlns:a16="http://schemas.microsoft.com/office/drawing/2014/main" id="{2FAE40F2-0A1E-5C46-E8D4-F1B6572F0E54}"/>
+                <a16:creationId xmlns="" xmlns:a16="http://schemas.microsoft.com/office/drawing/2014/main" id="{2FAE40F2-0A1E-5C46-E8D4-F1B6572F0E54}"/>
               </a:ext>
             </a:extLst>
           </p:cNvPr>
@@ -7896,7 +7912,7 @@
           <p:cNvPr id="9" name="ZoneTexte 8">
             <a:extLst>
               <a:ext uri="{FF2B5EF4-FFF2-40B4-BE49-F238E27FC236}">
-                <a16:creationId xmlns:a16="http://schemas.microsoft.com/office/drawing/2014/main" id="{0FF35711-3A82-D001-2D6F-C7D2682E035D}"/>
+                <a16:creationId xmlns="" xmlns:a16="http://schemas.microsoft.com/office/drawing/2014/main" id="{0FF35711-3A82-D001-2D6F-C7D2682E035D}"/>
               </a:ext>
             </a:extLst>
           </p:cNvPr>
@@ -7934,7 +7950,7 @@
           <p:cNvPr id="42" name="Rectangle 41">
             <a:extLst>
               <a:ext uri="{FF2B5EF4-FFF2-40B4-BE49-F238E27FC236}">
-                <a16:creationId xmlns:a16="http://schemas.microsoft.com/office/drawing/2014/main" id="{421867DA-C259-6780-3D39-CBB4D8A931FD}"/>
+                <a16:creationId xmlns="" xmlns:a16="http://schemas.microsoft.com/office/drawing/2014/main" id="{421867DA-C259-6780-3D39-CBB4D8A931FD}"/>
               </a:ext>
             </a:extLst>
           </p:cNvPr>
@@ -7996,7 +8012,7 @@
           <p:cNvPr id="43" name="Rectangle 42">
             <a:extLst>
               <a:ext uri="{FF2B5EF4-FFF2-40B4-BE49-F238E27FC236}">
-                <a16:creationId xmlns:a16="http://schemas.microsoft.com/office/drawing/2014/main" id="{4E79CBC9-0C6F-91CE-69EC-B5A8C175A745}"/>
+                <a16:creationId xmlns="" xmlns:a16="http://schemas.microsoft.com/office/drawing/2014/main" id="{4E79CBC9-0C6F-91CE-69EC-B5A8C175A745}"/>
               </a:ext>
             </a:extLst>
           </p:cNvPr>
@@ -8068,7 +8084,7 @@
           <p:cNvPr id="53" name="Rectangle 52">
             <a:extLst>
               <a:ext uri="{FF2B5EF4-FFF2-40B4-BE49-F238E27FC236}">
-                <a16:creationId xmlns:a16="http://schemas.microsoft.com/office/drawing/2014/main" id="{D3493EC3-3ED3-AC71-68C6-6E3C8A4F5004}"/>
+                <a16:creationId xmlns="" xmlns:a16="http://schemas.microsoft.com/office/drawing/2014/main" id="{D3493EC3-3ED3-AC71-68C6-6E3C8A4F5004}"/>
               </a:ext>
             </a:extLst>
           </p:cNvPr>
@@ -8123,7 +8139,7 @@
           <p:cNvPr id="54" name="Rectangle 53">
             <a:extLst>
               <a:ext uri="{FF2B5EF4-FFF2-40B4-BE49-F238E27FC236}">
-                <a16:creationId xmlns:a16="http://schemas.microsoft.com/office/drawing/2014/main" id="{164B6199-89B5-2EE0-51F1-6C921DBCBC9E}"/>
+                <a16:creationId xmlns="" xmlns:a16="http://schemas.microsoft.com/office/drawing/2014/main" id="{164B6199-89B5-2EE0-51F1-6C921DBCBC9E}"/>
               </a:ext>
             </a:extLst>
           </p:cNvPr>
@@ -8182,7 +8198,7 @@
           <p:cNvPr id="55" name="Rectangle 54">
             <a:extLst>
               <a:ext uri="{FF2B5EF4-FFF2-40B4-BE49-F238E27FC236}">
-                <a16:creationId xmlns:a16="http://schemas.microsoft.com/office/drawing/2014/main" id="{980EFC03-3AF4-1F55-F5EF-A0828D36E150}"/>
+                <a16:creationId xmlns="" xmlns:a16="http://schemas.microsoft.com/office/drawing/2014/main" id="{980EFC03-3AF4-1F55-F5EF-A0828D36E150}"/>
               </a:ext>
             </a:extLst>
           </p:cNvPr>
@@ -8244,7 +8260,7 @@
           <p:cNvPr id="8" name="Rectangle 7">
             <a:extLst>
               <a:ext uri="{FF2B5EF4-FFF2-40B4-BE49-F238E27FC236}">
-                <a16:creationId xmlns:a16="http://schemas.microsoft.com/office/drawing/2014/main" id="{D8BE85BC-4EC6-68AE-673A-DB0EFDBD3520}"/>
+                <a16:creationId xmlns="" xmlns:a16="http://schemas.microsoft.com/office/drawing/2014/main" id="{D8BE85BC-4EC6-68AE-673A-DB0EFDBD3520}"/>
               </a:ext>
             </a:extLst>
           </p:cNvPr>
@@ -8260,10 +8276,12 @@
             <a:avLst/>
           </a:prstGeom>
           <a:solidFill>
-            <a:srgbClr val="002060"/>
+            <a:schemeClr val="bg1"/>
           </a:solidFill>
           <a:ln>
-            <a:noFill/>
+            <a:solidFill>
+              <a:srgbClr val="002060"/>
+            </a:solidFill>
           </a:ln>
         </p:spPr>
         <p:style>
@@ -8296,7 +8314,7 @@
           <p:cNvPr id="11" name="Rectangle 10">
             <a:extLst>
               <a:ext uri="{FF2B5EF4-FFF2-40B4-BE49-F238E27FC236}">
-                <a16:creationId xmlns:a16="http://schemas.microsoft.com/office/drawing/2014/main" id="{E03280E2-A3F0-03CB-7863-26E43FDFAACD}"/>
+                <a16:creationId xmlns="" xmlns:a16="http://schemas.microsoft.com/office/drawing/2014/main" id="{E03280E2-A3F0-03CB-7863-26E43FDFAACD}"/>
               </a:ext>
             </a:extLst>
           </p:cNvPr>
@@ -8358,7 +8376,7 @@
           <p:cNvPr id="13" name="Rectangle 12">
             <a:extLst>
               <a:ext uri="{FF2B5EF4-FFF2-40B4-BE49-F238E27FC236}">
-                <a16:creationId xmlns:a16="http://schemas.microsoft.com/office/drawing/2014/main" id="{098DA644-EC8C-61FE-90A2-778EF2B7DF36}"/>
+                <a16:creationId xmlns="" xmlns:a16="http://schemas.microsoft.com/office/drawing/2014/main" id="{098DA644-EC8C-61FE-90A2-778EF2B7DF36}"/>
               </a:ext>
             </a:extLst>
           </p:cNvPr>
@@ -8401,6 +8419,10 @@
           <a:lstStyle/>
           <a:p>
             <a:pPr algn="ctr"/>
+            <a:r>
+              <a:rPr lang="fr-FR" sz="1600" dirty="0" smtClean="0"/>
+              <a:t>1</a:t>
+            </a:r>
             <a:endParaRPr lang="fr-FR" sz="1600" dirty="0"/>
           </a:p>
         </p:txBody>
@@ -8410,7 +8432,7 @@
           <p:cNvPr id="14" name="Rectangle 13">
             <a:extLst>
               <a:ext uri="{FF2B5EF4-FFF2-40B4-BE49-F238E27FC236}">
-                <a16:creationId xmlns:a16="http://schemas.microsoft.com/office/drawing/2014/main" id="{021B992C-31E5-6213-5092-4CCBE55F2B39}"/>
+                <a16:creationId xmlns="" xmlns:a16="http://schemas.microsoft.com/office/drawing/2014/main" id="{021B992C-31E5-6213-5092-4CCBE55F2B39}"/>
               </a:ext>
             </a:extLst>
           </p:cNvPr>
@@ -8453,6 +8475,10 @@
           <a:lstStyle/>
           <a:p>
             <a:pPr algn="ctr"/>
+            <a:r>
+              <a:rPr lang="fr-FR" sz="1600" dirty="0" smtClean="0"/>
+              <a:t>2</a:t>
+            </a:r>
             <a:endParaRPr lang="fr-FR" sz="1600" dirty="0"/>
           </a:p>
         </p:txBody>
@@ -8462,7 +8488,7 @@
           <p:cNvPr id="15" name="Rectangle 14">
             <a:extLst>
               <a:ext uri="{FF2B5EF4-FFF2-40B4-BE49-F238E27FC236}">
-                <a16:creationId xmlns:a16="http://schemas.microsoft.com/office/drawing/2014/main" id="{0D770ED0-474D-9648-552F-CF79EB8C490D}"/>
+                <a16:creationId xmlns="" xmlns:a16="http://schemas.microsoft.com/office/drawing/2014/main" id="{0D770ED0-474D-9648-552F-CF79EB8C490D}"/>
               </a:ext>
             </a:extLst>
           </p:cNvPr>
@@ -8471,7 +8497,7 @@
         </p:nvSpPr>
         <p:spPr>
           <a:xfrm>
-            <a:off x="11327289" y="3244334"/>
+            <a:off x="11327289" y="4467223"/>
             <a:ext cx="387096" cy="369332"/>
           </a:xfrm>
           <a:prstGeom prst="rect">
@@ -8505,6 +8531,10 @@
           <a:lstStyle/>
           <a:p>
             <a:pPr algn="ctr"/>
+            <a:r>
+              <a:rPr lang="fr-FR" sz="1600" dirty="0" smtClean="0"/>
+              <a:t>7</a:t>
+            </a:r>
             <a:endParaRPr lang="fr-FR" sz="1600" dirty="0"/>
           </a:p>
         </p:txBody>
@@ -8514,7 +8544,7 @@
           <p:cNvPr id="16" name="Rectangle 15">
             <a:extLst>
               <a:ext uri="{FF2B5EF4-FFF2-40B4-BE49-F238E27FC236}">
-                <a16:creationId xmlns:a16="http://schemas.microsoft.com/office/drawing/2014/main" id="{AD6AB33F-119B-3F1B-F6FF-1B69419C6403}"/>
+                <a16:creationId xmlns="" xmlns:a16="http://schemas.microsoft.com/office/drawing/2014/main" id="{AD6AB33F-119B-3F1B-F6FF-1B69419C6403}"/>
               </a:ext>
             </a:extLst>
           </p:cNvPr>
@@ -8576,7 +8606,7 @@
           <p:cNvPr id="17" name="Rectangle 16">
             <a:extLst>
               <a:ext uri="{FF2B5EF4-FFF2-40B4-BE49-F238E27FC236}">
-                <a16:creationId xmlns:a16="http://schemas.microsoft.com/office/drawing/2014/main" id="{FB575922-835C-241C-709B-AB12BD7E173C}"/>
+                <a16:creationId xmlns="" xmlns:a16="http://schemas.microsoft.com/office/drawing/2014/main" id="{FB575922-835C-241C-709B-AB12BD7E173C}"/>
               </a:ext>
             </a:extLst>
           </p:cNvPr>
@@ -8635,7 +8665,7 @@
           <p:cNvPr id="18" name="Rectangle 17">
             <a:extLst>
               <a:ext uri="{FF2B5EF4-FFF2-40B4-BE49-F238E27FC236}">
-                <a16:creationId xmlns:a16="http://schemas.microsoft.com/office/drawing/2014/main" id="{86F7F968-D1E2-15AA-9E7A-58F30CD84152}"/>
+                <a16:creationId xmlns="" xmlns:a16="http://schemas.microsoft.com/office/drawing/2014/main" id="{86F7F968-D1E2-15AA-9E7A-58F30CD84152}"/>
               </a:ext>
             </a:extLst>
           </p:cNvPr>
@@ -8694,7 +8724,7 @@
           <p:cNvPr id="20" name="Rectangle 19">
             <a:extLst>
               <a:ext uri="{FF2B5EF4-FFF2-40B4-BE49-F238E27FC236}">
-                <a16:creationId xmlns:a16="http://schemas.microsoft.com/office/drawing/2014/main" id="{B4740186-9013-1F9D-7EA1-44560C103898}"/>
+                <a16:creationId xmlns="" xmlns:a16="http://schemas.microsoft.com/office/drawing/2014/main" id="{B4740186-9013-1F9D-7EA1-44560C103898}"/>
               </a:ext>
             </a:extLst>
           </p:cNvPr>
@@ -8737,6 +8767,10 @@
           <a:lstStyle/>
           <a:p>
             <a:pPr algn="ctr"/>
+            <a:r>
+              <a:rPr lang="fr-FR" sz="1600" dirty="0" smtClean="0"/>
+              <a:t>4</a:t>
+            </a:r>
             <a:endParaRPr lang="fr-FR" sz="1600" dirty="0"/>
           </a:p>
         </p:txBody>
@@ -8746,7 +8780,7 @@
           <p:cNvPr id="21" name="Rectangle 20">
             <a:extLst>
               <a:ext uri="{FF2B5EF4-FFF2-40B4-BE49-F238E27FC236}">
-                <a16:creationId xmlns:a16="http://schemas.microsoft.com/office/drawing/2014/main" id="{040E83FC-64FA-353E-D05A-9B1F5F5F25C8}"/>
+                <a16:creationId xmlns="" xmlns:a16="http://schemas.microsoft.com/office/drawing/2014/main" id="{040E83FC-64FA-353E-D05A-9B1F5F5F25C8}"/>
               </a:ext>
             </a:extLst>
           </p:cNvPr>
@@ -8762,7 +8796,7 @@
             <a:avLst/>
           </a:prstGeom>
           <a:solidFill>
-            <a:srgbClr val="D6B4B2"/>
+            <a:srgbClr val="002060"/>
           </a:solidFill>
           <a:ln>
             <a:noFill/>
@@ -8789,16 +8823,20 @@
           <a:lstStyle/>
           <a:p>
             <a:pPr algn="ctr"/>
+            <a:r>
+              <a:rPr lang="fr-FR" sz="1600" dirty="0" smtClean="0"/>
+              <a:t>6</a:t>
+            </a:r>
             <a:endParaRPr lang="fr-FR" sz="1600" dirty="0"/>
           </a:p>
         </p:txBody>
       </p:sp>
       <p:sp>
         <p:nvSpPr>
-          <p:cNvPr id="22" name="Rectangle 21">
-            <a:extLst>
-              <a:ext uri="{FF2B5EF4-FFF2-40B4-BE49-F238E27FC236}">
-                <a16:creationId xmlns:a16="http://schemas.microsoft.com/office/drawing/2014/main" id="{A0EB135E-EF9B-D1F5-E612-5F0F278D99FE}"/>
+          <p:cNvPr id="23" name="Rectangle 22">
+            <a:extLst>
+              <a:ext uri="{FF2B5EF4-FFF2-40B4-BE49-F238E27FC236}">
+                <a16:creationId xmlns="" xmlns:a16="http://schemas.microsoft.com/office/drawing/2014/main" id="{5DF7F23C-EF65-9DE8-7387-640B14B54474}"/>
               </a:ext>
             </a:extLst>
           </p:cNvPr>
@@ -8807,14 +8845,14 @@
         </p:nvSpPr>
         <p:spPr>
           <a:xfrm>
-            <a:off x="11327289" y="4798076"/>
-            <a:ext cx="387096" cy="369332"/>
+            <a:off x="10332720" y="4479277"/>
+            <a:ext cx="761073" cy="369332"/>
           </a:xfrm>
           <a:prstGeom prst="rect">
             <a:avLst/>
           </a:prstGeom>
           <a:solidFill>
-            <a:srgbClr val="D6B4B2"/>
+            <a:srgbClr val="92D050"/>
           </a:solidFill>
           <a:ln>
             <a:noFill/>
@@ -8841,16 +8879,23 @@
           <a:lstStyle/>
           <a:p>
             <a:pPr algn="ctr"/>
-            <a:endParaRPr lang="fr-FR" sz="1600" dirty="0"/>
-          </a:p>
-        </p:txBody>
-      </p:sp>
-      <p:sp>
-        <p:nvSpPr>
-          <p:cNvPr id="23" name="Rectangle 22">
-            <a:extLst>
-              <a:ext uri="{FF2B5EF4-FFF2-40B4-BE49-F238E27FC236}">
-                <a16:creationId xmlns:a16="http://schemas.microsoft.com/office/drawing/2014/main" id="{5DF7F23C-EF65-9DE8-7387-640B14B54474}"/>
+            <a:r>
+              <a:rPr lang="fr-FR" sz="1400" b="1" dirty="0">
+                <a:solidFill>
+                  <a:schemeClr val="tx1"/>
+                </a:solidFill>
+              </a:rPr>
+              <a:t>TP3a</a:t>
+            </a:r>
+          </a:p>
+        </p:txBody>
+      </p:sp>
+      <p:sp>
+        <p:nvSpPr>
+          <p:cNvPr id="24" name="Rectangle 23">
+            <a:extLst>
+              <a:ext uri="{FF2B5EF4-FFF2-40B4-BE49-F238E27FC236}">
+                <a16:creationId xmlns="" xmlns:a16="http://schemas.microsoft.com/office/drawing/2014/main" id="{D81CF90D-44C0-BB2F-D938-BCC20C548A91}"/>
               </a:ext>
             </a:extLst>
           </p:cNvPr>
@@ -8859,7 +8904,7 @@
         </p:nvSpPr>
         <p:spPr>
           <a:xfrm>
-            <a:off x="10332720" y="5198049"/>
+            <a:off x="10332720" y="5221587"/>
             <a:ext cx="761073" cy="369332"/>
           </a:xfrm>
           <a:prstGeom prst="rect">
@@ -8899,17 +8944,17 @@
                   <a:schemeClr val="tx1"/>
                 </a:solidFill>
               </a:rPr>
-              <a:t>TP3a</a:t>
-            </a:r>
-          </a:p>
-        </p:txBody>
-      </p:sp>
-      <p:sp>
-        <p:nvSpPr>
-          <p:cNvPr id="24" name="Rectangle 23">
-            <a:extLst>
-              <a:ext uri="{FF2B5EF4-FFF2-40B4-BE49-F238E27FC236}">
-                <a16:creationId xmlns:a16="http://schemas.microsoft.com/office/drawing/2014/main" id="{D81CF90D-44C0-BB2F-D938-BCC20C548A91}"/>
+              <a:t>TP3b</a:t>
+            </a:r>
+          </a:p>
+        </p:txBody>
+      </p:sp>
+      <p:sp>
+        <p:nvSpPr>
+          <p:cNvPr id="34" name="Rectangle 33">
+            <a:extLst>
+              <a:ext uri="{FF2B5EF4-FFF2-40B4-BE49-F238E27FC236}">
+                <a16:creationId xmlns="" xmlns:a16="http://schemas.microsoft.com/office/drawing/2014/main" id="{9BED3722-DE00-706C-1FEF-87BE444AB70F}"/>
               </a:ext>
             </a:extLst>
           </p:cNvPr>
@@ -8918,8 +8963,8 @@
         </p:nvSpPr>
         <p:spPr>
           <a:xfrm>
-            <a:off x="10332720" y="5598022"/>
-            <a:ext cx="761073" cy="369332"/>
+            <a:off x="11327289" y="5621560"/>
+            <a:ext cx="387096" cy="369332"/>
           </a:xfrm>
           <a:prstGeom prst="rect">
             <a:avLst/>
@@ -8953,22 +8998,19 @@
           <a:p>
             <a:pPr algn="ctr"/>
             <a:r>
-              <a:rPr lang="fr-FR" sz="1400" b="1" dirty="0">
-                <a:solidFill>
-                  <a:schemeClr val="tx1"/>
-                </a:solidFill>
-              </a:rPr>
-              <a:t>TP3b</a:t>
-            </a:r>
-          </a:p>
-        </p:txBody>
-      </p:sp>
-      <p:sp>
-        <p:nvSpPr>
-          <p:cNvPr id="34" name="Rectangle 33">
-            <a:extLst>
-              <a:ext uri="{FF2B5EF4-FFF2-40B4-BE49-F238E27FC236}">
-                <a16:creationId xmlns:a16="http://schemas.microsoft.com/office/drawing/2014/main" id="{9BED3722-DE00-706C-1FEF-87BE444AB70F}"/>
+              <a:rPr lang="fr-FR" sz="1600" dirty="0" smtClean="0"/>
+              <a:t>9</a:t>
+            </a:r>
+            <a:endParaRPr lang="fr-FR" sz="1600" dirty="0"/>
+          </a:p>
+        </p:txBody>
+      </p:sp>
+      <p:sp>
+        <p:nvSpPr>
+          <p:cNvPr id="56" name="Rectangle 55">
+            <a:extLst>
+              <a:ext uri="{FF2B5EF4-FFF2-40B4-BE49-F238E27FC236}">
+                <a16:creationId xmlns="" xmlns:a16="http://schemas.microsoft.com/office/drawing/2014/main" id="{D8DCA5EE-EC8C-762E-F627-A72AA8861359}"/>
               </a:ext>
             </a:extLst>
           </p:cNvPr>
@@ -8977,7 +9019,7 @@
         </p:nvSpPr>
         <p:spPr>
           <a:xfrm>
-            <a:off x="11327289" y="5198049"/>
+            <a:off x="10703028" y="5625691"/>
             <a:ext cx="387096" cy="369332"/>
           </a:xfrm>
           <a:prstGeom prst="rect">
@@ -9011,16 +9053,20 @@
           <a:lstStyle/>
           <a:p>
             <a:pPr algn="ctr"/>
+            <a:r>
+              <a:rPr lang="fr-FR" sz="1600" dirty="0" smtClean="0"/>
+              <a:t>8</a:t>
+            </a:r>
             <a:endParaRPr lang="fr-FR" sz="1600" dirty="0"/>
           </a:p>
         </p:txBody>
       </p:sp>
       <p:sp>
         <p:nvSpPr>
-          <p:cNvPr id="56" name="Rectangle 55">
-            <a:extLst>
-              <a:ext uri="{FF2B5EF4-FFF2-40B4-BE49-F238E27FC236}">
-                <a16:creationId xmlns:a16="http://schemas.microsoft.com/office/drawing/2014/main" id="{D8DCA5EE-EC8C-762E-F627-A72AA8861359}"/>
+          <p:cNvPr id="57" name="Rectangle 56">
+            <a:extLst>
+              <a:ext uri="{FF2B5EF4-FFF2-40B4-BE49-F238E27FC236}">
+                <a16:creationId xmlns="" xmlns:a16="http://schemas.microsoft.com/office/drawing/2014/main" id="{73BFF83E-CD23-C05E-0C43-DDC2DBC90EAF}"/>
               </a:ext>
             </a:extLst>
           </p:cNvPr>
@@ -9029,18 +9075,15 @@
         </p:nvSpPr>
         <p:spPr>
           <a:xfrm>
-            <a:off x="11327289" y="5598022"/>
-            <a:ext cx="387096" cy="369332"/>
+            <a:off x="10130029" y="1485258"/>
+            <a:ext cx="1554480" cy="146304"/>
           </a:xfrm>
           <a:prstGeom prst="rect">
             <a:avLst/>
           </a:prstGeom>
           <a:solidFill>
-            <a:srgbClr val="92D050"/>
+            <a:srgbClr val="00B0F0"/>
           </a:solidFill>
-          <a:ln>
-            <a:noFill/>
-          </a:ln>
         </p:spPr>
         <p:style>
           <a:lnRef idx="2">
@@ -9063,16 +9106,19 @@
           <a:lstStyle/>
           <a:p>
             <a:pPr algn="ctr"/>
-            <a:endParaRPr lang="fr-FR" sz="1600" dirty="0"/>
-          </a:p>
-        </p:txBody>
-      </p:sp>
-      <p:sp>
-        <p:nvSpPr>
-          <p:cNvPr id="57" name="Rectangle 56">
-            <a:extLst>
-              <a:ext uri="{FF2B5EF4-FFF2-40B4-BE49-F238E27FC236}">
-                <a16:creationId xmlns:a16="http://schemas.microsoft.com/office/drawing/2014/main" id="{73BFF83E-CD23-C05E-0C43-DDC2DBC90EAF}"/>
+            <a:r>
+              <a:rPr lang="fr-FR" sz="1100" dirty="0"/>
+              <a:t>ENTREPRISE</a:t>
+            </a:r>
+          </a:p>
+        </p:txBody>
+      </p:sp>
+      <p:sp>
+        <p:nvSpPr>
+          <p:cNvPr id="58" name="Rectangle 57">
+            <a:extLst>
+              <a:ext uri="{FF2B5EF4-FFF2-40B4-BE49-F238E27FC236}">
+                <a16:creationId xmlns="" xmlns:a16="http://schemas.microsoft.com/office/drawing/2014/main" id="{15CB116D-1016-8888-8DA0-C2E41081E8BF}"/>
               </a:ext>
             </a:extLst>
           </p:cNvPr>
@@ -9081,7 +9127,7 @@
         </p:nvSpPr>
         <p:spPr>
           <a:xfrm>
-            <a:off x="10130029" y="1485258"/>
+            <a:off x="10130029" y="2963188"/>
             <a:ext cx="1554480" cy="146304"/>
           </a:xfrm>
           <a:prstGeom prst="rect">
@@ -9121,10 +9167,10 @@
       </p:sp>
       <p:sp>
         <p:nvSpPr>
-          <p:cNvPr id="58" name="Rectangle 57">
-            <a:extLst>
-              <a:ext uri="{FF2B5EF4-FFF2-40B4-BE49-F238E27FC236}">
-                <a16:creationId xmlns:a16="http://schemas.microsoft.com/office/drawing/2014/main" id="{15CB116D-1016-8888-8DA0-C2E41081E8BF}"/>
+          <p:cNvPr id="59" name="Rectangle 58">
+            <a:extLst>
+              <a:ext uri="{FF2B5EF4-FFF2-40B4-BE49-F238E27FC236}">
+                <a16:creationId xmlns="" xmlns:a16="http://schemas.microsoft.com/office/drawing/2014/main" id="{16DF2A7E-C2C5-8E04-1F92-9CF79CBD9578}"/>
               </a:ext>
             </a:extLst>
           </p:cNvPr>
@@ -9133,7 +9179,7 @@
         </p:nvSpPr>
         <p:spPr>
           <a:xfrm>
-            <a:off x="10130029" y="2963188"/>
+            <a:off x="10130029" y="4942242"/>
             <a:ext cx="1554480" cy="146304"/>
           </a:xfrm>
           <a:prstGeom prst="rect">
@@ -9173,10 +9219,10 @@
       </p:sp>
       <p:sp>
         <p:nvSpPr>
-          <p:cNvPr id="59" name="Rectangle 58">
-            <a:extLst>
-              <a:ext uri="{FF2B5EF4-FFF2-40B4-BE49-F238E27FC236}">
-                <a16:creationId xmlns:a16="http://schemas.microsoft.com/office/drawing/2014/main" id="{16DF2A7E-C2C5-8E04-1F92-9CF79CBD9578}"/>
+          <p:cNvPr id="35" name="Rectangle 34">
+            <a:extLst>
+              <a:ext uri="{FF2B5EF4-FFF2-40B4-BE49-F238E27FC236}">
+                <a16:creationId xmlns="" xmlns:a16="http://schemas.microsoft.com/office/drawing/2014/main" id="{A0EB135E-EF9B-D1F5-E612-5F0F278D99FE}"/>
               </a:ext>
             </a:extLst>
           </p:cNvPr>
@@ -9185,15 +9231,18 @@
         </p:nvSpPr>
         <p:spPr>
           <a:xfrm>
-            <a:off x="10130029" y="4518731"/>
-            <a:ext cx="1554480" cy="146304"/>
+            <a:off x="11327289" y="3237259"/>
+            <a:ext cx="387096" cy="369332"/>
           </a:xfrm>
           <a:prstGeom prst="rect">
             <a:avLst/>
           </a:prstGeom>
           <a:solidFill>
-            <a:srgbClr val="00B0F0"/>
+            <a:srgbClr val="D6B4B2"/>
           </a:solidFill>
+          <a:ln>
+            <a:noFill/>
+          </a:ln>
         </p:spPr>
         <p:style>
           <a:lnRef idx="2">
@@ -9217,9 +9266,66 @@
           <a:p>
             <a:pPr algn="ctr"/>
             <a:r>
-              <a:rPr lang="fr-FR" sz="1100" dirty="0"/>
-              <a:t>ENTREPRISE</a:t>
-            </a:r>
+              <a:rPr lang="fr-FR" sz="1600" dirty="0" smtClean="0"/>
+              <a:t>3</a:t>
+            </a:r>
+            <a:endParaRPr lang="fr-FR" sz="1600" dirty="0"/>
+          </a:p>
+        </p:txBody>
+      </p:sp>
+      <p:sp>
+        <p:nvSpPr>
+          <p:cNvPr id="36" name="Rectangle 35">
+            <a:extLst>
+              <a:ext uri="{FF2B5EF4-FFF2-40B4-BE49-F238E27FC236}">
+                <a16:creationId xmlns="" xmlns:a16="http://schemas.microsoft.com/office/drawing/2014/main" id="{040E83FC-64FA-353E-D05A-9B1F5F5F25C8}"/>
+              </a:ext>
+            </a:extLst>
+          </p:cNvPr>
+          <p:cNvSpPr/>
+          <p:nvPr/>
+        </p:nvSpPr>
+        <p:spPr>
+          <a:xfrm>
+            <a:off x="9808481" y="4044280"/>
+            <a:ext cx="387096" cy="369332"/>
+          </a:xfrm>
+          <a:prstGeom prst="rect">
+            <a:avLst/>
+          </a:prstGeom>
+          <a:solidFill>
+            <a:srgbClr val="D6B4B2"/>
+          </a:solidFill>
+          <a:ln>
+            <a:noFill/>
+          </a:ln>
+        </p:spPr>
+        <p:style>
+          <a:lnRef idx="2">
+            <a:schemeClr val="accent1">
+              <a:shade val="15000"/>
+            </a:schemeClr>
+          </a:lnRef>
+          <a:fillRef idx="1">
+            <a:schemeClr val="accent1"/>
+          </a:fillRef>
+          <a:effectRef idx="0">
+            <a:schemeClr val="accent1"/>
+          </a:effectRef>
+          <a:fontRef idx="minor">
+            <a:schemeClr val="lt1"/>
+          </a:fontRef>
+        </p:style>
+        <p:txBody>
+          <a:bodyPr rtlCol="0" anchor="ctr"/>
+          <a:lstStyle/>
+          <a:p>
+            <a:pPr algn="ctr"/>
+            <a:r>
+              <a:rPr lang="fr-FR" sz="1600" dirty="0" smtClean="0"/>
+              <a:t>5</a:t>
+            </a:r>
+            <a:endParaRPr lang="fr-FR" sz="1600" dirty="0"/>
           </a:p>
         </p:txBody>
       </p:sp>
@@ -9244,7 +9350,7 @@
         <p:cNvPr id="1" name="">
           <a:extLst>
             <a:ext uri="{FF2B5EF4-FFF2-40B4-BE49-F238E27FC236}">
-              <a16:creationId xmlns:a16="http://schemas.microsoft.com/office/drawing/2014/main" id="{290B1B58-F078-3C7F-0130-1A2EBD43CC6B}"/>
+              <a16:creationId xmlns="" xmlns:a16="http://schemas.microsoft.com/office/drawing/2014/main" id="{290B1B58-F078-3C7F-0130-1A2EBD43CC6B}"/>
             </a:ext>
           </a:extLst>
         </p:cNvPr>
@@ -9264,7 +9370,7 @@
           <p:cNvPr id="3" name="Rectangle 2">
             <a:extLst>
               <a:ext uri="{FF2B5EF4-FFF2-40B4-BE49-F238E27FC236}">
-                <a16:creationId xmlns:a16="http://schemas.microsoft.com/office/drawing/2014/main" id="{41B0A54D-D5B9-02E6-9442-0CB0D1AABA17}"/>
+                <a16:creationId xmlns="" xmlns:a16="http://schemas.microsoft.com/office/drawing/2014/main" id="{41B0A54D-D5B9-02E6-9442-0CB0D1AABA17}"/>
               </a:ext>
             </a:extLst>
           </p:cNvPr>
@@ -9327,7 +9433,7 @@
           <p:cNvPr id="2" name="Titre 1">
             <a:extLst>
               <a:ext uri="{FF2B5EF4-FFF2-40B4-BE49-F238E27FC236}">
-                <a16:creationId xmlns:a16="http://schemas.microsoft.com/office/drawing/2014/main" id="{7A833A44-A1DB-9B3D-1FBE-7DA753DF1653}"/>
+                <a16:creationId xmlns="" xmlns:a16="http://schemas.microsoft.com/office/drawing/2014/main" id="{7A833A44-A1DB-9B3D-1FBE-7DA753DF1653}"/>
               </a:ext>
             </a:extLst>
           </p:cNvPr>
@@ -9386,7 +9492,7 @@
           <p:cNvPr id="7" name="Rectangle 6">
             <a:extLst>
               <a:ext uri="{FF2B5EF4-FFF2-40B4-BE49-F238E27FC236}">
-                <a16:creationId xmlns:a16="http://schemas.microsoft.com/office/drawing/2014/main" id="{7D72C413-2A56-552F-C04C-302D3C0719D8}"/>
+                <a16:creationId xmlns="" xmlns:a16="http://schemas.microsoft.com/office/drawing/2014/main" id="{7D72C413-2A56-552F-C04C-302D3C0719D8}"/>
               </a:ext>
             </a:extLst>
           </p:cNvPr>
@@ -9438,7 +9544,7 @@
           <p:cNvPr id="4" name="Image 3" descr="Une image contenant texte&#10;&#10;Description générée automatiquement">
             <a:extLst>
               <a:ext uri="{FF2B5EF4-FFF2-40B4-BE49-F238E27FC236}">
-                <a16:creationId xmlns:a16="http://schemas.microsoft.com/office/drawing/2014/main" id="{368120FE-3612-90D6-9645-E75662410823}"/>
+                <a16:creationId xmlns="" xmlns:a16="http://schemas.microsoft.com/office/drawing/2014/main" id="{368120FE-3612-90D6-9645-E75662410823}"/>
               </a:ext>
             </a:extLst>
           </p:cNvPr>
@@ -9474,7 +9580,7 @@
           <p:cNvPr id="53" name="Rectangle 52">
             <a:extLst>
               <a:ext uri="{FF2B5EF4-FFF2-40B4-BE49-F238E27FC236}">
-                <a16:creationId xmlns:a16="http://schemas.microsoft.com/office/drawing/2014/main" id="{57149524-46AB-A188-54FE-067CF6B8C3DD}"/>
+                <a16:creationId xmlns="" xmlns:a16="http://schemas.microsoft.com/office/drawing/2014/main" id="{57149524-46AB-A188-54FE-067CF6B8C3DD}"/>
               </a:ext>
             </a:extLst>
           </p:cNvPr>
@@ -9529,7 +9635,7 @@
           <p:cNvPr id="8" name="Espace réservé du contenu 2">
             <a:extLst>
               <a:ext uri="{FF2B5EF4-FFF2-40B4-BE49-F238E27FC236}">
-                <a16:creationId xmlns:a16="http://schemas.microsoft.com/office/drawing/2014/main" id="{A38A4034-2013-694E-317C-CA80A0C33FE0}"/>
+                <a16:creationId xmlns="" xmlns:a16="http://schemas.microsoft.com/office/drawing/2014/main" id="{A38A4034-2013-694E-317C-CA80A0C33FE0}"/>
               </a:ext>
             </a:extLst>
           </p:cNvPr>
@@ -9741,7 +9847,7 @@
           <p:cNvPr id="11" name="Image 10" descr="Une image contenant capture d’écran, Caractère coloré, texte&#10;&#10;Description générée automatiquement">
             <a:extLst>
               <a:ext uri="{FF2B5EF4-FFF2-40B4-BE49-F238E27FC236}">
-                <a16:creationId xmlns:a16="http://schemas.microsoft.com/office/drawing/2014/main" id="{FD206508-6A0D-9278-03BA-2221407EEC5D}"/>
+                <a16:creationId xmlns="" xmlns:a16="http://schemas.microsoft.com/office/drawing/2014/main" id="{FD206508-6A0D-9278-03BA-2221407EEC5D}"/>
               </a:ext>
             </a:extLst>
           </p:cNvPr>
@@ -9777,7 +9883,7 @@
           <p:cNvPr id="13" name="Image 12" descr="Une image contenant texte, capture d’écran, diagramme, cercle&#10;&#10;Description générée automatiquement">
             <a:extLst>
               <a:ext uri="{FF2B5EF4-FFF2-40B4-BE49-F238E27FC236}">
-                <a16:creationId xmlns:a16="http://schemas.microsoft.com/office/drawing/2014/main" id="{A0346C71-171A-E533-A986-735B50C564B6}"/>
+                <a16:creationId xmlns="" xmlns:a16="http://schemas.microsoft.com/office/drawing/2014/main" id="{A0346C71-171A-E533-A986-735B50C564B6}"/>
               </a:ext>
             </a:extLst>
           </p:cNvPr>
@@ -9813,7 +9919,7 @@
           <p:cNvPr id="14" name="Image 13" descr="Une image contenant diagramme, cercle, ligne&#10;&#10;Description générée automatiquement">
             <a:extLst>
               <a:ext uri="{FF2B5EF4-FFF2-40B4-BE49-F238E27FC236}">
-                <a16:creationId xmlns:a16="http://schemas.microsoft.com/office/drawing/2014/main" id="{04BE68A8-8134-4AD4-4F8E-BD9B5B050DE3}"/>
+                <a16:creationId xmlns="" xmlns:a16="http://schemas.microsoft.com/office/drawing/2014/main" id="{04BE68A8-8134-4AD4-4F8E-BD9B5B050DE3}"/>
               </a:ext>
             </a:extLst>
           </p:cNvPr>
@@ -9849,7 +9955,7 @@
           <p:cNvPr id="16" name="Rectangle 15">
             <a:extLst>
               <a:ext uri="{FF2B5EF4-FFF2-40B4-BE49-F238E27FC236}">
-                <a16:creationId xmlns:a16="http://schemas.microsoft.com/office/drawing/2014/main" id="{62DFEDC8-57F5-90F7-1AA8-818E5FEE26AC}"/>
+                <a16:creationId xmlns="" xmlns:a16="http://schemas.microsoft.com/office/drawing/2014/main" id="{62DFEDC8-57F5-90F7-1AA8-818E5FEE26AC}"/>
               </a:ext>
             </a:extLst>
           </p:cNvPr>
@@ -9904,7 +10010,7 @@
           <p:cNvPr id="18" name="ZoneTexte 17">
             <a:extLst>
               <a:ext uri="{FF2B5EF4-FFF2-40B4-BE49-F238E27FC236}">
-                <a16:creationId xmlns:a16="http://schemas.microsoft.com/office/drawing/2014/main" id="{04E68D62-ABE7-EBC3-669A-3114E2347A97}"/>
+                <a16:creationId xmlns="" xmlns:a16="http://schemas.microsoft.com/office/drawing/2014/main" id="{04E68D62-ABE7-EBC3-669A-3114E2347A97}"/>
               </a:ext>
             </a:extLst>
           </p:cNvPr>
@@ -9958,7 +10064,7 @@
           <p:cNvPr id="20" name="Image 19">
             <a:extLst>
               <a:ext uri="{FF2B5EF4-FFF2-40B4-BE49-F238E27FC236}">
-                <a16:creationId xmlns:a16="http://schemas.microsoft.com/office/drawing/2014/main" id="{44249670-F41B-AA61-2363-FA4D52A4C42C}"/>
+                <a16:creationId xmlns="" xmlns:a16="http://schemas.microsoft.com/office/drawing/2014/main" id="{44249670-F41B-AA61-2363-FA4D52A4C42C}"/>
               </a:ext>
             </a:extLst>
           </p:cNvPr>
@@ -9988,7 +10094,7 @@
           <p:cNvPr id="22" name="ZoneTexte 21">
             <a:extLst>
               <a:ext uri="{FF2B5EF4-FFF2-40B4-BE49-F238E27FC236}">
-                <a16:creationId xmlns:a16="http://schemas.microsoft.com/office/drawing/2014/main" id="{0B5C3842-53F6-1FE4-7F0D-3CC71590D351}"/>
+                <a16:creationId xmlns="" xmlns:a16="http://schemas.microsoft.com/office/drawing/2014/main" id="{0B5C3842-53F6-1FE4-7F0D-3CC71590D351}"/>
               </a:ext>
             </a:extLst>
           </p:cNvPr>
@@ -10034,7 +10140,7 @@
           <p:cNvPr id="23" name="Image 22">
             <a:extLst>
               <a:ext uri="{FF2B5EF4-FFF2-40B4-BE49-F238E27FC236}">
-                <a16:creationId xmlns:a16="http://schemas.microsoft.com/office/drawing/2014/main" id="{039CF40B-DA85-BE5C-32D6-086959B8B07B}"/>
+                <a16:creationId xmlns="" xmlns:a16="http://schemas.microsoft.com/office/drawing/2014/main" id="{039CF40B-DA85-BE5C-32D6-086959B8B07B}"/>
               </a:ext>
             </a:extLst>
           </p:cNvPr>
@@ -10064,7 +10170,7 @@
           <p:cNvPr id="24" name="Image 23" descr="Une image contenant texte, cercle, capture d’écran, diagramme&#10;&#10;Description générée automatiquement">
             <a:extLst>
               <a:ext uri="{FF2B5EF4-FFF2-40B4-BE49-F238E27FC236}">
-                <a16:creationId xmlns:a16="http://schemas.microsoft.com/office/drawing/2014/main" id="{3E9CBA34-4118-218A-CD1D-D98062E25AD0}"/>
+                <a16:creationId xmlns="" xmlns:a16="http://schemas.microsoft.com/office/drawing/2014/main" id="{3E9CBA34-4118-218A-CD1D-D98062E25AD0}"/>
               </a:ext>
             </a:extLst>
           </p:cNvPr>
@@ -10074,7 +10180,7 @@
           <p:nvPr/>
         </p:nvPicPr>
         <p:blipFill>
-          <a:blip r:embed="rId9">
+          <a:blip r:embed="rId9" cstate="print">
             <a:extLst>
               <a:ext uri="{28A0092B-C50C-407E-A947-70E740481C1C}">
                 <a14:useLocalDpi xmlns:a14="http://schemas.microsoft.com/office/drawing/2010/main" val="0"/>
@@ -10100,7 +10206,7 @@
           <p:cNvPr id="34" name="Rectangle 33">
             <a:extLst>
               <a:ext uri="{FF2B5EF4-FFF2-40B4-BE49-F238E27FC236}">
-                <a16:creationId xmlns:a16="http://schemas.microsoft.com/office/drawing/2014/main" id="{44EF7028-C890-F605-2508-B8EBDB5481D9}"/>
+                <a16:creationId xmlns="" xmlns:a16="http://schemas.microsoft.com/office/drawing/2014/main" id="{44EF7028-C890-F605-2508-B8EBDB5481D9}"/>
               </a:ext>
             </a:extLst>
           </p:cNvPr>
@@ -10166,10 +10272,10 @@
       </p:sp>
       <p:sp>
         <p:nvSpPr>
-          <p:cNvPr id="6" name="Rectangle 5">
-            <a:extLst>
-              <a:ext uri="{FF2B5EF4-FFF2-40B4-BE49-F238E27FC236}">
-                <a16:creationId xmlns:a16="http://schemas.microsoft.com/office/drawing/2014/main" id="{6A4CBE9C-FECD-76F9-0F1F-5D23F9166D9F}"/>
+          <p:cNvPr id="36" name="Rectangle 35">
+            <a:extLst>
+              <a:ext uri="{FF2B5EF4-FFF2-40B4-BE49-F238E27FC236}">
+                <a16:creationId xmlns="" xmlns:a16="http://schemas.microsoft.com/office/drawing/2014/main" id="{D8BE85BC-4EC6-68AE-673A-DB0EFDBD3520}"/>
               </a:ext>
             </a:extLst>
           </p:cNvPr>
@@ -10185,10 +10291,12 @@
             <a:avLst/>
           </a:prstGeom>
           <a:solidFill>
-            <a:srgbClr val="002060"/>
+            <a:schemeClr val="bg1"/>
           </a:solidFill>
           <a:ln>
-            <a:noFill/>
+            <a:solidFill>
+              <a:srgbClr val="002060"/>
+            </a:solidFill>
           </a:ln>
         </p:spPr>
         <p:style>
@@ -10218,10 +10326,10 @@
       </p:sp>
       <p:sp>
         <p:nvSpPr>
-          <p:cNvPr id="9" name="Rectangle 8">
-            <a:extLst>
-              <a:ext uri="{FF2B5EF4-FFF2-40B4-BE49-F238E27FC236}">
-                <a16:creationId xmlns:a16="http://schemas.microsoft.com/office/drawing/2014/main" id="{5A9A3346-027B-7D65-3408-EC2347BF10E1}"/>
+          <p:cNvPr id="37" name="Rectangle 36">
+            <a:extLst>
+              <a:ext uri="{FF2B5EF4-FFF2-40B4-BE49-F238E27FC236}">
+                <a16:creationId xmlns="" xmlns:a16="http://schemas.microsoft.com/office/drawing/2014/main" id="{E03280E2-A3F0-03CB-7863-26E43FDFAACD}"/>
               </a:ext>
             </a:extLst>
           </p:cNvPr>
@@ -10280,10 +10388,10 @@
       </p:sp>
       <p:sp>
         <p:nvSpPr>
-          <p:cNvPr id="10" name="Rectangle 9">
-            <a:extLst>
-              <a:ext uri="{FF2B5EF4-FFF2-40B4-BE49-F238E27FC236}">
-                <a16:creationId xmlns:a16="http://schemas.microsoft.com/office/drawing/2014/main" id="{C0D8E8BE-CBE2-90E6-E560-5E9658499451}"/>
+          <p:cNvPr id="38" name="Rectangle 37">
+            <a:extLst>
+              <a:ext uri="{FF2B5EF4-FFF2-40B4-BE49-F238E27FC236}">
+                <a16:creationId xmlns="" xmlns:a16="http://schemas.microsoft.com/office/drawing/2014/main" id="{098DA644-EC8C-61FE-90A2-778EF2B7DF36}"/>
               </a:ext>
             </a:extLst>
           </p:cNvPr>
@@ -10326,16 +10434,20 @@
           <a:lstStyle/>
           <a:p>
             <a:pPr algn="ctr"/>
+            <a:r>
+              <a:rPr lang="fr-FR" sz="1600" dirty="0" smtClean="0"/>
+              <a:t>1</a:t>
+            </a:r>
             <a:endParaRPr lang="fr-FR" sz="1600" dirty="0"/>
           </a:p>
         </p:txBody>
       </p:sp>
       <p:sp>
         <p:nvSpPr>
-          <p:cNvPr id="12" name="Rectangle 11">
-            <a:extLst>
-              <a:ext uri="{FF2B5EF4-FFF2-40B4-BE49-F238E27FC236}">
-                <a16:creationId xmlns:a16="http://schemas.microsoft.com/office/drawing/2014/main" id="{710AB959-E79A-3E06-D79A-DE539415E9DB}"/>
+          <p:cNvPr id="39" name="Rectangle 38">
+            <a:extLst>
+              <a:ext uri="{FF2B5EF4-FFF2-40B4-BE49-F238E27FC236}">
+                <a16:creationId xmlns="" xmlns:a16="http://schemas.microsoft.com/office/drawing/2014/main" id="{021B992C-31E5-6213-5092-4CCBE55F2B39}"/>
               </a:ext>
             </a:extLst>
           </p:cNvPr>
@@ -10378,16 +10490,20 @@
           <a:lstStyle/>
           <a:p>
             <a:pPr algn="ctr"/>
+            <a:r>
+              <a:rPr lang="fr-FR" sz="1600" dirty="0" smtClean="0"/>
+              <a:t>2</a:t>
+            </a:r>
             <a:endParaRPr lang="fr-FR" sz="1600" dirty="0"/>
           </a:p>
         </p:txBody>
       </p:sp>
       <p:sp>
         <p:nvSpPr>
-          <p:cNvPr id="15" name="Rectangle 14">
-            <a:extLst>
-              <a:ext uri="{FF2B5EF4-FFF2-40B4-BE49-F238E27FC236}">
-                <a16:creationId xmlns:a16="http://schemas.microsoft.com/office/drawing/2014/main" id="{51568A91-E337-BDA9-B84D-C7BF54311779}"/>
+          <p:cNvPr id="40" name="Rectangle 39">
+            <a:extLst>
+              <a:ext uri="{FF2B5EF4-FFF2-40B4-BE49-F238E27FC236}">
+                <a16:creationId xmlns="" xmlns:a16="http://schemas.microsoft.com/office/drawing/2014/main" id="{0D770ED0-474D-9648-552F-CF79EB8C490D}"/>
               </a:ext>
             </a:extLst>
           </p:cNvPr>
@@ -10396,7 +10512,7 @@
         </p:nvSpPr>
         <p:spPr>
           <a:xfrm>
-            <a:off x="11327289" y="3244334"/>
+            <a:off x="11327289" y="4467223"/>
             <a:ext cx="387096" cy="369332"/>
           </a:xfrm>
           <a:prstGeom prst="rect">
@@ -10430,16 +10546,20 @@
           <a:lstStyle/>
           <a:p>
             <a:pPr algn="ctr"/>
+            <a:r>
+              <a:rPr lang="fr-FR" sz="1600" dirty="0" smtClean="0"/>
+              <a:t>7</a:t>
+            </a:r>
             <a:endParaRPr lang="fr-FR" sz="1600" dirty="0"/>
           </a:p>
         </p:txBody>
       </p:sp>
       <p:sp>
         <p:nvSpPr>
-          <p:cNvPr id="17" name="Rectangle 16">
-            <a:extLst>
-              <a:ext uri="{FF2B5EF4-FFF2-40B4-BE49-F238E27FC236}">
-                <a16:creationId xmlns:a16="http://schemas.microsoft.com/office/drawing/2014/main" id="{5CAAD383-50E4-2A22-4592-CAFA2AE36F97}"/>
+          <p:cNvPr id="41" name="Rectangle 40">
+            <a:extLst>
+              <a:ext uri="{FF2B5EF4-FFF2-40B4-BE49-F238E27FC236}">
+                <a16:creationId xmlns="" xmlns:a16="http://schemas.microsoft.com/office/drawing/2014/main" id="{AD6AB33F-119B-3F1B-F6FF-1B69419C6403}"/>
               </a:ext>
             </a:extLst>
           </p:cNvPr>
@@ -10498,10 +10618,10 @@
       </p:sp>
       <p:sp>
         <p:nvSpPr>
-          <p:cNvPr id="21" name="Rectangle 20">
-            <a:extLst>
-              <a:ext uri="{FF2B5EF4-FFF2-40B4-BE49-F238E27FC236}">
-                <a16:creationId xmlns:a16="http://schemas.microsoft.com/office/drawing/2014/main" id="{491114F7-2A85-1C80-DEAE-B00BA2F1AC4A}"/>
+          <p:cNvPr id="44" name="Rectangle 43">
+            <a:extLst>
+              <a:ext uri="{FF2B5EF4-FFF2-40B4-BE49-F238E27FC236}">
+                <a16:creationId xmlns="" xmlns:a16="http://schemas.microsoft.com/office/drawing/2014/main" id="{FB575922-835C-241C-709B-AB12BD7E173C}"/>
               </a:ext>
             </a:extLst>
           </p:cNvPr>
@@ -10557,10 +10677,10 @@
       </p:sp>
       <p:sp>
         <p:nvSpPr>
-          <p:cNvPr id="42" name="Rectangle 41">
-            <a:extLst>
-              <a:ext uri="{FF2B5EF4-FFF2-40B4-BE49-F238E27FC236}">
-                <a16:creationId xmlns:a16="http://schemas.microsoft.com/office/drawing/2014/main" id="{1313DFA4-CDE4-559C-FF6D-7C2085D22D1F}"/>
+          <p:cNvPr id="45" name="Rectangle 44">
+            <a:extLst>
+              <a:ext uri="{FF2B5EF4-FFF2-40B4-BE49-F238E27FC236}">
+                <a16:creationId xmlns="" xmlns:a16="http://schemas.microsoft.com/office/drawing/2014/main" id="{86F7F968-D1E2-15AA-9E7A-58F30CD84152}"/>
               </a:ext>
             </a:extLst>
           </p:cNvPr>
@@ -10616,10 +10736,10 @@
       </p:sp>
       <p:sp>
         <p:nvSpPr>
-          <p:cNvPr id="43" name="Rectangle 42">
-            <a:extLst>
-              <a:ext uri="{FF2B5EF4-FFF2-40B4-BE49-F238E27FC236}">
-                <a16:creationId xmlns:a16="http://schemas.microsoft.com/office/drawing/2014/main" id="{0D12C3AF-B9BD-BC2C-C19D-5A9F109F0EA5}"/>
+          <p:cNvPr id="46" name="Rectangle 45">
+            <a:extLst>
+              <a:ext uri="{FF2B5EF4-FFF2-40B4-BE49-F238E27FC236}">
+                <a16:creationId xmlns="" xmlns:a16="http://schemas.microsoft.com/office/drawing/2014/main" id="{B4740186-9013-1F9D-7EA1-44560C103898}"/>
               </a:ext>
             </a:extLst>
           </p:cNvPr>
@@ -10662,16 +10782,20 @@
           <a:lstStyle/>
           <a:p>
             <a:pPr algn="ctr"/>
+            <a:r>
+              <a:rPr lang="fr-FR" sz="1600" dirty="0" smtClean="0"/>
+              <a:t>4</a:t>
+            </a:r>
             <a:endParaRPr lang="fr-FR" sz="1600" dirty="0"/>
           </a:p>
         </p:txBody>
       </p:sp>
       <p:sp>
         <p:nvSpPr>
-          <p:cNvPr id="54" name="Rectangle 53">
-            <a:extLst>
-              <a:ext uri="{FF2B5EF4-FFF2-40B4-BE49-F238E27FC236}">
-                <a16:creationId xmlns:a16="http://schemas.microsoft.com/office/drawing/2014/main" id="{3293A163-55C0-7C16-B256-54173F7B095B}"/>
+          <p:cNvPr id="47" name="Rectangle 46">
+            <a:extLst>
+              <a:ext uri="{FF2B5EF4-FFF2-40B4-BE49-F238E27FC236}">
+                <a16:creationId xmlns="" xmlns:a16="http://schemas.microsoft.com/office/drawing/2014/main" id="{040E83FC-64FA-353E-D05A-9B1F5F5F25C8}"/>
               </a:ext>
             </a:extLst>
           </p:cNvPr>
@@ -10687,7 +10811,7 @@
             <a:avLst/>
           </a:prstGeom>
           <a:solidFill>
-            <a:srgbClr val="D6B4B2"/>
+            <a:srgbClr val="002060"/>
           </a:solidFill>
           <a:ln>
             <a:noFill/>
@@ -10714,16 +10838,20 @@
           <a:lstStyle/>
           <a:p>
             <a:pPr algn="ctr"/>
+            <a:r>
+              <a:rPr lang="fr-FR" sz="1600" dirty="0" smtClean="0"/>
+              <a:t>6</a:t>
+            </a:r>
             <a:endParaRPr lang="fr-FR" sz="1600" dirty="0"/>
           </a:p>
         </p:txBody>
       </p:sp>
       <p:sp>
         <p:nvSpPr>
-          <p:cNvPr id="55" name="Rectangle 54">
-            <a:extLst>
-              <a:ext uri="{FF2B5EF4-FFF2-40B4-BE49-F238E27FC236}">
-                <a16:creationId xmlns:a16="http://schemas.microsoft.com/office/drawing/2014/main" id="{4A615843-4901-0B80-F36B-1075303C4FFF}"/>
+          <p:cNvPr id="48" name="Rectangle 47">
+            <a:extLst>
+              <a:ext uri="{FF2B5EF4-FFF2-40B4-BE49-F238E27FC236}">
+                <a16:creationId xmlns="" xmlns:a16="http://schemas.microsoft.com/office/drawing/2014/main" id="{5DF7F23C-EF65-9DE8-7387-640B14B54474}"/>
               </a:ext>
             </a:extLst>
           </p:cNvPr>
@@ -10732,14 +10860,14 @@
         </p:nvSpPr>
         <p:spPr>
           <a:xfrm>
-            <a:off x="11327289" y="4798076"/>
-            <a:ext cx="387096" cy="369332"/>
+            <a:off x="10332720" y="4479277"/>
+            <a:ext cx="761073" cy="369332"/>
           </a:xfrm>
           <a:prstGeom prst="rect">
             <a:avLst/>
           </a:prstGeom>
           <a:solidFill>
-            <a:srgbClr val="D6B4B2"/>
+            <a:srgbClr val="92D050"/>
           </a:solidFill>
           <a:ln>
             <a:noFill/>
@@ -10766,16 +10894,23 @@
           <a:lstStyle/>
           <a:p>
             <a:pPr algn="ctr"/>
-            <a:endParaRPr lang="fr-FR" sz="1600" dirty="0"/>
-          </a:p>
-        </p:txBody>
-      </p:sp>
-      <p:sp>
-        <p:nvSpPr>
-          <p:cNvPr id="56" name="Rectangle 55">
-            <a:extLst>
-              <a:ext uri="{FF2B5EF4-FFF2-40B4-BE49-F238E27FC236}">
-                <a16:creationId xmlns:a16="http://schemas.microsoft.com/office/drawing/2014/main" id="{C15FC978-57D5-EF75-CF0C-5B720A580CD0}"/>
+            <a:r>
+              <a:rPr lang="fr-FR" sz="1400" b="1" dirty="0">
+                <a:solidFill>
+                  <a:schemeClr val="tx1"/>
+                </a:solidFill>
+              </a:rPr>
+              <a:t>TP3a</a:t>
+            </a:r>
+          </a:p>
+        </p:txBody>
+      </p:sp>
+      <p:sp>
+        <p:nvSpPr>
+          <p:cNvPr id="49" name="Rectangle 48">
+            <a:extLst>
+              <a:ext uri="{FF2B5EF4-FFF2-40B4-BE49-F238E27FC236}">
+                <a16:creationId xmlns="" xmlns:a16="http://schemas.microsoft.com/office/drawing/2014/main" id="{D81CF90D-44C0-BB2F-D938-BCC20C548A91}"/>
               </a:ext>
             </a:extLst>
           </p:cNvPr>
@@ -10784,7 +10919,7 @@
         </p:nvSpPr>
         <p:spPr>
           <a:xfrm>
-            <a:off x="10332720" y="5198049"/>
+            <a:off x="10332720" y="5221587"/>
             <a:ext cx="761073" cy="369332"/>
           </a:xfrm>
           <a:prstGeom prst="rect">
@@ -10824,17 +10959,17 @@
                   <a:schemeClr val="tx1"/>
                 </a:solidFill>
               </a:rPr>
-              <a:t>TP3a</a:t>
-            </a:r>
-          </a:p>
-        </p:txBody>
-      </p:sp>
-      <p:sp>
-        <p:nvSpPr>
-          <p:cNvPr id="57" name="Rectangle 56">
-            <a:extLst>
-              <a:ext uri="{FF2B5EF4-FFF2-40B4-BE49-F238E27FC236}">
-                <a16:creationId xmlns:a16="http://schemas.microsoft.com/office/drawing/2014/main" id="{53A3C81A-9E71-58E1-42C3-92DA1CDB1313}"/>
+              <a:t>TP3b</a:t>
+            </a:r>
+          </a:p>
+        </p:txBody>
+      </p:sp>
+      <p:sp>
+        <p:nvSpPr>
+          <p:cNvPr id="50" name="Rectangle 49">
+            <a:extLst>
+              <a:ext uri="{FF2B5EF4-FFF2-40B4-BE49-F238E27FC236}">
+                <a16:creationId xmlns="" xmlns:a16="http://schemas.microsoft.com/office/drawing/2014/main" id="{9BED3722-DE00-706C-1FEF-87BE444AB70F}"/>
               </a:ext>
             </a:extLst>
           </p:cNvPr>
@@ -10843,8 +10978,8 @@
         </p:nvSpPr>
         <p:spPr>
           <a:xfrm>
-            <a:off x="10332720" y="5598022"/>
-            <a:ext cx="761073" cy="369332"/>
+            <a:off x="11327289" y="5621560"/>
+            <a:ext cx="387096" cy="369332"/>
           </a:xfrm>
           <a:prstGeom prst="rect">
             <a:avLst/>
@@ -10878,22 +11013,19 @@
           <a:p>
             <a:pPr algn="ctr"/>
             <a:r>
-              <a:rPr lang="fr-FR" sz="1400" b="1" dirty="0">
-                <a:solidFill>
-                  <a:schemeClr val="tx1"/>
-                </a:solidFill>
-              </a:rPr>
-              <a:t>TP3b</a:t>
-            </a:r>
-          </a:p>
-        </p:txBody>
-      </p:sp>
-      <p:sp>
-        <p:nvSpPr>
-          <p:cNvPr id="58" name="Rectangle 57">
-            <a:extLst>
-              <a:ext uri="{FF2B5EF4-FFF2-40B4-BE49-F238E27FC236}">
-                <a16:creationId xmlns:a16="http://schemas.microsoft.com/office/drawing/2014/main" id="{9B3C2A59-DF77-96E9-E94A-48B2481820C3}"/>
+              <a:rPr lang="fr-FR" sz="1600" dirty="0" smtClean="0"/>
+              <a:t>9</a:t>
+            </a:r>
+            <a:endParaRPr lang="fr-FR" sz="1600" dirty="0"/>
+          </a:p>
+        </p:txBody>
+      </p:sp>
+      <p:sp>
+        <p:nvSpPr>
+          <p:cNvPr id="51" name="Rectangle 50">
+            <a:extLst>
+              <a:ext uri="{FF2B5EF4-FFF2-40B4-BE49-F238E27FC236}">
+                <a16:creationId xmlns="" xmlns:a16="http://schemas.microsoft.com/office/drawing/2014/main" id="{D8DCA5EE-EC8C-762E-F627-A72AA8861359}"/>
               </a:ext>
             </a:extLst>
           </p:cNvPr>
@@ -10902,7 +11034,7 @@
         </p:nvSpPr>
         <p:spPr>
           <a:xfrm>
-            <a:off x="11327289" y="5198049"/>
+            <a:off x="10703028" y="5625691"/>
             <a:ext cx="387096" cy="369332"/>
           </a:xfrm>
           <a:prstGeom prst="rect">
@@ -10936,16 +11068,20 @@
           <a:lstStyle/>
           <a:p>
             <a:pPr algn="ctr"/>
+            <a:r>
+              <a:rPr lang="fr-FR" sz="1600" dirty="0" smtClean="0"/>
+              <a:t>8</a:t>
+            </a:r>
             <a:endParaRPr lang="fr-FR" sz="1600" dirty="0"/>
           </a:p>
         </p:txBody>
       </p:sp>
       <p:sp>
         <p:nvSpPr>
-          <p:cNvPr id="59" name="Rectangle 58">
-            <a:extLst>
-              <a:ext uri="{FF2B5EF4-FFF2-40B4-BE49-F238E27FC236}">
-                <a16:creationId xmlns:a16="http://schemas.microsoft.com/office/drawing/2014/main" id="{9041F479-B682-7AD7-D6F3-7CD9997F5458}"/>
+          <p:cNvPr id="52" name="Rectangle 51">
+            <a:extLst>
+              <a:ext uri="{FF2B5EF4-FFF2-40B4-BE49-F238E27FC236}">
+                <a16:creationId xmlns="" xmlns:a16="http://schemas.microsoft.com/office/drawing/2014/main" id="{73BFF83E-CD23-C05E-0C43-DDC2DBC90EAF}"/>
               </a:ext>
             </a:extLst>
           </p:cNvPr>
@@ -10954,18 +11090,15 @@
         </p:nvSpPr>
         <p:spPr>
           <a:xfrm>
-            <a:off x="11327289" y="5598022"/>
-            <a:ext cx="387096" cy="369332"/>
+            <a:off x="10130029" y="1485258"/>
+            <a:ext cx="1554480" cy="146304"/>
           </a:xfrm>
           <a:prstGeom prst="rect">
             <a:avLst/>
           </a:prstGeom>
           <a:solidFill>
-            <a:srgbClr val="92D050"/>
+            <a:srgbClr val="00B0F0"/>
           </a:solidFill>
-          <a:ln>
-            <a:noFill/>
-          </a:ln>
         </p:spPr>
         <p:style>
           <a:lnRef idx="2">
@@ -10988,16 +11121,19 @@
           <a:lstStyle/>
           <a:p>
             <a:pPr algn="ctr"/>
-            <a:endParaRPr lang="fr-FR" sz="1600" dirty="0"/>
-          </a:p>
-        </p:txBody>
-      </p:sp>
-      <p:sp>
-        <p:nvSpPr>
-          <p:cNvPr id="60" name="Rectangle 59">
-            <a:extLst>
-              <a:ext uri="{FF2B5EF4-FFF2-40B4-BE49-F238E27FC236}">
-                <a16:creationId xmlns:a16="http://schemas.microsoft.com/office/drawing/2014/main" id="{E090FC57-B713-F7F7-A919-C0F03959166D}"/>
+            <a:r>
+              <a:rPr lang="fr-FR" sz="1100" dirty="0"/>
+              <a:t>ENTREPRISE</a:t>
+            </a:r>
+          </a:p>
+        </p:txBody>
+      </p:sp>
+      <p:sp>
+        <p:nvSpPr>
+          <p:cNvPr id="63" name="Rectangle 62">
+            <a:extLst>
+              <a:ext uri="{FF2B5EF4-FFF2-40B4-BE49-F238E27FC236}">
+                <a16:creationId xmlns="" xmlns:a16="http://schemas.microsoft.com/office/drawing/2014/main" id="{15CB116D-1016-8888-8DA0-C2E41081E8BF}"/>
               </a:ext>
             </a:extLst>
           </p:cNvPr>
@@ -11006,7 +11142,7 @@
         </p:nvSpPr>
         <p:spPr>
           <a:xfrm>
-            <a:off x="10130029" y="1485258"/>
+            <a:off x="10130029" y="2963188"/>
             <a:ext cx="1554480" cy="146304"/>
           </a:xfrm>
           <a:prstGeom prst="rect">
@@ -11046,10 +11182,10 @@
       </p:sp>
       <p:sp>
         <p:nvSpPr>
-          <p:cNvPr id="61" name="Rectangle 60">
-            <a:extLst>
-              <a:ext uri="{FF2B5EF4-FFF2-40B4-BE49-F238E27FC236}">
-                <a16:creationId xmlns:a16="http://schemas.microsoft.com/office/drawing/2014/main" id="{493B4204-E5B5-3F47-EF0B-42784FA8478E}"/>
+          <p:cNvPr id="64" name="Rectangle 63">
+            <a:extLst>
+              <a:ext uri="{FF2B5EF4-FFF2-40B4-BE49-F238E27FC236}">
+                <a16:creationId xmlns="" xmlns:a16="http://schemas.microsoft.com/office/drawing/2014/main" id="{16DF2A7E-C2C5-8E04-1F92-9CF79CBD9578}"/>
               </a:ext>
             </a:extLst>
           </p:cNvPr>
@@ -11058,7 +11194,7 @@
         </p:nvSpPr>
         <p:spPr>
           <a:xfrm>
-            <a:off x="10130029" y="2963188"/>
+            <a:off x="10130029" y="4942242"/>
             <a:ext cx="1554480" cy="146304"/>
           </a:xfrm>
           <a:prstGeom prst="rect">
@@ -11098,10 +11234,10 @@
       </p:sp>
       <p:sp>
         <p:nvSpPr>
-          <p:cNvPr id="62" name="Rectangle 61">
-            <a:extLst>
-              <a:ext uri="{FF2B5EF4-FFF2-40B4-BE49-F238E27FC236}">
-                <a16:creationId xmlns:a16="http://schemas.microsoft.com/office/drawing/2014/main" id="{8155ECA5-E4FD-CB00-F759-0DE529C9AF2E}"/>
+          <p:cNvPr id="65" name="Rectangle 64">
+            <a:extLst>
+              <a:ext uri="{FF2B5EF4-FFF2-40B4-BE49-F238E27FC236}">
+                <a16:creationId xmlns="" xmlns:a16="http://schemas.microsoft.com/office/drawing/2014/main" id="{A0EB135E-EF9B-D1F5-E612-5F0F278D99FE}"/>
               </a:ext>
             </a:extLst>
           </p:cNvPr>
@@ -11110,15 +11246,18 @@
         </p:nvSpPr>
         <p:spPr>
           <a:xfrm>
-            <a:off x="10130029" y="4518731"/>
-            <a:ext cx="1554480" cy="146304"/>
+            <a:off x="11327289" y="3237259"/>
+            <a:ext cx="387096" cy="369332"/>
           </a:xfrm>
           <a:prstGeom prst="rect">
             <a:avLst/>
           </a:prstGeom>
           <a:solidFill>
-            <a:srgbClr val="00B0F0"/>
+            <a:srgbClr val="D6B4B2"/>
           </a:solidFill>
+          <a:ln>
+            <a:noFill/>
+          </a:ln>
         </p:spPr>
         <p:style>
           <a:lnRef idx="2">
@@ -11142,9 +11281,66 @@
           <a:p>
             <a:pPr algn="ctr"/>
             <a:r>
-              <a:rPr lang="fr-FR" sz="1100" dirty="0"/>
-              <a:t>ENTREPRISE</a:t>
-            </a:r>
+              <a:rPr lang="fr-FR" sz="1600" dirty="0" smtClean="0"/>
+              <a:t>3</a:t>
+            </a:r>
+            <a:endParaRPr lang="fr-FR" sz="1600" dirty="0"/>
+          </a:p>
+        </p:txBody>
+      </p:sp>
+      <p:sp>
+        <p:nvSpPr>
+          <p:cNvPr id="66" name="Rectangle 65">
+            <a:extLst>
+              <a:ext uri="{FF2B5EF4-FFF2-40B4-BE49-F238E27FC236}">
+                <a16:creationId xmlns="" xmlns:a16="http://schemas.microsoft.com/office/drawing/2014/main" id="{040E83FC-64FA-353E-D05A-9B1F5F5F25C8}"/>
+              </a:ext>
+            </a:extLst>
+          </p:cNvPr>
+          <p:cNvSpPr/>
+          <p:nvPr/>
+        </p:nvSpPr>
+        <p:spPr>
+          <a:xfrm>
+            <a:off x="9808481" y="4044280"/>
+            <a:ext cx="387096" cy="369332"/>
+          </a:xfrm>
+          <a:prstGeom prst="rect">
+            <a:avLst/>
+          </a:prstGeom>
+          <a:solidFill>
+            <a:srgbClr val="D6B4B2"/>
+          </a:solidFill>
+          <a:ln>
+            <a:noFill/>
+          </a:ln>
+        </p:spPr>
+        <p:style>
+          <a:lnRef idx="2">
+            <a:schemeClr val="accent1">
+              <a:shade val="15000"/>
+            </a:schemeClr>
+          </a:lnRef>
+          <a:fillRef idx="1">
+            <a:schemeClr val="accent1"/>
+          </a:fillRef>
+          <a:effectRef idx="0">
+            <a:schemeClr val="accent1"/>
+          </a:effectRef>
+          <a:fontRef idx="minor">
+            <a:schemeClr val="lt1"/>
+          </a:fontRef>
+        </p:style>
+        <p:txBody>
+          <a:bodyPr rtlCol="0" anchor="ctr"/>
+          <a:lstStyle/>
+          <a:p>
+            <a:pPr algn="ctr"/>
+            <a:r>
+              <a:rPr lang="fr-FR" sz="1600" dirty="0" smtClean="0"/>
+              <a:t>5</a:t>
+            </a:r>
+            <a:endParaRPr lang="fr-FR" sz="1600" dirty="0"/>
           </a:p>
         </p:txBody>
       </p:sp>
@@ -11169,7 +11365,7 @@
         <p:cNvPr id="1" name="">
           <a:extLst>
             <a:ext uri="{FF2B5EF4-FFF2-40B4-BE49-F238E27FC236}">
-              <a16:creationId xmlns:a16="http://schemas.microsoft.com/office/drawing/2014/main" id="{93CE303B-014A-633E-7EBE-AC14D0DFABB6}"/>
+              <a16:creationId xmlns="" xmlns:a16="http://schemas.microsoft.com/office/drawing/2014/main" id="{93CE303B-014A-633E-7EBE-AC14D0DFABB6}"/>
             </a:ext>
           </a:extLst>
         </p:cNvPr>
@@ -11189,7 +11385,7 @@
           <p:cNvPr id="3" name="Rectangle 2">
             <a:extLst>
               <a:ext uri="{FF2B5EF4-FFF2-40B4-BE49-F238E27FC236}">
-                <a16:creationId xmlns:a16="http://schemas.microsoft.com/office/drawing/2014/main" id="{BD4B6072-C59D-37C1-1688-3BD276015680}"/>
+                <a16:creationId xmlns="" xmlns:a16="http://schemas.microsoft.com/office/drawing/2014/main" id="{BD4B6072-C59D-37C1-1688-3BD276015680}"/>
               </a:ext>
             </a:extLst>
           </p:cNvPr>
@@ -11252,7 +11448,7 @@
           <p:cNvPr id="2" name="Titre 1">
             <a:extLst>
               <a:ext uri="{FF2B5EF4-FFF2-40B4-BE49-F238E27FC236}">
-                <a16:creationId xmlns:a16="http://schemas.microsoft.com/office/drawing/2014/main" id="{57E1E669-D844-DC35-8505-7DDBC216264E}"/>
+                <a16:creationId xmlns="" xmlns:a16="http://schemas.microsoft.com/office/drawing/2014/main" id="{57E1E669-D844-DC35-8505-7DDBC216264E}"/>
               </a:ext>
             </a:extLst>
           </p:cNvPr>
@@ -11315,7 +11511,7 @@
           <p:cNvPr id="7" name="Rectangle 6">
             <a:extLst>
               <a:ext uri="{FF2B5EF4-FFF2-40B4-BE49-F238E27FC236}">
-                <a16:creationId xmlns:a16="http://schemas.microsoft.com/office/drawing/2014/main" id="{BC9C6E6F-3E98-F0A0-D4C0-7D2F7CE478C5}"/>
+                <a16:creationId xmlns="" xmlns:a16="http://schemas.microsoft.com/office/drawing/2014/main" id="{BC9C6E6F-3E98-F0A0-D4C0-7D2F7CE478C5}"/>
               </a:ext>
             </a:extLst>
           </p:cNvPr>
@@ -11367,7 +11563,7 @@
           <p:cNvPr id="4" name="Image 3" descr="Une image contenant texte&#10;&#10;Description générée automatiquement">
             <a:extLst>
               <a:ext uri="{FF2B5EF4-FFF2-40B4-BE49-F238E27FC236}">
-                <a16:creationId xmlns:a16="http://schemas.microsoft.com/office/drawing/2014/main" id="{3C4D5E5E-37CA-181E-7A40-316F297116FE}"/>
+                <a16:creationId xmlns="" xmlns:a16="http://schemas.microsoft.com/office/drawing/2014/main" id="{3C4D5E5E-37CA-181E-7A40-316F297116FE}"/>
               </a:ext>
             </a:extLst>
           </p:cNvPr>
@@ -11403,7 +11599,7 @@
           <p:cNvPr id="53" name="Rectangle 52">
             <a:extLst>
               <a:ext uri="{FF2B5EF4-FFF2-40B4-BE49-F238E27FC236}">
-                <a16:creationId xmlns:a16="http://schemas.microsoft.com/office/drawing/2014/main" id="{E33C49E3-B9B0-062A-C5E8-6538A54BFB9C}"/>
+                <a16:creationId xmlns="" xmlns:a16="http://schemas.microsoft.com/office/drawing/2014/main" id="{E33C49E3-B9B0-062A-C5E8-6538A54BFB9C}"/>
               </a:ext>
             </a:extLst>
           </p:cNvPr>
@@ -11462,7 +11658,7 @@
           <p:cNvPr id="8" name="Espace réservé du contenu 2">
             <a:extLst>
               <a:ext uri="{FF2B5EF4-FFF2-40B4-BE49-F238E27FC236}">
-                <a16:creationId xmlns:a16="http://schemas.microsoft.com/office/drawing/2014/main" id="{107FB0E2-E114-85E4-4C51-3C577FFC6549}"/>
+                <a16:creationId xmlns="" xmlns:a16="http://schemas.microsoft.com/office/drawing/2014/main" id="{107FB0E2-E114-85E4-4C51-3C577FFC6549}"/>
               </a:ext>
             </a:extLst>
           </p:cNvPr>
@@ -11690,7 +11886,7 @@
           <p:cNvPr id="16" name="Rectangle 15">
             <a:extLst>
               <a:ext uri="{FF2B5EF4-FFF2-40B4-BE49-F238E27FC236}">
-                <a16:creationId xmlns:a16="http://schemas.microsoft.com/office/drawing/2014/main" id="{F627AC63-3856-EAC2-E7A6-F9B0D31A0708}"/>
+                <a16:creationId xmlns="" xmlns:a16="http://schemas.microsoft.com/office/drawing/2014/main" id="{F627AC63-3856-EAC2-E7A6-F9B0D31A0708}"/>
               </a:ext>
             </a:extLst>
           </p:cNvPr>
@@ -11749,7 +11945,7 @@
           <p:cNvPr id="2050" name="Picture 2">
             <a:extLst>
               <a:ext uri="{FF2B5EF4-FFF2-40B4-BE49-F238E27FC236}">
-                <a16:creationId xmlns:a16="http://schemas.microsoft.com/office/drawing/2014/main" id="{BE28CA3B-D87A-119A-A72F-E0286575163D}"/>
+                <a16:creationId xmlns="" xmlns:a16="http://schemas.microsoft.com/office/drawing/2014/main" id="{BE28CA3B-D87A-119A-A72F-E0286575163D}"/>
               </a:ext>
             </a:extLst>
           </p:cNvPr>
@@ -11796,7 +11992,7 @@
           <p:cNvPr id="12" name="Image 11">
             <a:extLst>
               <a:ext uri="{FF2B5EF4-FFF2-40B4-BE49-F238E27FC236}">
-                <a16:creationId xmlns:a16="http://schemas.microsoft.com/office/drawing/2014/main" id="{D9212513-8C8F-7D55-57F0-0E34557FCB2C}"/>
+                <a16:creationId xmlns="" xmlns:a16="http://schemas.microsoft.com/office/drawing/2014/main" id="{D9212513-8C8F-7D55-57F0-0E34557FCB2C}"/>
               </a:ext>
             </a:extLst>
           </p:cNvPr>
@@ -11826,7 +12022,7 @@
           <p:cNvPr id="15" name="ZoneTexte 14">
             <a:extLst>
               <a:ext uri="{FF2B5EF4-FFF2-40B4-BE49-F238E27FC236}">
-                <a16:creationId xmlns:a16="http://schemas.microsoft.com/office/drawing/2014/main" id="{E55F03FF-BDDA-0A9D-5717-8791350052A5}"/>
+                <a16:creationId xmlns="" xmlns:a16="http://schemas.microsoft.com/office/drawing/2014/main" id="{E55F03FF-BDDA-0A9D-5717-8791350052A5}"/>
               </a:ext>
             </a:extLst>
           </p:cNvPr>
@@ -11880,7 +12076,7 @@
           <p:cNvPr id="17" name="ZoneTexte 16">
             <a:extLst>
               <a:ext uri="{FF2B5EF4-FFF2-40B4-BE49-F238E27FC236}">
-                <a16:creationId xmlns:a16="http://schemas.microsoft.com/office/drawing/2014/main" id="{C189D0D3-B115-56F7-0DD9-2CB1F9FC7331}"/>
+                <a16:creationId xmlns="" xmlns:a16="http://schemas.microsoft.com/office/drawing/2014/main" id="{C189D0D3-B115-56F7-0DD9-2CB1F9FC7331}"/>
               </a:ext>
             </a:extLst>
           </p:cNvPr>
@@ -11934,7 +12130,7 @@
           <p:cNvPr id="21" name="ZoneTexte 20">
             <a:extLst>
               <a:ext uri="{FF2B5EF4-FFF2-40B4-BE49-F238E27FC236}">
-                <a16:creationId xmlns:a16="http://schemas.microsoft.com/office/drawing/2014/main" id="{060BF138-E45C-69DB-640C-D11B752AD634}"/>
+                <a16:creationId xmlns="" xmlns:a16="http://schemas.microsoft.com/office/drawing/2014/main" id="{060BF138-E45C-69DB-640C-D11B752AD634}"/>
               </a:ext>
             </a:extLst>
           </p:cNvPr>
@@ -12000,7 +12196,7 @@
           <p:cNvPr id="34" name="Rectangle 33">
             <a:extLst>
               <a:ext uri="{FF2B5EF4-FFF2-40B4-BE49-F238E27FC236}">
-                <a16:creationId xmlns:a16="http://schemas.microsoft.com/office/drawing/2014/main" id="{D35B99FC-8C3E-DAB2-0D3F-E7C9349BB23A}"/>
+                <a16:creationId xmlns="" xmlns:a16="http://schemas.microsoft.com/office/drawing/2014/main" id="{D35B99FC-8C3E-DAB2-0D3F-E7C9349BB23A}"/>
               </a:ext>
             </a:extLst>
           </p:cNvPr>
@@ -12078,10 +12274,10 @@
       </p:sp>
       <p:sp>
         <p:nvSpPr>
-          <p:cNvPr id="6" name="Rectangle 5">
-            <a:extLst>
-              <a:ext uri="{FF2B5EF4-FFF2-40B4-BE49-F238E27FC236}">
-                <a16:creationId xmlns:a16="http://schemas.microsoft.com/office/drawing/2014/main" id="{D6D3CE09-A0F2-D906-08B3-907AB761E278}"/>
+          <p:cNvPr id="33" name="Rectangle 32">
+            <a:extLst>
+              <a:ext uri="{FF2B5EF4-FFF2-40B4-BE49-F238E27FC236}">
+                <a16:creationId xmlns="" xmlns:a16="http://schemas.microsoft.com/office/drawing/2014/main" id="{D8BE85BC-4EC6-68AE-673A-DB0EFDBD3520}"/>
               </a:ext>
             </a:extLst>
           </p:cNvPr>
@@ -12097,10 +12293,12 @@
             <a:avLst/>
           </a:prstGeom>
           <a:solidFill>
-            <a:srgbClr val="002060"/>
+            <a:schemeClr val="bg1"/>
           </a:solidFill>
           <a:ln>
-            <a:noFill/>
+            <a:solidFill>
+              <a:srgbClr val="002060"/>
+            </a:solidFill>
           </a:ln>
         </p:spPr>
         <p:style>
@@ -12130,10 +12328,10 @@
       </p:sp>
       <p:sp>
         <p:nvSpPr>
-          <p:cNvPr id="9" name="Rectangle 8">
-            <a:extLst>
-              <a:ext uri="{FF2B5EF4-FFF2-40B4-BE49-F238E27FC236}">
-                <a16:creationId xmlns:a16="http://schemas.microsoft.com/office/drawing/2014/main" id="{155FBED7-C3F4-565E-CC26-E3B7C9B6B9B4}"/>
+          <p:cNvPr id="35" name="Rectangle 34">
+            <a:extLst>
+              <a:ext uri="{FF2B5EF4-FFF2-40B4-BE49-F238E27FC236}">
+                <a16:creationId xmlns="" xmlns:a16="http://schemas.microsoft.com/office/drawing/2014/main" id="{E03280E2-A3F0-03CB-7863-26E43FDFAACD}"/>
               </a:ext>
             </a:extLst>
           </p:cNvPr>
@@ -12192,10 +12390,10 @@
       </p:sp>
       <p:sp>
         <p:nvSpPr>
-          <p:cNvPr id="10" name="Rectangle 9">
-            <a:extLst>
-              <a:ext uri="{FF2B5EF4-FFF2-40B4-BE49-F238E27FC236}">
-                <a16:creationId xmlns:a16="http://schemas.microsoft.com/office/drawing/2014/main" id="{94572991-656D-18A3-343E-898A50B52CC8}"/>
+          <p:cNvPr id="36" name="Rectangle 35">
+            <a:extLst>
+              <a:ext uri="{FF2B5EF4-FFF2-40B4-BE49-F238E27FC236}">
+                <a16:creationId xmlns="" xmlns:a16="http://schemas.microsoft.com/office/drawing/2014/main" id="{098DA644-EC8C-61FE-90A2-778EF2B7DF36}"/>
               </a:ext>
             </a:extLst>
           </p:cNvPr>
@@ -12238,16 +12436,20 @@
           <a:lstStyle/>
           <a:p>
             <a:pPr algn="ctr"/>
+            <a:r>
+              <a:rPr lang="fr-FR" sz="1600" dirty="0" smtClean="0"/>
+              <a:t>1</a:t>
+            </a:r>
             <a:endParaRPr lang="fr-FR" sz="1600" dirty="0"/>
           </a:p>
         </p:txBody>
       </p:sp>
       <p:sp>
         <p:nvSpPr>
-          <p:cNvPr id="11" name="Rectangle 10">
-            <a:extLst>
-              <a:ext uri="{FF2B5EF4-FFF2-40B4-BE49-F238E27FC236}">
-                <a16:creationId xmlns:a16="http://schemas.microsoft.com/office/drawing/2014/main" id="{1345CBC1-B006-C8BB-5BB8-3941FF2FE593}"/>
+          <p:cNvPr id="37" name="Rectangle 36">
+            <a:extLst>
+              <a:ext uri="{FF2B5EF4-FFF2-40B4-BE49-F238E27FC236}">
+                <a16:creationId xmlns="" xmlns:a16="http://schemas.microsoft.com/office/drawing/2014/main" id="{021B992C-31E5-6213-5092-4CCBE55F2B39}"/>
               </a:ext>
             </a:extLst>
           </p:cNvPr>
@@ -12290,16 +12492,20 @@
           <a:lstStyle/>
           <a:p>
             <a:pPr algn="ctr"/>
+            <a:r>
+              <a:rPr lang="fr-FR" sz="1600" dirty="0" smtClean="0"/>
+              <a:t>2</a:t>
+            </a:r>
             <a:endParaRPr lang="fr-FR" sz="1600" dirty="0"/>
           </a:p>
         </p:txBody>
       </p:sp>
       <p:sp>
         <p:nvSpPr>
-          <p:cNvPr id="13" name="Rectangle 12">
-            <a:extLst>
-              <a:ext uri="{FF2B5EF4-FFF2-40B4-BE49-F238E27FC236}">
-                <a16:creationId xmlns:a16="http://schemas.microsoft.com/office/drawing/2014/main" id="{E2B61EED-BD23-9933-66E5-1053CA343392}"/>
+          <p:cNvPr id="38" name="Rectangle 37">
+            <a:extLst>
+              <a:ext uri="{FF2B5EF4-FFF2-40B4-BE49-F238E27FC236}">
+                <a16:creationId xmlns="" xmlns:a16="http://schemas.microsoft.com/office/drawing/2014/main" id="{0D770ED0-474D-9648-552F-CF79EB8C490D}"/>
               </a:ext>
             </a:extLst>
           </p:cNvPr>
@@ -12308,7 +12514,7 @@
         </p:nvSpPr>
         <p:spPr>
           <a:xfrm>
-            <a:off x="11327289" y="3244334"/>
+            <a:off x="11327289" y="4467223"/>
             <a:ext cx="387096" cy="369332"/>
           </a:xfrm>
           <a:prstGeom prst="rect">
@@ -12342,16 +12548,20 @@
           <a:lstStyle/>
           <a:p>
             <a:pPr algn="ctr"/>
+            <a:r>
+              <a:rPr lang="fr-FR" sz="1600" dirty="0" smtClean="0"/>
+              <a:t>7</a:t>
+            </a:r>
             <a:endParaRPr lang="fr-FR" sz="1600" dirty="0"/>
           </a:p>
         </p:txBody>
       </p:sp>
       <p:sp>
         <p:nvSpPr>
-          <p:cNvPr id="14" name="Rectangle 13">
-            <a:extLst>
-              <a:ext uri="{FF2B5EF4-FFF2-40B4-BE49-F238E27FC236}">
-                <a16:creationId xmlns:a16="http://schemas.microsoft.com/office/drawing/2014/main" id="{2E3604FA-050B-D45D-7B5E-15A06B8AD55A}"/>
+          <p:cNvPr id="39" name="Rectangle 38">
+            <a:extLst>
+              <a:ext uri="{FF2B5EF4-FFF2-40B4-BE49-F238E27FC236}">
+                <a16:creationId xmlns="" xmlns:a16="http://schemas.microsoft.com/office/drawing/2014/main" id="{AD6AB33F-119B-3F1B-F6FF-1B69419C6403}"/>
               </a:ext>
             </a:extLst>
           </p:cNvPr>
@@ -12410,10 +12620,10 @@
       </p:sp>
       <p:sp>
         <p:nvSpPr>
-          <p:cNvPr id="18" name="Rectangle 17">
-            <a:extLst>
-              <a:ext uri="{FF2B5EF4-FFF2-40B4-BE49-F238E27FC236}">
-                <a16:creationId xmlns:a16="http://schemas.microsoft.com/office/drawing/2014/main" id="{5ACDAC12-B8CF-0BF8-2EAE-07D8262F8E0D}"/>
+          <p:cNvPr id="40" name="Rectangle 39">
+            <a:extLst>
+              <a:ext uri="{FF2B5EF4-FFF2-40B4-BE49-F238E27FC236}">
+                <a16:creationId xmlns="" xmlns:a16="http://schemas.microsoft.com/office/drawing/2014/main" id="{FB575922-835C-241C-709B-AB12BD7E173C}"/>
               </a:ext>
             </a:extLst>
           </p:cNvPr>
@@ -12469,10 +12679,10 @@
       </p:sp>
       <p:sp>
         <p:nvSpPr>
-          <p:cNvPr id="20" name="Rectangle 19">
-            <a:extLst>
-              <a:ext uri="{FF2B5EF4-FFF2-40B4-BE49-F238E27FC236}">
-                <a16:creationId xmlns:a16="http://schemas.microsoft.com/office/drawing/2014/main" id="{C18CD909-5CE1-CA66-C74D-3F8139D7CAA9}"/>
+          <p:cNvPr id="41" name="Rectangle 40">
+            <a:extLst>
+              <a:ext uri="{FF2B5EF4-FFF2-40B4-BE49-F238E27FC236}">
+                <a16:creationId xmlns="" xmlns:a16="http://schemas.microsoft.com/office/drawing/2014/main" id="{86F7F968-D1E2-15AA-9E7A-58F30CD84152}"/>
               </a:ext>
             </a:extLst>
           </p:cNvPr>
@@ -12528,10 +12738,10 @@
       </p:sp>
       <p:sp>
         <p:nvSpPr>
-          <p:cNvPr id="22" name="Rectangle 21">
-            <a:extLst>
-              <a:ext uri="{FF2B5EF4-FFF2-40B4-BE49-F238E27FC236}">
-                <a16:creationId xmlns:a16="http://schemas.microsoft.com/office/drawing/2014/main" id="{3F5495B0-9EC7-5051-8882-B596C5C78A24}"/>
+          <p:cNvPr id="44" name="Rectangle 43">
+            <a:extLst>
+              <a:ext uri="{FF2B5EF4-FFF2-40B4-BE49-F238E27FC236}">
+                <a16:creationId xmlns="" xmlns:a16="http://schemas.microsoft.com/office/drawing/2014/main" id="{B4740186-9013-1F9D-7EA1-44560C103898}"/>
               </a:ext>
             </a:extLst>
           </p:cNvPr>
@@ -12574,16 +12784,20 @@
           <a:lstStyle/>
           <a:p>
             <a:pPr algn="ctr"/>
+            <a:r>
+              <a:rPr lang="fr-FR" sz="1600" dirty="0" smtClean="0"/>
+              <a:t>4</a:t>
+            </a:r>
             <a:endParaRPr lang="fr-FR" sz="1600" dirty="0"/>
           </a:p>
         </p:txBody>
       </p:sp>
       <p:sp>
         <p:nvSpPr>
-          <p:cNvPr id="23" name="Rectangle 22">
-            <a:extLst>
-              <a:ext uri="{FF2B5EF4-FFF2-40B4-BE49-F238E27FC236}">
-                <a16:creationId xmlns:a16="http://schemas.microsoft.com/office/drawing/2014/main" id="{CAEB40EA-DCAE-E589-4226-63163DBF1B66}"/>
+          <p:cNvPr id="45" name="Rectangle 44">
+            <a:extLst>
+              <a:ext uri="{FF2B5EF4-FFF2-40B4-BE49-F238E27FC236}">
+                <a16:creationId xmlns="" xmlns:a16="http://schemas.microsoft.com/office/drawing/2014/main" id="{040E83FC-64FA-353E-D05A-9B1F5F5F25C8}"/>
               </a:ext>
             </a:extLst>
           </p:cNvPr>
@@ -12599,7 +12813,7 @@
             <a:avLst/>
           </a:prstGeom>
           <a:solidFill>
-            <a:srgbClr val="D6B4B2"/>
+            <a:srgbClr val="002060"/>
           </a:solidFill>
           <a:ln>
             <a:noFill/>
@@ -12626,16 +12840,20 @@
           <a:lstStyle/>
           <a:p>
             <a:pPr algn="ctr"/>
+            <a:r>
+              <a:rPr lang="fr-FR" sz="1600" dirty="0" smtClean="0"/>
+              <a:t>6</a:t>
+            </a:r>
             <a:endParaRPr lang="fr-FR" sz="1600" dirty="0"/>
           </a:p>
         </p:txBody>
       </p:sp>
       <p:sp>
         <p:nvSpPr>
-          <p:cNvPr id="24" name="Rectangle 23">
-            <a:extLst>
-              <a:ext uri="{FF2B5EF4-FFF2-40B4-BE49-F238E27FC236}">
-                <a16:creationId xmlns:a16="http://schemas.microsoft.com/office/drawing/2014/main" id="{4DB41DB6-1678-D236-FD21-EC523FCB8B50}"/>
+          <p:cNvPr id="46" name="Rectangle 45">
+            <a:extLst>
+              <a:ext uri="{FF2B5EF4-FFF2-40B4-BE49-F238E27FC236}">
+                <a16:creationId xmlns="" xmlns:a16="http://schemas.microsoft.com/office/drawing/2014/main" id="{5DF7F23C-EF65-9DE8-7387-640B14B54474}"/>
               </a:ext>
             </a:extLst>
           </p:cNvPr>
@@ -12644,14 +12862,14 @@
         </p:nvSpPr>
         <p:spPr>
           <a:xfrm>
-            <a:off x="11327289" y="4798076"/>
-            <a:ext cx="387096" cy="369332"/>
+            <a:off x="10332720" y="4479277"/>
+            <a:ext cx="761073" cy="369332"/>
           </a:xfrm>
           <a:prstGeom prst="rect">
             <a:avLst/>
           </a:prstGeom>
           <a:solidFill>
-            <a:srgbClr val="D6B4B2"/>
+            <a:srgbClr val="92D050"/>
           </a:solidFill>
           <a:ln>
             <a:noFill/>
@@ -12678,16 +12896,23 @@
           <a:lstStyle/>
           <a:p>
             <a:pPr algn="ctr"/>
-            <a:endParaRPr lang="fr-FR" sz="1600" dirty="0"/>
-          </a:p>
-        </p:txBody>
-      </p:sp>
-      <p:sp>
-        <p:nvSpPr>
-          <p:cNvPr id="42" name="Rectangle 41">
-            <a:extLst>
-              <a:ext uri="{FF2B5EF4-FFF2-40B4-BE49-F238E27FC236}">
-                <a16:creationId xmlns:a16="http://schemas.microsoft.com/office/drawing/2014/main" id="{85DB0FA7-F153-0410-81B4-049F4B37C003}"/>
+            <a:r>
+              <a:rPr lang="fr-FR" sz="1400" b="1" dirty="0">
+                <a:solidFill>
+                  <a:schemeClr val="tx1"/>
+                </a:solidFill>
+              </a:rPr>
+              <a:t>TP3a</a:t>
+            </a:r>
+          </a:p>
+        </p:txBody>
+      </p:sp>
+      <p:sp>
+        <p:nvSpPr>
+          <p:cNvPr id="47" name="Rectangle 46">
+            <a:extLst>
+              <a:ext uri="{FF2B5EF4-FFF2-40B4-BE49-F238E27FC236}">
+                <a16:creationId xmlns="" xmlns:a16="http://schemas.microsoft.com/office/drawing/2014/main" id="{D81CF90D-44C0-BB2F-D938-BCC20C548A91}"/>
               </a:ext>
             </a:extLst>
           </p:cNvPr>
@@ -12696,7 +12921,7 @@
         </p:nvSpPr>
         <p:spPr>
           <a:xfrm>
-            <a:off x="10332720" y="5198049"/>
+            <a:off x="10332720" y="5221587"/>
             <a:ext cx="761073" cy="369332"/>
           </a:xfrm>
           <a:prstGeom prst="rect">
@@ -12736,17 +12961,17 @@
                   <a:schemeClr val="tx1"/>
                 </a:solidFill>
               </a:rPr>
-              <a:t>TP3a</a:t>
-            </a:r>
-          </a:p>
-        </p:txBody>
-      </p:sp>
-      <p:sp>
-        <p:nvSpPr>
-          <p:cNvPr id="43" name="Rectangle 42">
-            <a:extLst>
-              <a:ext uri="{FF2B5EF4-FFF2-40B4-BE49-F238E27FC236}">
-                <a16:creationId xmlns:a16="http://schemas.microsoft.com/office/drawing/2014/main" id="{0D6337BF-8A4B-4C52-964C-414B95898055}"/>
+              <a:t>TP3b</a:t>
+            </a:r>
+          </a:p>
+        </p:txBody>
+      </p:sp>
+      <p:sp>
+        <p:nvSpPr>
+          <p:cNvPr id="48" name="Rectangle 47">
+            <a:extLst>
+              <a:ext uri="{FF2B5EF4-FFF2-40B4-BE49-F238E27FC236}">
+                <a16:creationId xmlns="" xmlns:a16="http://schemas.microsoft.com/office/drawing/2014/main" id="{9BED3722-DE00-706C-1FEF-87BE444AB70F}"/>
               </a:ext>
             </a:extLst>
           </p:cNvPr>
@@ -12755,8 +12980,8 @@
         </p:nvSpPr>
         <p:spPr>
           <a:xfrm>
-            <a:off x="10332720" y="5598022"/>
-            <a:ext cx="761073" cy="369332"/>
+            <a:off x="11327289" y="5621560"/>
+            <a:ext cx="387096" cy="369332"/>
           </a:xfrm>
           <a:prstGeom prst="rect">
             <a:avLst/>
@@ -12790,22 +13015,19 @@
           <a:p>
             <a:pPr algn="ctr"/>
             <a:r>
-              <a:rPr lang="fr-FR" sz="1400" b="1" dirty="0">
-                <a:solidFill>
-                  <a:schemeClr val="tx1"/>
-                </a:solidFill>
-              </a:rPr>
-              <a:t>TP3b</a:t>
-            </a:r>
-          </a:p>
-        </p:txBody>
-      </p:sp>
-      <p:sp>
-        <p:nvSpPr>
-          <p:cNvPr id="54" name="Rectangle 53">
-            <a:extLst>
-              <a:ext uri="{FF2B5EF4-FFF2-40B4-BE49-F238E27FC236}">
-                <a16:creationId xmlns:a16="http://schemas.microsoft.com/office/drawing/2014/main" id="{302F071E-6F91-E3BD-43C7-13AD1303E2FF}"/>
+              <a:rPr lang="fr-FR" sz="1600" dirty="0" smtClean="0"/>
+              <a:t>9</a:t>
+            </a:r>
+            <a:endParaRPr lang="fr-FR" sz="1600" dirty="0"/>
+          </a:p>
+        </p:txBody>
+      </p:sp>
+      <p:sp>
+        <p:nvSpPr>
+          <p:cNvPr id="49" name="Rectangle 48">
+            <a:extLst>
+              <a:ext uri="{FF2B5EF4-FFF2-40B4-BE49-F238E27FC236}">
+                <a16:creationId xmlns="" xmlns:a16="http://schemas.microsoft.com/office/drawing/2014/main" id="{D8DCA5EE-EC8C-762E-F627-A72AA8861359}"/>
               </a:ext>
             </a:extLst>
           </p:cNvPr>
@@ -12814,7 +13036,7 @@
         </p:nvSpPr>
         <p:spPr>
           <a:xfrm>
-            <a:off x="11327289" y="5198049"/>
+            <a:off x="10703028" y="5625691"/>
             <a:ext cx="387096" cy="369332"/>
           </a:xfrm>
           <a:prstGeom prst="rect">
@@ -12848,16 +13070,20 @@
           <a:lstStyle/>
           <a:p>
             <a:pPr algn="ctr"/>
+            <a:r>
+              <a:rPr lang="fr-FR" sz="1600" dirty="0" smtClean="0"/>
+              <a:t>8</a:t>
+            </a:r>
             <a:endParaRPr lang="fr-FR" sz="1600" dirty="0"/>
           </a:p>
         </p:txBody>
       </p:sp>
       <p:sp>
         <p:nvSpPr>
-          <p:cNvPr id="55" name="Rectangle 54">
-            <a:extLst>
-              <a:ext uri="{FF2B5EF4-FFF2-40B4-BE49-F238E27FC236}">
-                <a16:creationId xmlns:a16="http://schemas.microsoft.com/office/drawing/2014/main" id="{E9BE628B-8BEE-E020-370D-A65E5F50E9C8}"/>
+          <p:cNvPr id="50" name="Rectangle 49">
+            <a:extLst>
+              <a:ext uri="{FF2B5EF4-FFF2-40B4-BE49-F238E27FC236}">
+                <a16:creationId xmlns="" xmlns:a16="http://schemas.microsoft.com/office/drawing/2014/main" id="{73BFF83E-CD23-C05E-0C43-DDC2DBC90EAF}"/>
               </a:ext>
             </a:extLst>
           </p:cNvPr>
@@ -12866,18 +13092,15 @@
         </p:nvSpPr>
         <p:spPr>
           <a:xfrm>
-            <a:off x="11327289" y="5598022"/>
-            <a:ext cx="387096" cy="369332"/>
+            <a:off x="10130029" y="1485258"/>
+            <a:ext cx="1554480" cy="146304"/>
           </a:xfrm>
           <a:prstGeom prst="rect">
             <a:avLst/>
           </a:prstGeom>
           <a:solidFill>
-            <a:srgbClr val="92D050"/>
+            <a:srgbClr val="00B0F0"/>
           </a:solidFill>
-          <a:ln>
-            <a:noFill/>
-          </a:ln>
         </p:spPr>
         <p:style>
           <a:lnRef idx="2">
@@ -12900,16 +13123,19 @@
           <a:lstStyle/>
           <a:p>
             <a:pPr algn="ctr"/>
-            <a:endParaRPr lang="fr-FR" sz="1600" dirty="0"/>
-          </a:p>
-        </p:txBody>
-      </p:sp>
-      <p:sp>
-        <p:nvSpPr>
-          <p:cNvPr id="56" name="Rectangle 55">
-            <a:extLst>
-              <a:ext uri="{FF2B5EF4-FFF2-40B4-BE49-F238E27FC236}">
-                <a16:creationId xmlns:a16="http://schemas.microsoft.com/office/drawing/2014/main" id="{A48C4FD6-D7CF-711C-6731-38CA1133CD17}"/>
+            <a:r>
+              <a:rPr lang="fr-FR" sz="1100" dirty="0"/>
+              <a:t>ENTREPRISE</a:t>
+            </a:r>
+          </a:p>
+        </p:txBody>
+      </p:sp>
+      <p:sp>
+        <p:nvSpPr>
+          <p:cNvPr id="51" name="Rectangle 50">
+            <a:extLst>
+              <a:ext uri="{FF2B5EF4-FFF2-40B4-BE49-F238E27FC236}">
+                <a16:creationId xmlns="" xmlns:a16="http://schemas.microsoft.com/office/drawing/2014/main" id="{15CB116D-1016-8888-8DA0-C2E41081E8BF}"/>
               </a:ext>
             </a:extLst>
           </p:cNvPr>
@@ -12918,7 +13144,7 @@
         </p:nvSpPr>
         <p:spPr>
           <a:xfrm>
-            <a:off x="10130029" y="1485258"/>
+            <a:off x="10130029" y="2963188"/>
             <a:ext cx="1554480" cy="146304"/>
           </a:xfrm>
           <a:prstGeom prst="rect">
@@ -12958,10 +13184,10 @@
       </p:sp>
       <p:sp>
         <p:nvSpPr>
-          <p:cNvPr id="57" name="Rectangle 56">
-            <a:extLst>
-              <a:ext uri="{FF2B5EF4-FFF2-40B4-BE49-F238E27FC236}">
-                <a16:creationId xmlns:a16="http://schemas.microsoft.com/office/drawing/2014/main" id="{9BE28F85-9694-DA43-C9B1-0C93D7C0A1A8}"/>
+          <p:cNvPr id="52" name="Rectangle 51">
+            <a:extLst>
+              <a:ext uri="{FF2B5EF4-FFF2-40B4-BE49-F238E27FC236}">
+                <a16:creationId xmlns="" xmlns:a16="http://schemas.microsoft.com/office/drawing/2014/main" id="{16DF2A7E-C2C5-8E04-1F92-9CF79CBD9578}"/>
               </a:ext>
             </a:extLst>
           </p:cNvPr>
@@ -12970,7 +13196,7 @@
         </p:nvSpPr>
         <p:spPr>
           <a:xfrm>
-            <a:off x="10130029" y="2963188"/>
+            <a:off x="10130029" y="4942242"/>
             <a:ext cx="1554480" cy="146304"/>
           </a:xfrm>
           <a:prstGeom prst="rect">
@@ -13010,10 +13236,10 @@
       </p:sp>
       <p:sp>
         <p:nvSpPr>
-          <p:cNvPr id="58" name="Rectangle 57">
-            <a:extLst>
-              <a:ext uri="{FF2B5EF4-FFF2-40B4-BE49-F238E27FC236}">
-                <a16:creationId xmlns:a16="http://schemas.microsoft.com/office/drawing/2014/main" id="{09868E21-9D60-DCFB-17CF-E73E8EDE7F9E}"/>
+          <p:cNvPr id="59" name="Rectangle 58">
+            <a:extLst>
+              <a:ext uri="{FF2B5EF4-FFF2-40B4-BE49-F238E27FC236}">
+                <a16:creationId xmlns="" xmlns:a16="http://schemas.microsoft.com/office/drawing/2014/main" id="{A0EB135E-EF9B-D1F5-E612-5F0F278D99FE}"/>
               </a:ext>
             </a:extLst>
           </p:cNvPr>
@@ -13022,15 +13248,18 @@
         </p:nvSpPr>
         <p:spPr>
           <a:xfrm>
-            <a:off x="10130029" y="4518731"/>
-            <a:ext cx="1554480" cy="146304"/>
+            <a:off x="11327289" y="3237259"/>
+            <a:ext cx="387096" cy="369332"/>
           </a:xfrm>
           <a:prstGeom prst="rect">
             <a:avLst/>
           </a:prstGeom>
           <a:solidFill>
-            <a:srgbClr val="00B0F0"/>
+            <a:srgbClr val="D6B4B2"/>
           </a:solidFill>
+          <a:ln>
+            <a:noFill/>
+          </a:ln>
         </p:spPr>
         <p:style>
           <a:lnRef idx="2">
@@ -13054,9 +13283,66 @@
           <a:p>
             <a:pPr algn="ctr"/>
             <a:r>
-              <a:rPr lang="fr-FR" sz="1100" dirty="0"/>
-              <a:t>ENTREPRISE</a:t>
-            </a:r>
+              <a:rPr lang="fr-FR" sz="1600" dirty="0" smtClean="0"/>
+              <a:t>3</a:t>
+            </a:r>
+            <a:endParaRPr lang="fr-FR" sz="1600" dirty="0"/>
+          </a:p>
+        </p:txBody>
+      </p:sp>
+      <p:sp>
+        <p:nvSpPr>
+          <p:cNvPr id="60" name="Rectangle 59">
+            <a:extLst>
+              <a:ext uri="{FF2B5EF4-FFF2-40B4-BE49-F238E27FC236}">
+                <a16:creationId xmlns="" xmlns:a16="http://schemas.microsoft.com/office/drawing/2014/main" id="{040E83FC-64FA-353E-D05A-9B1F5F5F25C8}"/>
+              </a:ext>
+            </a:extLst>
+          </p:cNvPr>
+          <p:cNvSpPr/>
+          <p:nvPr/>
+        </p:nvSpPr>
+        <p:spPr>
+          <a:xfrm>
+            <a:off x="9808481" y="4044280"/>
+            <a:ext cx="387096" cy="369332"/>
+          </a:xfrm>
+          <a:prstGeom prst="rect">
+            <a:avLst/>
+          </a:prstGeom>
+          <a:solidFill>
+            <a:srgbClr val="D6B4B2"/>
+          </a:solidFill>
+          <a:ln>
+            <a:noFill/>
+          </a:ln>
+        </p:spPr>
+        <p:style>
+          <a:lnRef idx="2">
+            <a:schemeClr val="accent1">
+              <a:shade val="15000"/>
+            </a:schemeClr>
+          </a:lnRef>
+          <a:fillRef idx="1">
+            <a:schemeClr val="accent1"/>
+          </a:fillRef>
+          <a:effectRef idx="0">
+            <a:schemeClr val="accent1"/>
+          </a:effectRef>
+          <a:fontRef idx="minor">
+            <a:schemeClr val="lt1"/>
+          </a:fontRef>
+        </p:style>
+        <p:txBody>
+          <a:bodyPr rtlCol="0" anchor="ctr"/>
+          <a:lstStyle/>
+          <a:p>
+            <a:pPr algn="ctr"/>
+            <a:r>
+              <a:rPr lang="fr-FR" sz="1600" dirty="0" smtClean="0"/>
+              <a:t>5</a:t>
+            </a:r>
+            <a:endParaRPr lang="fr-FR" sz="1600" dirty="0"/>
           </a:p>
         </p:txBody>
       </p:sp>
@@ -13081,7 +13367,7 @@
         <p:cNvPr id="1" name="">
           <a:extLst>
             <a:ext uri="{FF2B5EF4-FFF2-40B4-BE49-F238E27FC236}">
-              <a16:creationId xmlns:a16="http://schemas.microsoft.com/office/drawing/2014/main" id="{C7293255-D3A1-E9EE-75F7-8CF981A3E63B}"/>
+              <a16:creationId xmlns="" xmlns:a16="http://schemas.microsoft.com/office/drawing/2014/main" id="{C7293255-D3A1-E9EE-75F7-8CF981A3E63B}"/>
             </a:ext>
           </a:extLst>
         </p:cNvPr>
@@ -13101,7 +13387,7 @@
           <p:cNvPr id="13" name="Image 12" descr="Une image contenant Caractère coloré, capture d’écran, cercle&#10;&#10;Description générée automatiquement">
             <a:extLst>
               <a:ext uri="{FF2B5EF4-FFF2-40B4-BE49-F238E27FC236}">
-                <a16:creationId xmlns:a16="http://schemas.microsoft.com/office/drawing/2014/main" id="{8A23C983-CBA0-7A26-69A1-FA18BFCE8F24}"/>
+                <a16:creationId xmlns="" xmlns:a16="http://schemas.microsoft.com/office/drawing/2014/main" id="{8A23C983-CBA0-7A26-69A1-FA18BFCE8F24}"/>
               </a:ext>
             </a:extLst>
           </p:cNvPr>
@@ -13137,7 +13423,7 @@
           <p:cNvPr id="3" name="Rectangle 2">
             <a:extLst>
               <a:ext uri="{FF2B5EF4-FFF2-40B4-BE49-F238E27FC236}">
-                <a16:creationId xmlns:a16="http://schemas.microsoft.com/office/drawing/2014/main" id="{42BE0EC6-6A12-2CB4-7DD8-89ED894F2FD5}"/>
+                <a16:creationId xmlns="" xmlns:a16="http://schemas.microsoft.com/office/drawing/2014/main" id="{42BE0EC6-6A12-2CB4-7DD8-89ED894F2FD5}"/>
               </a:ext>
             </a:extLst>
           </p:cNvPr>
@@ -13200,7 +13486,7 @@
           <p:cNvPr id="2" name="Titre 1">
             <a:extLst>
               <a:ext uri="{FF2B5EF4-FFF2-40B4-BE49-F238E27FC236}">
-                <a16:creationId xmlns:a16="http://schemas.microsoft.com/office/drawing/2014/main" id="{CCD4DA90-1A67-8BAB-2941-7382D814332A}"/>
+                <a16:creationId xmlns="" xmlns:a16="http://schemas.microsoft.com/office/drawing/2014/main" id="{CCD4DA90-1A67-8BAB-2941-7382D814332A}"/>
               </a:ext>
             </a:extLst>
           </p:cNvPr>
@@ -13259,7 +13545,7 @@
           <p:cNvPr id="7" name="Rectangle 6">
             <a:extLst>
               <a:ext uri="{FF2B5EF4-FFF2-40B4-BE49-F238E27FC236}">
-                <a16:creationId xmlns:a16="http://schemas.microsoft.com/office/drawing/2014/main" id="{93547985-68A5-A169-8C99-8AF0E138E863}"/>
+                <a16:creationId xmlns="" xmlns:a16="http://schemas.microsoft.com/office/drawing/2014/main" id="{93547985-68A5-A169-8C99-8AF0E138E863}"/>
               </a:ext>
             </a:extLst>
           </p:cNvPr>
@@ -13311,7 +13597,7 @@
           <p:cNvPr id="4" name="Image 3" descr="Une image contenant texte&#10;&#10;Description générée automatiquement">
             <a:extLst>
               <a:ext uri="{FF2B5EF4-FFF2-40B4-BE49-F238E27FC236}">
-                <a16:creationId xmlns:a16="http://schemas.microsoft.com/office/drawing/2014/main" id="{9DE2E9F7-41F0-0DAE-0C56-14406819A12F}"/>
+                <a16:creationId xmlns="" xmlns:a16="http://schemas.microsoft.com/office/drawing/2014/main" id="{9DE2E9F7-41F0-0DAE-0C56-14406819A12F}"/>
               </a:ext>
             </a:extLst>
           </p:cNvPr>
@@ -13347,7 +13633,7 @@
           <p:cNvPr id="53" name="Rectangle 52">
             <a:extLst>
               <a:ext uri="{FF2B5EF4-FFF2-40B4-BE49-F238E27FC236}">
-                <a16:creationId xmlns:a16="http://schemas.microsoft.com/office/drawing/2014/main" id="{12F39415-3E21-0455-CB07-DAB7BDD797FA}"/>
+                <a16:creationId xmlns="" xmlns:a16="http://schemas.microsoft.com/office/drawing/2014/main" id="{12F39415-3E21-0455-CB07-DAB7BDD797FA}"/>
               </a:ext>
             </a:extLst>
           </p:cNvPr>
@@ -13406,7 +13692,7 @@
           <p:cNvPr id="8" name="Espace réservé du contenu 2">
             <a:extLst>
               <a:ext uri="{FF2B5EF4-FFF2-40B4-BE49-F238E27FC236}">
-                <a16:creationId xmlns:a16="http://schemas.microsoft.com/office/drawing/2014/main" id="{A4F39768-9C57-9BEB-2B05-879774034514}"/>
+                <a16:creationId xmlns="" xmlns:a16="http://schemas.microsoft.com/office/drawing/2014/main" id="{A4F39768-9C57-9BEB-2B05-879774034514}"/>
               </a:ext>
             </a:extLst>
           </p:cNvPr>
@@ -13618,7 +13904,7 @@
           <p:cNvPr id="16" name="Rectangle 15">
             <a:extLst>
               <a:ext uri="{FF2B5EF4-FFF2-40B4-BE49-F238E27FC236}">
-                <a16:creationId xmlns:a16="http://schemas.microsoft.com/office/drawing/2014/main" id="{7CFD061B-661D-E3BA-264D-1A173A890CCC}"/>
+                <a16:creationId xmlns="" xmlns:a16="http://schemas.microsoft.com/office/drawing/2014/main" id="{7CFD061B-661D-E3BA-264D-1A173A890CCC}"/>
               </a:ext>
             </a:extLst>
           </p:cNvPr>
@@ -13677,7 +13963,7 @@
           <p:cNvPr id="15" name="ZoneTexte 14">
             <a:extLst>
               <a:ext uri="{FF2B5EF4-FFF2-40B4-BE49-F238E27FC236}">
-                <a16:creationId xmlns:a16="http://schemas.microsoft.com/office/drawing/2014/main" id="{CFBAA731-A61E-4C08-B09B-DE0FB9A2968B}"/>
+                <a16:creationId xmlns="" xmlns:a16="http://schemas.microsoft.com/office/drawing/2014/main" id="{CFBAA731-A61E-4C08-B09B-DE0FB9A2968B}"/>
               </a:ext>
             </a:extLst>
           </p:cNvPr>
@@ -13731,7 +14017,7 @@
           <p:cNvPr id="17" name="ZoneTexte 16">
             <a:extLst>
               <a:ext uri="{FF2B5EF4-FFF2-40B4-BE49-F238E27FC236}">
-                <a16:creationId xmlns:a16="http://schemas.microsoft.com/office/drawing/2014/main" id="{D9001F57-1811-7015-CFA5-0DFF30ACBCC4}"/>
+                <a16:creationId xmlns="" xmlns:a16="http://schemas.microsoft.com/office/drawing/2014/main" id="{D9001F57-1811-7015-CFA5-0DFF30ACBCC4}"/>
               </a:ext>
             </a:extLst>
           </p:cNvPr>
@@ -13785,7 +14071,7 @@
           <p:cNvPr id="21" name="ZoneTexte 20">
             <a:extLst>
               <a:ext uri="{FF2B5EF4-FFF2-40B4-BE49-F238E27FC236}">
-                <a16:creationId xmlns:a16="http://schemas.microsoft.com/office/drawing/2014/main" id="{DAECE632-8149-DF4E-BE8C-4E848FAF4598}"/>
+                <a16:creationId xmlns="" xmlns:a16="http://schemas.microsoft.com/office/drawing/2014/main" id="{DAECE632-8149-DF4E-BE8C-4E848FAF4598}"/>
               </a:ext>
             </a:extLst>
           </p:cNvPr>
@@ -13839,7 +14125,7 @@
           <p:cNvPr id="10" name="Rectangle 9">
             <a:extLst>
               <a:ext uri="{FF2B5EF4-FFF2-40B4-BE49-F238E27FC236}">
-                <a16:creationId xmlns:a16="http://schemas.microsoft.com/office/drawing/2014/main" id="{EED69DC2-F9E1-A6AA-9537-112ECC0916C3}"/>
+                <a16:creationId xmlns="" xmlns:a16="http://schemas.microsoft.com/office/drawing/2014/main" id="{EED69DC2-F9E1-A6AA-9537-112ECC0916C3}"/>
               </a:ext>
             </a:extLst>
           </p:cNvPr>
@@ -13909,7 +14195,7 @@
           <p:cNvPr id="11" name="Image 10" descr="Une image contenant capture d’écran, Caractère coloré&#10;&#10;Description générée automatiquement">
             <a:extLst>
               <a:ext uri="{FF2B5EF4-FFF2-40B4-BE49-F238E27FC236}">
-                <a16:creationId xmlns:a16="http://schemas.microsoft.com/office/drawing/2014/main" id="{3D8DDC86-0761-47DF-C3A5-FE551E011B57}"/>
+                <a16:creationId xmlns="" xmlns:a16="http://schemas.microsoft.com/office/drawing/2014/main" id="{3D8DDC86-0761-47DF-C3A5-FE551E011B57}"/>
               </a:ext>
             </a:extLst>
           </p:cNvPr>
@@ -13919,7 +14205,7 @@
           <p:nvPr/>
         </p:nvPicPr>
         <p:blipFill>
-          <a:blip r:embed="rId5">
+          <a:blip r:embed="rId5" cstate="print">
             <a:extLst>
               <a:ext uri="{28A0092B-C50C-407E-A947-70E740481C1C}">
                 <a14:useLocalDpi xmlns:a14="http://schemas.microsoft.com/office/drawing/2010/main" val="0"/>
@@ -13945,7 +14231,7 @@
           <p:cNvPr id="14" name="Image 13" descr="Une image contenant diagramme, Tracé, texte, ligne&#10;&#10;Description générée automatiquement">
             <a:extLst>
               <a:ext uri="{FF2B5EF4-FFF2-40B4-BE49-F238E27FC236}">
-                <a16:creationId xmlns:a16="http://schemas.microsoft.com/office/drawing/2014/main" id="{133E8C73-EEC5-3087-1B2F-808F5C687359}"/>
+                <a16:creationId xmlns="" xmlns:a16="http://schemas.microsoft.com/office/drawing/2014/main" id="{133E8C73-EEC5-3087-1B2F-808F5C687359}"/>
               </a:ext>
             </a:extLst>
           </p:cNvPr>
@@ -13981,7 +14267,7 @@
           <p:cNvPr id="20" name="Image 19">
             <a:extLst>
               <a:ext uri="{FF2B5EF4-FFF2-40B4-BE49-F238E27FC236}">
-                <a16:creationId xmlns:a16="http://schemas.microsoft.com/office/drawing/2014/main" id="{7108DBA5-F9BA-045A-72D0-EE38A9AFB1FF}"/>
+                <a16:creationId xmlns="" xmlns:a16="http://schemas.microsoft.com/office/drawing/2014/main" id="{7108DBA5-F9BA-045A-72D0-EE38A9AFB1FF}"/>
               </a:ext>
             </a:extLst>
           </p:cNvPr>
@@ -14011,7 +14297,7 @@
           <p:cNvPr id="23" name="Image 22">
             <a:extLst>
               <a:ext uri="{FF2B5EF4-FFF2-40B4-BE49-F238E27FC236}">
-                <a16:creationId xmlns:a16="http://schemas.microsoft.com/office/drawing/2014/main" id="{740BA44B-4171-3A61-6348-724CA16FCFD3}"/>
+                <a16:creationId xmlns="" xmlns:a16="http://schemas.microsoft.com/office/drawing/2014/main" id="{740BA44B-4171-3A61-6348-724CA16FCFD3}"/>
               </a:ext>
             </a:extLst>
           </p:cNvPr>
@@ -14041,7 +14327,7 @@
           <p:cNvPr id="43" name="Image 42">
             <a:extLst>
               <a:ext uri="{FF2B5EF4-FFF2-40B4-BE49-F238E27FC236}">
-                <a16:creationId xmlns:a16="http://schemas.microsoft.com/office/drawing/2014/main" id="{6509A60C-CEB9-FA91-51AA-C5F533459EBB}"/>
+                <a16:creationId xmlns="" xmlns:a16="http://schemas.microsoft.com/office/drawing/2014/main" id="{6509A60C-CEB9-FA91-51AA-C5F533459EBB}"/>
               </a:ext>
             </a:extLst>
           </p:cNvPr>
@@ -14068,10 +14354,10 @@
       </p:pic>
       <p:sp>
         <p:nvSpPr>
-          <p:cNvPr id="6" name="Rectangle 5">
-            <a:extLst>
-              <a:ext uri="{FF2B5EF4-FFF2-40B4-BE49-F238E27FC236}">
-                <a16:creationId xmlns:a16="http://schemas.microsoft.com/office/drawing/2014/main" id="{39F7ED21-9F86-1708-DA8B-49C529EAF914}"/>
+          <p:cNvPr id="37" name="Rectangle 36">
+            <a:extLst>
+              <a:ext uri="{FF2B5EF4-FFF2-40B4-BE49-F238E27FC236}">
+                <a16:creationId xmlns="" xmlns:a16="http://schemas.microsoft.com/office/drawing/2014/main" id="{D8BE85BC-4EC6-68AE-673A-DB0EFDBD3520}"/>
               </a:ext>
             </a:extLst>
           </p:cNvPr>
@@ -14087,10 +14373,12 @@
             <a:avLst/>
           </a:prstGeom>
           <a:solidFill>
-            <a:srgbClr val="002060"/>
+            <a:schemeClr val="bg1"/>
           </a:solidFill>
           <a:ln>
-            <a:noFill/>
+            <a:solidFill>
+              <a:srgbClr val="002060"/>
+            </a:solidFill>
           </a:ln>
         </p:spPr>
         <p:style>
@@ -14120,10 +14408,10 @@
       </p:sp>
       <p:sp>
         <p:nvSpPr>
-          <p:cNvPr id="9" name="Rectangle 8">
-            <a:extLst>
-              <a:ext uri="{FF2B5EF4-FFF2-40B4-BE49-F238E27FC236}">
-                <a16:creationId xmlns:a16="http://schemas.microsoft.com/office/drawing/2014/main" id="{73CBC69B-9407-C284-5271-2EFCA0D64B62}"/>
+          <p:cNvPr id="38" name="Rectangle 37">
+            <a:extLst>
+              <a:ext uri="{FF2B5EF4-FFF2-40B4-BE49-F238E27FC236}">
+                <a16:creationId xmlns="" xmlns:a16="http://schemas.microsoft.com/office/drawing/2014/main" id="{E03280E2-A3F0-03CB-7863-26E43FDFAACD}"/>
               </a:ext>
             </a:extLst>
           </p:cNvPr>
@@ -14182,10 +14470,10 @@
       </p:sp>
       <p:sp>
         <p:nvSpPr>
-          <p:cNvPr id="12" name="Rectangle 11">
-            <a:extLst>
-              <a:ext uri="{FF2B5EF4-FFF2-40B4-BE49-F238E27FC236}">
-                <a16:creationId xmlns:a16="http://schemas.microsoft.com/office/drawing/2014/main" id="{365B4D0B-CFBC-B1AE-BA5F-5998D7418C5E}"/>
+          <p:cNvPr id="39" name="Rectangle 38">
+            <a:extLst>
+              <a:ext uri="{FF2B5EF4-FFF2-40B4-BE49-F238E27FC236}">
+                <a16:creationId xmlns="" xmlns:a16="http://schemas.microsoft.com/office/drawing/2014/main" id="{098DA644-EC8C-61FE-90A2-778EF2B7DF36}"/>
               </a:ext>
             </a:extLst>
           </p:cNvPr>
@@ -14228,16 +14516,20 @@
           <a:lstStyle/>
           <a:p>
             <a:pPr algn="ctr"/>
+            <a:r>
+              <a:rPr lang="fr-FR" sz="1600" dirty="0" smtClean="0"/>
+              <a:t>1</a:t>
+            </a:r>
             <a:endParaRPr lang="fr-FR" sz="1600" dirty="0"/>
           </a:p>
         </p:txBody>
       </p:sp>
       <p:sp>
         <p:nvSpPr>
-          <p:cNvPr id="18" name="Rectangle 17">
-            <a:extLst>
-              <a:ext uri="{FF2B5EF4-FFF2-40B4-BE49-F238E27FC236}">
-                <a16:creationId xmlns:a16="http://schemas.microsoft.com/office/drawing/2014/main" id="{DC031022-488B-A770-6754-42E20C8D9817}"/>
+          <p:cNvPr id="40" name="Rectangle 39">
+            <a:extLst>
+              <a:ext uri="{FF2B5EF4-FFF2-40B4-BE49-F238E27FC236}">
+                <a16:creationId xmlns="" xmlns:a16="http://schemas.microsoft.com/office/drawing/2014/main" id="{021B992C-31E5-6213-5092-4CCBE55F2B39}"/>
               </a:ext>
             </a:extLst>
           </p:cNvPr>
@@ -14280,16 +14572,20 @@
           <a:lstStyle/>
           <a:p>
             <a:pPr algn="ctr"/>
+            <a:r>
+              <a:rPr lang="fr-FR" sz="1600" dirty="0" smtClean="0"/>
+              <a:t>2</a:t>
+            </a:r>
             <a:endParaRPr lang="fr-FR" sz="1600" dirty="0"/>
           </a:p>
         </p:txBody>
       </p:sp>
       <p:sp>
         <p:nvSpPr>
-          <p:cNvPr id="22" name="Rectangle 21">
-            <a:extLst>
-              <a:ext uri="{FF2B5EF4-FFF2-40B4-BE49-F238E27FC236}">
-                <a16:creationId xmlns:a16="http://schemas.microsoft.com/office/drawing/2014/main" id="{8A94C4E2-0500-4C7C-05F2-BD3468A94918}"/>
+          <p:cNvPr id="41" name="Rectangle 40">
+            <a:extLst>
+              <a:ext uri="{FF2B5EF4-FFF2-40B4-BE49-F238E27FC236}">
+                <a16:creationId xmlns="" xmlns:a16="http://schemas.microsoft.com/office/drawing/2014/main" id="{0D770ED0-474D-9648-552F-CF79EB8C490D}"/>
               </a:ext>
             </a:extLst>
           </p:cNvPr>
@@ -14298,7 +14594,7 @@
         </p:nvSpPr>
         <p:spPr>
           <a:xfrm>
-            <a:off x="11327289" y="3244334"/>
+            <a:off x="11327289" y="4467223"/>
             <a:ext cx="387096" cy="369332"/>
           </a:xfrm>
           <a:prstGeom prst="rect">
@@ -14332,16 +14628,20 @@
           <a:lstStyle/>
           <a:p>
             <a:pPr algn="ctr"/>
+            <a:r>
+              <a:rPr lang="fr-FR" sz="1600" dirty="0" smtClean="0"/>
+              <a:t>7</a:t>
+            </a:r>
             <a:endParaRPr lang="fr-FR" sz="1600" dirty="0"/>
           </a:p>
         </p:txBody>
       </p:sp>
       <p:sp>
         <p:nvSpPr>
-          <p:cNvPr id="24" name="Rectangle 23">
-            <a:extLst>
-              <a:ext uri="{FF2B5EF4-FFF2-40B4-BE49-F238E27FC236}">
-                <a16:creationId xmlns:a16="http://schemas.microsoft.com/office/drawing/2014/main" id="{A55B308B-A0ED-EE71-101C-399C83BDB167}"/>
+          <p:cNvPr id="44" name="Rectangle 43">
+            <a:extLst>
+              <a:ext uri="{FF2B5EF4-FFF2-40B4-BE49-F238E27FC236}">
+                <a16:creationId xmlns="" xmlns:a16="http://schemas.microsoft.com/office/drawing/2014/main" id="{AD6AB33F-119B-3F1B-F6FF-1B69419C6403}"/>
               </a:ext>
             </a:extLst>
           </p:cNvPr>
@@ -14400,10 +14700,10 @@
       </p:sp>
       <p:sp>
         <p:nvSpPr>
-          <p:cNvPr id="34" name="Rectangle 33">
-            <a:extLst>
-              <a:ext uri="{FF2B5EF4-FFF2-40B4-BE49-F238E27FC236}">
-                <a16:creationId xmlns:a16="http://schemas.microsoft.com/office/drawing/2014/main" id="{231AEDD3-1185-3F17-602B-541D15EE942F}"/>
+          <p:cNvPr id="45" name="Rectangle 44">
+            <a:extLst>
+              <a:ext uri="{FF2B5EF4-FFF2-40B4-BE49-F238E27FC236}">
+                <a16:creationId xmlns="" xmlns:a16="http://schemas.microsoft.com/office/drawing/2014/main" id="{FB575922-835C-241C-709B-AB12BD7E173C}"/>
               </a:ext>
             </a:extLst>
           </p:cNvPr>
@@ -14459,10 +14759,10 @@
       </p:sp>
       <p:sp>
         <p:nvSpPr>
-          <p:cNvPr id="42" name="Rectangle 41">
-            <a:extLst>
-              <a:ext uri="{FF2B5EF4-FFF2-40B4-BE49-F238E27FC236}">
-                <a16:creationId xmlns:a16="http://schemas.microsoft.com/office/drawing/2014/main" id="{AF371019-338B-2DC6-52EA-B5A48F5182A4}"/>
+          <p:cNvPr id="46" name="Rectangle 45">
+            <a:extLst>
+              <a:ext uri="{FF2B5EF4-FFF2-40B4-BE49-F238E27FC236}">
+                <a16:creationId xmlns="" xmlns:a16="http://schemas.microsoft.com/office/drawing/2014/main" id="{86F7F968-D1E2-15AA-9E7A-58F30CD84152}"/>
               </a:ext>
             </a:extLst>
           </p:cNvPr>
@@ -14518,10 +14818,10 @@
       </p:sp>
       <p:sp>
         <p:nvSpPr>
-          <p:cNvPr id="54" name="Rectangle 53">
-            <a:extLst>
-              <a:ext uri="{FF2B5EF4-FFF2-40B4-BE49-F238E27FC236}">
-                <a16:creationId xmlns:a16="http://schemas.microsoft.com/office/drawing/2014/main" id="{421C9F5D-1E77-15A6-E1BB-DAECB8850FC7}"/>
+          <p:cNvPr id="47" name="Rectangle 46">
+            <a:extLst>
+              <a:ext uri="{FF2B5EF4-FFF2-40B4-BE49-F238E27FC236}">
+                <a16:creationId xmlns="" xmlns:a16="http://schemas.microsoft.com/office/drawing/2014/main" id="{B4740186-9013-1F9D-7EA1-44560C103898}"/>
               </a:ext>
             </a:extLst>
           </p:cNvPr>
@@ -14564,16 +14864,20 @@
           <a:lstStyle/>
           <a:p>
             <a:pPr algn="ctr"/>
+            <a:r>
+              <a:rPr lang="fr-FR" sz="1600" dirty="0" smtClean="0"/>
+              <a:t>4</a:t>
+            </a:r>
             <a:endParaRPr lang="fr-FR" sz="1600" dirty="0"/>
           </a:p>
         </p:txBody>
       </p:sp>
       <p:sp>
         <p:nvSpPr>
-          <p:cNvPr id="55" name="Rectangle 54">
-            <a:extLst>
-              <a:ext uri="{FF2B5EF4-FFF2-40B4-BE49-F238E27FC236}">
-                <a16:creationId xmlns:a16="http://schemas.microsoft.com/office/drawing/2014/main" id="{4F6759B8-415B-D0A2-38C2-C5E92753F63C}"/>
+          <p:cNvPr id="48" name="Rectangle 47">
+            <a:extLst>
+              <a:ext uri="{FF2B5EF4-FFF2-40B4-BE49-F238E27FC236}">
+                <a16:creationId xmlns="" xmlns:a16="http://schemas.microsoft.com/office/drawing/2014/main" id="{040E83FC-64FA-353E-D05A-9B1F5F5F25C8}"/>
               </a:ext>
             </a:extLst>
           </p:cNvPr>
@@ -14589,7 +14893,7 @@
             <a:avLst/>
           </a:prstGeom>
           <a:solidFill>
-            <a:srgbClr val="D6B4B2"/>
+            <a:srgbClr val="002060"/>
           </a:solidFill>
           <a:ln>
             <a:noFill/>
@@ -14616,16 +14920,20 @@
           <a:lstStyle/>
           <a:p>
             <a:pPr algn="ctr"/>
+            <a:r>
+              <a:rPr lang="fr-FR" sz="1600" dirty="0" smtClean="0"/>
+              <a:t>6</a:t>
+            </a:r>
             <a:endParaRPr lang="fr-FR" sz="1600" dirty="0"/>
           </a:p>
         </p:txBody>
       </p:sp>
       <p:sp>
         <p:nvSpPr>
-          <p:cNvPr id="56" name="Rectangle 55">
-            <a:extLst>
-              <a:ext uri="{FF2B5EF4-FFF2-40B4-BE49-F238E27FC236}">
-                <a16:creationId xmlns:a16="http://schemas.microsoft.com/office/drawing/2014/main" id="{253F4A8D-E29F-6625-7744-66DCCF0CDC1E}"/>
+          <p:cNvPr id="49" name="Rectangle 48">
+            <a:extLst>
+              <a:ext uri="{FF2B5EF4-FFF2-40B4-BE49-F238E27FC236}">
+                <a16:creationId xmlns="" xmlns:a16="http://schemas.microsoft.com/office/drawing/2014/main" id="{5DF7F23C-EF65-9DE8-7387-640B14B54474}"/>
               </a:ext>
             </a:extLst>
           </p:cNvPr>
@@ -14634,14 +14942,14 @@
         </p:nvSpPr>
         <p:spPr>
           <a:xfrm>
-            <a:off x="11327289" y="4798076"/>
-            <a:ext cx="387096" cy="369332"/>
+            <a:off x="10332720" y="4479277"/>
+            <a:ext cx="761073" cy="369332"/>
           </a:xfrm>
           <a:prstGeom prst="rect">
             <a:avLst/>
           </a:prstGeom>
           <a:solidFill>
-            <a:srgbClr val="D6B4B2"/>
+            <a:srgbClr val="92D050"/>
           </a:solidFill>
           <a:ln>
             <a:noFill/>
@@ -14668,16 +14976,23 @@
           <a:lstStyle/>
           <a:p>
             <a:pPr algn="ctr"/>
-            <a:endParaRPr lang="fr-FR" sz="1600" dirty="0"/>
-          </a:p>
-        </p:txBody>
-      </p:sp>
-      <p:sp>
-        <p:nvSpPr>
-          <p:cNvPr id="57" name="Rectangle 56">
-            <a:extLst>
-              <a:ext uri="{FF2B5EF4-FFF2-40B4-BE49-F238E27FC236}">
-                <a16:creationId xmlns:a16="http://schemas.microsoft.com/office/drawing/2014/main" id="{F3644267-393D-B72B-8EF1-30F3F59D7AA1}"/>
+            <a:r>
+              <a:rPr lang="fr-FR" sz="1400" b="1" dirty="0">
+                <a:solidFill>
+                  <a:schemeClr val="tx1"/>
+                </a:solidFill>
+              </a:rPr>
+              <a:t>TP3a</a:t>
+            </a:r>
+          </a:p>
+        </p:txBody>
+      </p:sp>
+      <p:sp>
+        <p:nvSpPr>
+          <p:cNvPr id="50" name="Rectangle 49">
+            <a:extLst>
+              <a:ext uri="{FF2B5EF4-FFF2-40B4-BE49-F238E27FC236}">
+                <a16:creationId xmlns="" xmlns:a16="http://schemas.microsoft.com/office/drawing/2014/main" id="{D81CF90D-44C0-BB2F-D938-BCC20C548A91}"/>
               </a:ext>
             </a:extLst>
           </p:cNvPr>
@@ -14686,7 +15001,7 @@
         </p:nvSpPr>
         <p:spPr>
           <a:xfrm>
-            <a:off x="10332720" y="5198049"/>
+            <a:off x="10332720" y="5221587"/>
             <a:ext cx="761073" cy="369332"/>
           </a:xfrm>
           <a:prstGeom prst="rect">
@@ -14726,17 +15041,17 @@
                   <a:schemeClr val="tx1"/>
                 </a:solidFill>
               </a:rPr>
-              <a:t>TP3a</a:t>
-            </a:r>
-          </a:p>
-        </p:txBody>
-      </p:sp>
-      <p:sp>
-        <p:nvSpPr>
-          <p:cNvPr id="58" name="Rectangle 57">
-            <a:extLst>
-              <a:ext uri="{FF2B5EF4-FFF2-40B4-BE49-F238E27FC236}">
-                <a16:creationId xmlns:a16="http://schemas.microsoft.com/office/drawing/2014/main" id="{C222A4F5-BE04-F25B-4CB3-05D5BEF601FC}"/>
+              <a:t>TP3b</a:t>
+            </a:r>
+          </a:p>
+        </p:txBody>
+      </p:sp>
+      <p:sp>
+        <p:nvSpPr>
+          <p:cNvPr id="51" name="Rectangle 50">
+            <a:extLst>
+              <a:ext uri="{FF2B5EF4-FFF2-40B4-BE49-F238E27FC236}">
+                <a16:creationId xmlns="" xmlns:a16="http://schemas.microsoft.com/office/drawing/2014/main" id="{9BED3722-DE00-706C-1FEF-87BE444AB70F}"/>
               </a:ext>
             </a:extLst>
           </p:cNvPr>
@@ -14745,8 +15060,8 @@
         </p:nvSpPr>
         <p:spPr>
           <a:xfrm>
-            <a:off x="10332720" y="5598022"/>
-            <a:ext cx="761073" cy="369332"/>
+            <a:off x="11327289" y="5621560"/>
+            <a:ext cx="387096" cy="369332"/>
           </a:xfrm>
           <a:prstGeom prst="rect">
             <a:avLst/>
@@ -14780,22 +15095,19 @@
           <a:p>
             <a:pPr algn="ctr"/>
             <a:r>
-              <a:rPr lang="fr-FR" sz="1400" b="1" dirty="0">
-                <a:solidFill>
-                  <a:schemeClr val="tx1"/>
-                </a:solidFill>
-              </a:rPr>
-              <a:t>TP3b</a:t>
-            </a:r>
-          </a:p>
-        </p:txBody>
-      </p:sp>
-      <p:sp>
-        <p:nvSpPr>
-          <p:cNvPr id="59" name="Rectangle 58">
-            <a:extLst>
-              <a:ext uri="{FF2B5EF4-FFF2-40B4-BE49-F238E27FC236}">
-                <a16:creationId xmlns:a16="http://schemas.microsoft.com/office/drawing/2014/main" id="{785A895C-4EFE-78C7-DBA0-3197D68637EF}"/>
+              <a:rPr lang="fr-FR" sz="1600" dirty="0" smtClean="0"/>
+              <a:t>9</a:t>
+            </a:r>
+            <a:endParaRPr lang="fr-FR" sz="1600" dirty="0"/>
+          </a:p>
+        </p:txBody>
+      </p:sp>
+      <p:sp>
+        <p:nvSpPr>
+          <p:cNvPr id="52" name="Rectangle 51">
+            <a:extLst>
+              <a:ext uri="{FF2B5EF4-FFF2-40B4-BE49-F238E27FC236}">
+                <a16:creationId xmlns="" xmlns:a16="http://schemas.microsoft.com/office/drawing/2014/main" id="{D8DCA5EE-EC8C-762E-F627-A72AA8861359}"/>
               </a:ext>
             </a:extLst>
           </p:cNvPr>
@@ -14804,7 +15116,7 @@
         </p:nvSpPr>
         <p:spPr>
           <a:xfrm>
-            <a:off x="11327289" y="5198049"/>
+            <a:off x="10703028" y="5625691"/>
             <a:ext cx="387096" cy="369332"/>
           </a:xfrm>
           <a:prstGeom prst="rect">
@@ -14838,16 +15150,20 @@
           <a:lstStyle/>
           <a:p>
             <a:pPr algn="ctr"/>
+            <a:r>
+              <a:rPr lang="fr-FR" sz="1600" dirty="0" smtClean="0"/>
+              <a:t>8</a:t>
+            </a:r>
             <a:endParaRPr lang="fr-FR" sz="1600" dirty="0"/>
           </a:p>
         </p:txBody>
       </p:sp>
       <p:sp>
         <p:nvSpPr>
-          <p:cNvPr id="60" name="Rectangle 59">
-            <a:extLst>
-              <a:ext uri="{FF2B5EF4-FFF2-40B4-BE49-F238E27FC236}">
-                <a16:creationId xmlns:a16="http://schemas.microsoft.com/office/drawing/2014/main" id="{081D5CE8-9C25-36BE-11D9-F4B7E50F25C4}"/>
+          <p:cNvPr id="64" name="Rectangle 63">
+            <a:extLst>
+              <a:ext uri="{FF2B5EF4-FFF2-40B4-BE49-F238E27FC236}">
+                <a16:creationId xmlns="" xmlns:a16="http://schemas.microsoft.com/office/drawing/2014/main" id="{73BFF83E-CD23-C05E-0C43-DDC2DBC90EAF}"/>
               </a:ext>
             </a:extLst>
           </p:cNvPr>
@@ -14856,18 +15172,15 @@
         </p:nvSpPr>
         <p:spPr>
           <a:xfrm>
-            <a:off x="11327289" y="5598022"/>
-            <a:ext cx="387096" cy="369332"/>
+            <a:off x="10130029" y="1485258"/>
+            <a:ext cx="1554480" cy="146304"/>
           </a:xfrm>
           <a:prstGeom prst="rect">
             <a:avLst/>
           </a:prstGeom>
           <a:solidFill>
-            <a:srgbClr val="92D050"/>
+            <a:srgbClr val="00B0F0"/>
           </a:solidFill>
-          <a:ln>
-            <a:noFill/>
-          </a:ln>
         </p:spPr>
         <p:style>
           <a:lnRef idx="2">
@@ -14890,16 +15203,19 @@
           <a:lstStyle/>
           <a:p>
             <a:pPr algn="ctr"/>
-            <a:endParaRPr lang="fr-FR" sz="1600" dirty="0"/>
-          </a:p>
-        </p:txBody>
-      </p:sp>
-      <p:sp>
-        <p:nvSpPr>
-          <p:cNvPr id="61" name="Rectangle 60">
-            <a:extLst>
-              <a:ext uri="{FF2B5EF4-FFF2-40B4-BE49-F238E27FC236}">
-                <a16:creationId xmlns:a16="http://schemas.microsoft.com/office/drawing/2014/main" id="{86ED91B5-BE1C-D3CA-FAB2-412C0BAD0598}"/>
+            <a:r>
+              <a:rPr lang="fr-FR" sz="1100" dirty="0"/>
+              <a:t>ENTREPRISE</a:t>
+            </a:r>
+          </a:p>
+        </p:txBody>
+      </p:sp>
+      <p:sp>
+        <p:nvSpPr>
+          <p:cNvPr id="65" name="Rectangle 64">
+            <a:extLst>
+              <a:ext uri="{FF2B5EF4-FFF2-40B4-BE49-F238E27FC236}">
+                <a16:creationId xmlns="" xmlns:a16="http://schemas.microsoft.com/office/drawing/2014/main" id="{15CB116D-1016-8888-8DA0-C2E41081E8BF}"/>
               </a:ext>
             </a:extLst>
           </p:cNvPr>
@@ -14908,7 +15224,7 @@
         </p:nvSpPr>
         <p:spPr>
           <a:xfrm>
-            <a:off x="10130029" y="1485258"/>
+            <a:off x="10130029" y="2963188"/>
             <a:ext cx="1554480" cy="146304"/>
           </a:xfrm>
           <a:prstGeom prst="rect">
@@ -14948,10 +15264,10 @@
       </p:sp>
       <p:sp>
         <p:nvSpPr>
-          <p:cNvPr id="62" name="Rectangle 61">
-            <a:extLst>
-              <a:ext uri="{FF2B5EF4-FFF2-40B4-BE49-F238E27FC236}">
-                <a16:creationId xmlns:a16="http://schemas.microsoft.com/office/drawing/2014/main" id="{02BC9BF7-180C-22BC-170E-AF0C8AFA2518}"/>
+          <p:cNvPr id="66" name="Rectangle 65">
+            <a:extLst>
+              <a:ext uri="{FF2B5EF4-FFF2-40B4-BE49-F238E27FC236}">
+                <a16:creationId xmlns="" xmlns:a16="http://schemas.microsoft.com/office/drawing/2014/main" id="{16DF2A7E-C2C5-8E04-1F92-9CF79CBD9578}"/>
               </a:ext>
             </a:extLst>
           </p:cNvPr>
@@ -14960,7 +15276,7 @@
         </p:nvSpPr>
         <p:spPr>
           <a:xfrm>
-            <a:off x="10130029" y="2963188"/>
+            <a:off x="10130029" y="4942242"/>
             <a:ext cx="1554480" cy="146304"/>
           </a:xfrm>
           <a:prstGeom prst="rect">
@@ -15000,10 +15316,10 @@
       </p:sp>
       <p:sp>
         <p:nvSpPr>
-          <p:cNvPr id="63" name="Rectangle 62">
-            <a:extLst>
-              <a:ext uri="{FF2B5EF4-FFF2-40B4-BE49-F238E27FC236}">
-                <a16:creationId xmlns:a16="http://schemas.microsoft.com/office/drawing/2014/main" id="{022D5D26-4B21-EAC1-D3F5-ABAFA0E2AE3B}"/>
+          <p:cNvPr id="67" name="Rectangle 66">
+            <a:extLst>
+              <a:ext uri="{FF2B5EF4-FFF2-40B4-BE49-F238E27FC236}">
+                <a16:creationId xmlns="" xmlns:a16="http://schemas.microsoft.com/office/drawing/2014/main" id="{A0EB135E-EF9B-D1F5-E612-5F0F278D99FE}"/>
               </a:ext>
             </a:extLst>
           </p:cNvPr>
@@ -15012,15 +15328,18 @@
         </p:nvSpPr>
         <p:spPr>
           <a:xfrm>
-            <a:off x="10130029" y="4518731"/>
-            <a:ext cx="1554480" cy="146304"/>
+            <a:off x="11327289" y="3237259"/>
+            <a:ext cx="387096" cy="369332"/>
           </a:xfrm>
           <a:prstGeom prst="rect">
             <a:avLst/>
           </a:prstGeom>
           <a:solidFill>
-            <a:srgbClr val="00B0F0"/>
+            <a:srgbClr val="D6B4B2"/>
           </a:solidFill>
+          <a:ln>
+            <a:noFill/>
+          </a:ln>
         </p:spPr>
         <p:style>
           <a:lnRef idx="2">
@@ -15044,9 +15363,66 @@
           <a:p>
             <a:pPr algn="ctr"/>
             <a:r>
-              <a:rPr lang="fr-FR" sz="1100" dirty="0"/>
-              <a:t>ENTREPRISE</a:t>
-            </a:r>
+              <a:rPr lang="fr-FR" sz="1600" dirty="0" smtClean="0"/>
+              <a:t>3</a:t>
+            </a:r>
+            <a:endParaRPr lang="fr-FR" sz="1600" dirty="0"/>
+          </a:p>
+        </p:txBody>
+      </p:sp>
+      <p:sp>
+        <p:nvSpPr>
+          <p:cNvPr id="68" name="Rectangle 67">
+            <a:extLst>
+              <a:ext uri="{FF2B5EF4-FFF2-40B4-BE49-F238E27FC236}">
+                <a16:creationId xmlns="" xmlns:a16="http://schemas.microsoft.com/office/drawing/2014/main" id="{040E83FC-64FA-353E-D05A-9B1F5F5F25C8}"/>
+              </a:ext>
+            </a:extLst>
+          </p:cNvPr>
+          <p:cNvSpPr/>
+          <p:nvPr/>
+        </p:nvSpPr>
+        <p:spPr>
+          <a:xfrm>
+            <a:off x="9808481" y="4044280"/>
+            <a:ext cx="387096" cy="369332"/>
+          </a:xfrm>
+          <a:prstGeom prst="rect">
+            <a:avLst/>
+          </a:prstGeom>
+          <a:solidFill>
+            <a:srgbClr val="D6B4B2"/>
+          </a:solidFill>
+          <a:ln>
+            <a:noFill/>
+          </a:ln>
+        </p:spPr>
+        <p:style>
+          <a:lnRef idx="2">
+            <a:schemeClr val="accent1">
+              <a:shade val="15000"/>
+            </a:schemeClr>
+          </a:lnRef>
+          <a:fillRef idx="1">
+            <a:schemeClr val="accent1"/>
+          </a:fillRef>
+          <a:effectRef idx="0">
+            <a:schemeClr val="accent1"/>
+          </a:effectRef>
+          <a:fontRef idx="minor">
+            <a:schemeClr val="lt1"/>
+          </a:fontRef>
+        </p:style>
+        <p:txBody>
+          <a:bodyPr rtlCol="0" anchor="ctr"/>
+          <a:lstStyle/>
+          <a:p>
+            <a:pPr algn="ctr"/>
+            <a:r>
+              <a:rPr lang="fr-FR" sz="1600" dirty="0" smtClean="0"/>
+              <a:t>5</a:t>
+            </a:r>
+            <a:endParaRPr lang="fr-FR" sz="1600" dirty="0"/>
           </a:p>
         </p:txBody>
       </p:sp>

</xml_diff>